<commit_message>
BaoCaoBEM va update OOCSS
</commit_message>
<xml_diff>
--- a/BaoCaoSASS.pptx
+++ b/BaoCaoSASS.pptx
@@ -6,9 +6,9 @@
   </p:sldMasterIdLst>
   <p:sldIdLst>
     <p:sldId id="257" r:id="rId2"/>
-    <p:sldId id="258" r:id="rId3"/>
-    <p:sldId id="259" r:id="rId4"/>
-    <p:sldId id="260" r:id="rId5"/>
+    <p:sldId id="274" r:id="rId3"/>
+    <p:sldId id="258" r:id="rId4"/>
+    <p:sldId id="259" r:id="rId5"/>
     <p:sldId id="261" r:id="rId6"/>
     <p:sldId id="262" r:id="rId7"/>
     <p:sldId id="263" r:id="rId8"/>
@@ -16,10 +16,11 @@
     <p:sldId id="264" r:id="rId10"/>
     <p:sldId id="267" r:id="rId11"/>
     <p:sldId id="265" r:id="rId12"/>
-    <p:sldId id="269" r:id="rId13"/>
-    <p:sldId id="270" r:id="rId14"/>
-    <p:sldId id="271" r:id="rId15"/>
-    <p:sldId id="266" r:id="rId16"/>
+    <p:sldId id="272" r:id="rId13"/>
+    <p:sldId id="269" r:id="rId14"/>
+    <p:sldId id="270" r:id="rId15"/>
+    <p:sldId id="271" r:id="rId16"/>
+    <p:sldId id="266" r:id="rId17"/>
   </p:sldIdLst>
   <p:sldSz cx="12192000" cy="6858000"/>
   <p:notesSz cx="6858000" cy="9144000"/>
@@ -1048,11 +1049,7 @@
         <a:p>
           <a:r>
             <a:rPr lang="en-US" b="0" i="0" dirty="0" smtClean="0"/>
-            <a:t> </a:t>
-          </a:r>
-          <a:r>
-            <a:rPr lang="en-US" b="0" i="0" dirty="0" smtClean="0"/>
-            <a:t>Imports</a:t>
+            <a:t> Imports</a:t>
           </a:r>
           <a:endParaRPr lang="en-US" dirty="0"/>
         </a:p>
@@ -1089,7 +1086,11 @@
         <a:p>
           <a:r>
             <a:rPr lang="en-US" b="0" i="0" dirty="0" smtClean="0"/>
-            <a:t> Operators</a:t>
+            <a:t> </a:t>
+          </a:r>
+          <a:r>
+            <a:rPr lang="en-US" b="0" i="0" dirty="0" smtClean="0"/>
+            <a:t>Operators / Maps</a:t>
           </a:r>
           <a:endParaRPr lang="en-US" dirty="0"/>
         </a:p>
@@ -1118,23 +1119,8 @@
       </dgm:t>
     </dgm:pt>
     <dgm:pt modelId="{8D53D46B-980F-4AC0-BA03-19E7C4775066}">
-      <dgm:prSet phldrT="[Text]"/>
+      <dgm:prSet phldrT="[Text]" custT="1"/>
       <dgm:spPr/>
-      <dgm:t>
-        <a:bodyPr/>
-        <a:lstStyle/>
-        <a:p>
-          <a:r>
-            <a:rPr lang="en-US" b="0" i="0" dirty="0" smtClean="0"/>
-            <a:t> </a:t>
-          </a:r>
-          <a:r>
-            <a:rPr lang="en-US" b="1" i="0" dirty="0" smtClean="0"/>
-            <a:t>Control Directives : if,  for, while</a:t>
-          </a:r>
-          <a:endParaRPr lang="en-US" dirty="0"/>
-        </a:p>
-      </dgm:t>
     </dgm:pt>
     <dgm:pt modelId="{6AA385A4-E17B-4E39-89D6-2171FA6CFFF5}" type="parTrans" cxnId="{2D85BA8D-78EC-4F64-91A1-3FFC57A16600}">
       <dgm:prSet/>
@@ -1148,6 +1134,69 @@
       </dgm:t>
     </dgm:pt>
     <dgm:pt modelId="{268546E0-5C36-43EB-B30B-CD20D7CE2F01}" type="sibTrans" cxnId="{2D85BA8D-78EC-4F64-91A1-3FFC57A16600}">
+      <dgm:prSet/>
+      <dgm:spPr/>
+      <dgm:t>
+        <a:bodyPr/>
+        <a:lstStyle/>
+        <a:p>
+          <a:endParaRPr lang="en-US"/>
+        </a:p>
+      </dgm:t>
+    </dgm:pt>
+    <dgm:pt modelId="{2CDDA639-11E2-4CED-AF51-44B0201807A9}">
+      <dgm:prSet phldrT="[Text]"/>
+      <dgm:spPr/>
+    </dgm:pt>
+    <dgm:pt modelId="{C463577F-A87D-49DC-B550-91D43460EC2F}" type="parTrans" cxnId="{3880D08B-7651-4C2E-99E4-1F490BBE495E}">
+      <dgm:prSet/>
+      <dgm:spPr/>
+      <dgm:t>
+        <a:bodyPr/>
+        <a:lstStyle/>
+        <a:p>
+          <a:endParaRPr lang="en-US"/>
+        </a:p>
+      </dgm:t>
+    </dgm:pt>
+    <dgm:pt modelId="{F5003F55-8207-4A50-BBF2-DCFD24126F01}" type="sibTrans" cxnId="{3880D08B-7651-4C2E-99E4-1F490BBE495E}">
+      <dgm:prSet/>
+      <dgm:spPr/>
+      <dgm:t>
+        <a:bodyPr/>
+        <a:lstStyle/>
+        <a:p>
+          <a:endParaRPr lang="en-US"/>
+        </a:p>
+      </dgm:t>
+    </dgm:pt>
+    <dgm:pt modelId="{BE1EBB0A-A79D-4C4C-A748-70E8023001EE}">
+      <dgm:prSet phldrT="[Text]"/>
+      <dgm:spPr/>
+      <dgm:t>
+        <a:bodyPr/>
+        <a:lstStyle/>
+        <a:p>
+          <a:r>
+            <a:rPr lang="en-US" b="0" i="0" dirty="0" smtClean="0"/>
+            <a:t> Operators</a:t>
+          </a:r>
+          <a:endParaRPr lang="en-US" dirty="0"/>
+        </a:p>
+      </dgm:t>
+    </dgm:pt>
+    <dgm:pt modelId="{721519D7-22BE-4A18-A9EC-D71D1A3C0A56}" type="parTrans" cxnId="{4F0E10A2-7968-4743-91ED-D31EC7D6F45D}">
+      <dgm:prSet/>
+      <dgm:spPr/>
+      <dgm:t>
+        <a:bodyPr/>
+        <a:lstStyle/>
+        <a:p>
+          <a:endParaRPr lang="en-US"/>
+        </a:p>
+      </dgm:t>
+    </dgm:pt>
+    <dgm:pt modelId="{C53CEA59-6E61-4022-836B-63DAFEE642F3}" type="sibTrans" cxnId="{4F0E10A2-7968-4743-91ED-D31EC7D6F45D}">
       <dgm:prSet/>
       <dgm:spPr/>
       <dgm:t>
@@ -1344,8 +1393,8 @@
       <dgm:prSet presAssocID="{3AEAD19F-89F5-4CA9-A454-64BE8C6D18E4}" presName="accentRepeatNode" presStyleLbl="solidFgAcc1" presStyleIdx="5" presStyleCnt="7" custLinFactNeighborX="7400" custLinFactNeighborY="-4350"/>
       <dgm:spPr/>
     </dgm:pt>
-    <dgm:pt modelId="{787FE31F-FFF2-4CEC-B837-567A2ED533F3}" type="pres">
-      <dgm:prSet presAssocID="{8D53D46B-980F-4AC0-BA03-19E7C4775066}" presName="text_7" presStyleLbl="node1" presStyleIdx="6" presStyleCnt="7" custLinFactNeighborX="-1406" custLinFactNeighborY="-5437">
+    <dgm:pt modelId="{B9019D3C-89BD-4A71-B0BB-BF5CB0F79341}" type="pres">
+      <dgm:prSet presAssocID="{BE1EBB0A-A79D-4C4C-A748-70E8023001EE}" presName="text_7" presStyleLbl="node1" presStyleIdx="6" presStyleCnt="7" custLinFactNeighborX="-1406" custLinFactNeighborY="-5437">
         <dgm:presLayoutVars>
           <dgm:bulletEnabled val="1"/>
         </dgm:presLayoutVars>
@@ -1359,59 +1408,61 @@
         </a:p>
       </dgm:t>
     </dgm:pt>
-    <dgm:pt modelId="{48E7B3CE-943F-4AFE-A411-6B22052AA7F4}" type="pres">
-      <dgm:prSet presAssocID="{8D53D46B-980F-4AC0-BA03-19E7C4775066}" presName="accent_7" presStyleCnt="0"/>
+    <dgm:pt modelId="{016845AC-0024-4CED-A3C8-EB5464F124F7}" type="pres">
+      <dgm:prSet presAssocID="{BE1EBB0A-A79D-4C4C-A748-70E8023001EE}" presName="accent_7" presStyleCnt="0"/>
       <dgm:spPr/>
     </dgm:pt>
-    <dgm:pt modelId="{F8EB65F1-EDE9-48E4-88DB-107955061843}" type="pres">
-      <dgm:prSet presAssocID="{8D53D46B-980F-4AC0-BA03-19E7C4775066}" presName="accentRepeatNode" presStyleLbl="solidFgAcc1" presStyleIdx="6" presStyleCnt="7" custLinFactNeighborX="7400" custLinFactNeighborY="-4350"/>
+    <dgm:pt modelId="{B498C2D0-4057-4B27-A940-BBBCEA638006}" type="pres">
+      <dgm:prSet presAssocID="{BE1EBB0A-A79D-4C4C-A748-70E8023001EE}" presName="accentRepeatNode" presStyleLbl="solidFgAcc1" presStyleIdx="6" presStyleCnt="7" custLinFactNeighborX="7400" custLinFactNeighborY="-4350"/>
       <dgm:spPr/>
     </dgm:pt>
   </dgm:ptLst>
   <dgm:cxnLst>
-    <dgm:cxn modelId="{2D85BA8D-78EC-4F64-91A1-3FFC57A16600}" srcId="{F5BEA265-8C0F-4BCF-964D-2C118559A80A}" destId="{8D53D46B-980F-4AC0-BA03-19E7C4775066}" srcOrd="6" destOrd="0" parTransId="{6AA385A4-E17B-4E39-89D6-2171FA6CFFF5}" sibTransId="{268546E0-5C36-43EB-B30B-CD20D7CE2F01}"/>
+    <dgm:cxn modelId="{0E904769-95F8-4156-8C41-A04D2544FEFA}" type="presOf" srcId="{F5BEA265-8C0F-4BCF-964D-2C118559A80A}" destId="{939F23C2-6206-441E-BC0F-016A845D68A4}" srcOrd="0" destOrd="0" presId="urn:microsoft.com/office/officeart/2008/layout/VerticalCurvedList"/>
+    <dgm:cxn modelId="{2D85BA8D-78EC-4F64-91A1-3FFC57A16600}" srcId="{F5BEA265-8C0F-4BCF-964D-2C118559A80A}" destId="{8D53D46B-980F-4AC0-BA03-19E7C4775066}" srcOrd="8" destOrd="0" parTransId="{6AA385A4-E17B-4E39-89D6-2171FA6CFFF5}" sibTransId="{268546E0-5C36-43EB-B30B-CD20D7CE2F01}"/>
+    <dgm:cxn modelId="{3880D08B-7651-4C2E-99E4-1F490BBE495E}" srcId="{F5BEA265-8C0F-4BCF-964D-2C118559A80A}" destId="{2CDDA639-11E2-4CED-AF51-44B0201807A9}" srcOrd="7" destOrd="0" parTransId="{C463577F-A87D-49DC-B550-91D43460EC2F}" sibTransId="{F5003F55-8207-4A50-BBF2-DCFD24126F01}"/>
+    <dgm:cxn modelId="{4F0E10A2-7968-4743-91ED-D31EC7D6F45D}" srcId="{F5BEA265-8C0F-4BCF-964D-2C118559A80A}" destId="{BE1EBB0A-A79D-4C4C-A748-70E8023001EE}" srcOrd="6" destOrd="0" parTransId="{721519D7-22BE-4A18-A9EC-D71D1A3C0A56}" sibTransId="{C53CEA59-6E61-4022-836B-63DAFEE642F3}"/>
+    <dgm:cxn modelId="{7C88F2FB-2205-4F49-8EB3-046B30410459}" type="presOf" srcId="{3AEAD19F-89F5-4CA9-A454-64BE8C6D18E4}" destId="{032A448C-D769-4F26-8F30-5053CA59B032}" srcOrd="0" destOrd="0" presId="urn:microsoft.com/office/officeart/2008/layout/VerticalCurvedList"/>
     <dgm:cxn modelId="{F848F1B5-7035-4EF1-B603-229C8FAA334D}" srcId="{F5BEA265-8C0F-4BCF-964D-2C118559A80A}" destId="{538F4796-7AA5-4EDF-AAEC-248CF90D5294}" srcOrd="0" destOrd="0" parTransId="{D9032AB2-B882-49C9-8FB3-9924C8FA750C}" sibTransId="{DE14C537-4FFF-4BF3-A721-DF6DB3CF0E4E}"/>
-    <dgm:cxn modelId="{9F0D3BD4-FF3E-4126-8FFF-80D2076EB814}" type="presOf" srcId="{08CE59F1-0B12-40CC-B7A0-62151120D09C}" destId="{9AF82E93-4BA3-4D23-9BF1-B66BB39C23C9}" srcOrd="0" destOrd="0" presId="urn:microsoft.com/office/officeart/2008/layout/VerticalCurvedList"/>
+    <dgm:cxn modelId="{F73F640B-61A8-47A4-BA42-6A2F228913F3}" type="presOf" srcId="{36E1C47F-489D-4960-AC25-154121EFE91B}" destId="{4F34DCA5-E5CC-4E69-8252-F7A1C85E4A3E}" srcOrd="0" destOrd="0" presId="urn:microsoft.com/office/officeart/2008/layout/VerticalCurvedList"/>
     <dgm:cxn modelId="{E544507D-ED1D-41CB-A494-88686195A3D9}" srcId="{F5BEA265-8C0F-4BCF-964D-2C118559A80A}" destId="{3AEAD19F-89F5-4CA9-A454-64BE8C6D18E4}" srcOrd="5" destOrd="0" parTransId="{69F580FD-18FA-4397-92D8-587DA38D40ED}" sibTransId="{8A236040-6923-4DF4-B03D-65CAB85B4946}"/>
-    <dgm:cxn modelId="{26949AB9-E899-412D-8691-A737E9124673}" type="presOf" srcId="{463A82B8-1BB3-4EBD-8600-A8235DA64933}" destId="{8F106C55-7CCF-4CC7-80AC-9FA8A00AB89E}" srcOrd="0" destOrd="0" presId="urn:microsoft.com/office/officeart/2008/layout/VerticalCurvedList"/>
-    <dgm:cxn modelId="{6D6CE547-E542-4CE4-A755-ECBF1AD27234}" type="presOf" srcId="{3AEAD19F-89F5-4CA9-A454-64BE8C6D18E4}" destId="{032A448C-D769-4F26-8F30-5053CA59B032}" srcOrd="0" destOrd="0" presId="urn:microsoft.com/office/officeart/2008/layout/VerticalCurvedList"/>
     <dgm:cxn modelId="{50613E18-8437-4EBA-BC21-F2C560711E22}" srcId="{F5BEA265-8C0F-4BCF-964D-2C118559A80A}" destId="{08CE59F1-0B12-40CC-B7A0-62151120D09C}" srcOrd="2" destOrd="0" parTransId="{529FA5FB-1027-4B0A-8113-ED91CE2E56F6}" sibTransId="{B2D3BD6A-C507-4B0C-A436-67249CDC2774}"/>
+    <dgm:cxn modelId="{46039845-220D-447F-B6F2-4338A8B82333}" type="presOf" srcId="{BE1EBB0A-A79D-4C4C-A748-70E8023001EE}" destId="{B9019D3C-89BD-4A71-B0BB-BF5CB0F79341}" srcOrd="0" destOrd="0" presId="urn:microsoft.com/office/officeart/2008/layout/VerticalCurvedList"/>
     <dgm:cxn modelId="{22437ACE-9855-48B8-8D4A-648DB0F488DA}" srcId="{F5BEA265-8C0F-4BCF-964D-2C118559A80A}" destId="{5A2876BB-F268-4177-8810-8CA4317EBC67}" srcOrd="4" destOrd="0" parTransId="{93607556-2E56-42F8-997B-7DE7D6872C43}" sibTransId="{09C64C59-BD50-4974-A094-168322CAD1A8}"/>
-    <dgm:cxn modelId="{81397D88-EB34-48A1-B3E4-52421828219B}" type="presOf" srcId="{5A2876BB-F268-4177-8810-8CA4317EBC67}" destId="{92E3A7C2-753B-419F-9415-A393E096769B}" srcOrd="0" destOrd="0" presId="urn:microsoft.com/office/officeart/2008/layout/VerticalCurvedList"/>
-    <dgm:cxn modelId="{22C3A641-2D7E-4020-A434-C46F934A7FDD}" type="presOf" srcId="{538F4796-7AA5-4EDF-AAEC-248CF90D5294}" destId="{95596B58-8926-4091-8B3E-6E86B60DC964}" srcOrd="0" destOrd="0" presId="urn:microsoft.com/office/officeart/2008/layout/VerticalCurvedList"/>
-    <dgm:cxn modelId="{6DA30E92-9E8B-4988-83BC-3C4E9A96C84E}" type="presOf" srcId="{36E1C47F-489D-4960-AC25-154121EFE91B}" destId="{4F34DCA5-E5CC-4E69-8252-F7A1C85E4A3E}" srcOrd="0" destOrd="0" presId="urn:microsoft.com/office/officeart/2008/layout/VerticalCurvedList"/>
     <dgm:cxn modelId="{9540A558-4629-4B8A-B3B7-36E33582A7DE}" srcId="{F5BEA265-8C0F-4BCF-964D-2C118559A80A}" destId="{463A82B8-1BB3-4EBD-8600-A8235DA64933}" srcOrd="1" destOrd="0" parTransId="{D14A168F-4B24-4F9D-BC53-E97C1EFE156F}" sibTransId="{5A64F40F-87F1-4413-9533-71DAADA00461}"/>
-    <dgm:cxn modelId="{217FD05D-1BAB-4CE0-BBE8-4EFF047F5B38}" type="presOf" srcId="{8D53D46B-980F-4AC0-BA03-19E7C4775066}" destId="{787FE31F-FFF2-4CEC-B837-567A2ED533F3}" srcOrd="0" destOrd="0" presId="urn:microsoft.com/office/officeart/2008/layout/VerticalCurvedList"/>
-    <dgm:cxn modelId="{A75F942F-4D37-44C3-9507-C5271AF38CC6}" type="presOf" srcId="{DE14C537-4FFF-4BF3-A721-DF6DB3CF0E4E}" destId="{524D8F57-249C-46C1-ADFE-DC4D3EB7FB79}" srcOrd="0" destOrd="0" presId="urn:microsoft.com/office/officeart/2008/layout/VerticalCurvedList"/>
+    <dgm:cxn modelId="{49895D00-1992-4C10-9170-9A5198430B3F}" type="presOf" srcId="{08CE59F1-0B12-40CC-B7A0-62151120D09C}" destId="{9AF82E93-4BA3-4D23-9BF1-B66BB39C23C9}" srcOrd="0" destOrd="0" presId="urn:microsoft.com/office/officeart/2008/layout/VerticalCurvedList"/>
+    <dgm:cxn modelId="{172C23D0-30E7-4EBD-98E1-2BE8C5518D2E}" type="presOf" srcId="{538F4796-7AA5-4EDF-AAEC-248CF90D5294}" destId="{95596B58-8926-4091-8B3E-6E86B60DC964}" srcOrd="0" destOrd="0" presId="urn:microsoft.com/office/officeart/2008/layout/VerticalCurvedList"/>
+    <dgm:cxn modelId="{B7DAC6A0-8DBC-4F2A-959F-E0BC0920CECE}" type="presOf" srcId="{463A82B8-1BB3-4EBD-8600-A8235DA64933}" destId="{8F106C55-7CCF-4CC7-80AC-9FA8A00AB89E}" srcOrd="0" destOrd="0" presId="urn:microsoft.com/office/officeart/2008/layout/VerticalCurvedList"/>
+    <dgm:cxn modelId="{6932C1DD-AF65-433E-8BB0-3C57601253A6}" type="presOf" srcId="{5A2876BB-F268-4177-8810-8CA4317EBC67}" destId="{92E3A7C2-753B-419F-9415-A393E096769B}" srcOrd="0" destOrd="0" presId="urn:microsoft.com/office/officeart/2008/layout/VerticalCurvedList"/>
+    <dgm:cxn modelId="{86E861CD-AE63-4BC5-8C4B-9E5EAB7085A4}" type="presOf" srcId="{DE14C537-4FFF-4BF3-A721-DF6DB3CF0E4E}" destId="{524D8F57-249C-46C1-ADFE-DC4D3EB7FB79}" srcOrd="0" destOrd="0" presId="urn:microsoft.com/office/officeart/2008/layout/VerticalCurvedList"/>
     <dgm:cxn modelId="{799F756A-2106-475B-9EC4-11BEA012466B}" srcId="{F5BEA265-8C0F-4BCF-964D-2C118559A80A}" destId="{36E1C47F-489D-4960-AC25-154121EFE91B}" srcOrd="3" destOrd="0" parTransId="{504F2406-9D80-4A8A-8829-5881D5C8A651}" sibTransId="{07BCF5B0-9AC3-4221-BC95-54CD77A11274}"/>
-    <dgm:cxn modelId="{16993990-83E4-4011-8EF7-350249A26E57}" type="presOf" srcId="{F5BEA265-8C0F-4BCF-964D-2C118559A80A}" destId="{939F23C2-6206-441E-BC0F-016A845D68A4}" srcOrd="0" destOrd="0" presId="urn:microsoft.com/office/officeart/2008/layout/VerticalCurvedList"/>
-    <dgm:cxn modelId="{D9A10B35-8F80-4E91-9C77-6CD5DC863F6A}" type="presParOf" srcId="{939F23C2-6206-441E-BC0F-016A845D68A4}" destId="{E5537B9F-DE05-4E9A-999A-593FB3579CF3}" srcOrd="0" destOrd="0" presId="urn:microsoft.com/office/officeart/2008/layout/VerticalCurvedList"/>
-    <dgm:cxn modelId="{B93947AD-58BB-48EA-8DC9-DE898ABC076F}" type="presParOf" srcId="{E5537B9F-DE05-4E9A-999A-593FB3579CF3}" destId="{D8232689-A6D8-4679-AFE8-85A45945CABD}" srcOrd="0" destOrd="0" presId="urn:microsoft.com/office/officeart/2008/layout/VerticalCurvedList"/>
-    <dgm:cxn modelId="{2E5D2465-D8A6-4526-A58E-89094A91C5AF}" type="presParOf" srcId="{D8232689-A6D8-4679-AFE8-85A45945CABD}" destId="{4B30C188-303A-40A7-AEA6-DD3B6226284D}" srcOrd="0" destOrd="0" presId="urn:microsoft.com/office/officeart/2008/layout/VerticalCurvedList"/>
-    <dgm:cxn modelId="{7482D10C-892B-47EF-A737-4B6DA04DE35C}" type="presParOf" srcId="{D8232689-A6D8-4679-AFE8-85A45945CABD}" destId="{524D8F57-249C-46C1-ADFE-DC4D3EB7FB79}" srcOrd="1" destOrd="0" presId="urn:microsoft.com/office/officeart/2008/layout/VerticalCurvedList"/>
-    <dgm:cxn modelId="{58586DD3-99FB-466C-BA6C-FE9D66AF2D5C}" type="presParOf" srcId="{D8232689-A6D8-4679-AFE8-85A45945CABD}" destId="{D106F883-C9A9-4D18-AED8-CFADA619FFCD}" srcOrd="2" destOrd="0" presId="urn:microsoft.com/office/officeart/2008/layout/VerticalCurvedList"/>
-    <dgm:cxn modelId="{712AED23-180C-45B8-9772-2F2A8AD70007}" type="presParOf" srcId="{D8232689-A6D8-4679-AFE8-85A45945CABD}" destId="{0835C189-B3E4-4AC9-B797-CA2EDAF86B43}" srcOrd="3" destOrd="0" presId="urn:microsoft.com/office/officeart/2008/layout/VerticalCurvedList"/>
-    <dgm:cxn modelId="{907F2803-ABDA-48CC-8E4C-E3E35914FE21}" type="presParOf" srcId="{E5537B9F-DE05-4E9A-999A-593FB3579CF3}" destId="{95596B58-8926-4091-8B3E-6E86B60DC964}" srcOrd="1" destOrd="0" presId="urn:microsoft.com/office/officeart/2008/layout/VerticalCurvedList"/>
-    <dgm:cxn modelId="{04552A2F-CC51-4BCB-9451-B9952DC865F1}" type="presParOf" srcId="{E5537B9F-DE05-4E9A-999A-593FB3579CF3}" destId="{3B121901-C3E6-491E-9C02-32F4C0664DB2}" srcOrd="2" destOrd="0" presId="urn:microsoft.com/office/officeart/2008/layout/VerticalCurvedList"/>
-    <dgm:cxn modelId="{9B9B50C9-3794-4E97-B991-120E07B97B36}" type="presParOf" srcId="{3B121901-C3E6-491E-9C02-32F4C0664DB2}" destId="{DD36496A-D057-4746-AE3C-7729F4286BD9}" srcOrd="0" destOrd="0" presId="urn:microsoft.com/office/officeart/2008/layout/VerticalCurvedList"/>
-    <dgm:cxn modelId="{8132763F-FB2A-45E9-8FB6-BADF07699589}" type="presParOf" srcId="{E5537B9F-DE05-4E9A-999A-593FB3579CF3}" destId="{8F106C55-7CCF-4CC7-80AC-9FA8A00AB89E}" srcOrd="3" destOrd="0" presId="urn:microsoft.com/office/officeart/2008/layout/VerticalCurvedList"/>
-    <dgm:cxn modelId="{CB8AF7AE-548A-48D9-A87D-9C738E064F37}" type="presParOf" srcId="{E5537B9F-DE05-4E9A-999A-593FB3579CF3}" destId="{2ADFA38C-012B-462A-A4D9-BEE2C48F72A1}" srcOrd="4" destOrd="0" presId="urn:microsoft.com/office/officeart/2008/layout/VerticalCurvedList"/>
-    <dgm:cxn modelId="{A48DE582-E654-40AD-AAEA-CC911C36AC49}" type="presParOf" srcId="{2ADFA38C-012B-462A-A4D9-BEE2C48F72A1}" destId="{822F0B8B-6883-4CCB-881A-763886D4AC82}" srcOrd="0" destOrd="0" presId="urn:microsoft.com/office/officeart/2008/layout/VerticalCurvedList"/>
-    <dgm:cxn modelId="{8A1B2F7C-38B9-4CEE-B8FE-392FF85BBE50}" type="presParOf" srcId="{E5537B9F-DE05-4E9A-999A-593FB3579CF3}" destId="{9AF82E93-4BA3-4D23-9BF1-B66BB39C23C9}" srcOrd="5" destOrd="0" presId="urn:microsoft.com/office/officeart/2008/layout/VerticalCurvedList"/>
-    <dgm:cxn modelId="{47CA06B0-1612-4310-BEC6-28026B5476A4}" type="presParOf" srcId="{E5537B9F-DE05-4E9A-999A-593FB3579CF3}" destId="{BA78F9F7-5959-4D7A-BB37-55E9D2E511EF}" srcOrd="6" destOrd="0" presId="urn:microsoft.com/office/officeart/2008/layout/VerticalCurvedList"/>
-    <dgm:cxn modelId="{8BE62485-F27F-4292-A149-8891052F1A65}" type="presParOf" srcId="{BA78F9F7-5959-4D7A-BB37-55E9D2E511EF}" destId="{D75F3729-6A9B-48DA-BBBE-143C785BA27D}" srcOrd="0" destOrd="0" presId="urn:microsoft.com/office/officeart/2008/layout/VerticalCurvedList"/>
-    <dgm:cxn modelId="{9FCF6E26-6DD8-4409-9187-3D1ADFB7A87B}" type="presParOf" srcId="{E5537B9F-DE05-4E9A-999A-593FB3579CF3}" destId="{4F34DCA5-E5CC-4E69-8252-F7A1C85E4A3E}" srcOrd="7" destOrd="0" presId="urn:microsoft.com/office/officeart/2008/layout/VerticalCurvedList"/>
-    <dgm:cxn modelId="{4036CF75-5C14-4EAD-9B2D-06152A2E7BBC}" type="presParOf" srcId="{E5537B9F-DE05-4E9A-999A-593FB3579CF3}" destId="{9FB2098E-E759-4C51-9DF2-8B19231658B9}" srcOrd="8" destOrd="0" presId="urn:microsoft.com/office/officeart/2008/layout/VerticalCurvedList"/>
-    <dgm:cxn modelId="{17ABC2EB-425C-4E3E-B533-410AAF21FB87}" type="presParOf" srcId="{9FB2098E-E759-4C51-9DF2-8B19231658B9}" destId="{EC4447CB-F987-4F09-BB25-926D896C3AA0}" srcOrd="0" destOrd="0" presId="urn:microsoft.com/office/officeart/2008/layout/VerticalCurvedList"/>
-    <dgm:cxn modelId="{9F7BA1C5-C7DE-4F96-B296-87980029DD9F}" type="presParOf" srcId="{E5537B9F-DE05-4E9A-999A-593FB3579CF3}" destId="{92E3A7C2-753B-419F-9415-A393E096769B}" srcOrd="9" destOrd="0" presId="urn:microsoft.com/office/officeart/2008/layout/VerticalCurvedList"/>
-    <dgm:cxn modelId="{14DAFA71-8681-4B6A-A643-99A913D8A80D}" type="presParOf" srcId="{E5537B9F-DE05-4E9A-999A-593FB3579CF3}" destId="{BF38C2A9-3DA8-463B-85FE-0DAC0D05F5E7}" srcOrd="10" destOrd="0" presId="urn:microsoft.com/office/officeart/2008/layout/VerticalCurvedList"/>
-    <dgm:cxn modelId="{354B1415-7CC7-4FBC-B10D-489243E80D15}" type="presParOf" srcId="{BF38C2A9-3DA8-463B-85FE-0DAC0D05F5E7}" destId="{E9A6F88F-74E0-46CA-AA69-433057AC26E1}" srcOrd="0" destOrd="0" presId="urn:microsoft.com/office/officeart/2008/layout/VerticalCurvedList"/>
-    <dgm:cxn modelId="{38A21BC3-9B2D-4301-9D0D-EE59F3E0A0A4}" type="presParOf" srcId="{E5537B9F-DE05-4E9A-999A-593FB3579CF3}" destId="{032A448C-D769-4F26-8F30-5053CA59B032}" srcOrd="11" destOrd="0" presId="urn:microsoft.com/office/officeart/2008/layout/VerticalCurvedList"/>
-    <dgm:cxn modelId="{35810694-339E-4892-804A-09AA1FA9F93D}" type="presParOf" srcId="{E5537B9F-DE05-4E9A-999A-593FB3579CF3}" destId="{A66A1E9D-F8B6-42DF-8CC3-5F31A7851E4B}" srcOrd="12" destOrd="0" presId="urn:microsoft.com/office/officeart/2008/layout/VerticalCurvedList"/>
-    <dgm:cxn modelId="{34797D61-7C88-4D69-BAEC-A657008901BE}" type="presParOf" srcId="{A66A1E9D-F8B6-42DF-8CC3-5F31A7851E4B}" destId="{C00CE06B-EA27-4F2C-8D38-477FDA3E12BC}" srcOrd="0" destOrd="0" presId="urn:microsoft.com/office/officeart/2008/layout/VerticalCurvedList"/>
-    <dgm:cxn modelId="{0DE7BE49-887A-45DA-979B-7A4D0820B5AF}" type="presParOf" srcId="{E5537B9F-DE05-4E9A-999A-593FB3579CF3}" destId="{787FE31F-FFF2-4CEC-B837-567A2ED533F3}" srcOrd="13" destOrd="0" presId="urn:microsoft.com/office/officeart/2008/layout/VerticalCurvedList"/>
-    <dgm:cxn modelId="{533EEE50-4714-4118-A228-921AEA1FDB4C}" type="presParOf" srcId="{E5537B9F-DE05-4E9A-999A-593FB3579CF3}" destId="{48E7B3CE-943F-4AFE-A411-6B22052AA7F4}" srcOrd="14" destOrd="0" presId="urn:microsoft.com/office/officeart/2008/layout/VerticalCurvedList"/>
-    <dgm:cxn modelId="{66078EBA-3B74-4E3E-A49A-30E27E38F11E}" type="presParOf" srcId="{48E7B3CE-943F-4AFE-A411-6B22052AA7F4}" destId="{F8EB65F1-EDE9-48E4-88DB-107955061843}" srcOrd="0" destOrd="0" presId="urn:microsoft.com/office/officeart/2008/layout/VerticalCurvedList"/>
+    <dgm:cxn modelId="{742108CF-6E96-4C0E-899F-2C8FAE8D4CFF}" type="presParOf" srcId="{939F23C2-6206-441E-BC0F-016A845D68A4}" destId="{E5537B9F-DE05-4E9A-999A-593FB3579CF3}" srcOrd="0" destOrd="0" presId="urn:microsoft.com/office/officeart/2008/layout/VerticalCurvedList"/>
+    <dgm:cxn modelId="{3953C861-7E63-4404-BA83-FF92F2FF9BAC}" type="presParOf" srcId="{E5537B9F-DE05-4E9A-999A-593FB3579CF3}" destId="{D8232689-A6D8-4679-AFE8-85A45945CABD}" srcOrd="0" destOrd="0" presId="urn:microsoft.com/office/officeart/2008/layout/VerticalCurvedList"/>
+    <dgm:cxn modelId="{6B9C6CB4-3398-4DBE-9AE2-215C442CBCFB}" type="presParOf" srcId="{D8232689-A6D8-4679-AFE8-85A45945CABD}" destId="{4B30C188-303A-40A7-AEA6-DD3B6226284D}" srcOrd="0" destOrd="0" presId="urn:microsoft.com/office/officeart/2008/layout/VerticalCurvedList"/>
+    <dgm:cxn modelId="{011D0922-F2D8-431B-A909-F7BAB65983A9}" type="presParOf" srcId="{D8232689-A6D8-4679-AFE8-85A45945CABD}" destId="{524D8F57-249C-46C1-ADFE-DC4D3EB7FB79}" srcOrd="1" destOrd="0" presId="urn:microsoft.com/office/officeart/2008/layout/VerticalCurvedList"/>
+    <dgm:cxn modelId="{381DFAF8-C888-4A75-9697-5371B1357ED0}" type="presParOf" srcId="{D8232689-A6D8-4679-AFE8-85A45945CABD}" destId="{D106F883-C9A9-4D18-AED8-CFADA619FFCD}" srcOrd="2" destOrd="0" presId="urn:microsoft.com/office/officeart/2008/layout/VerticalCurvedList"/>
+    <dgm:cxn modelId="{834737BC-9257-4B71-88A6-AAF9B9971B99}" type="presParOf" srcId="{D8232689-A6D8-4679-AFE8-85A45945CABD}" destId="{0835C189-B3E4-4AC9-B797-CA2EDAF86B43}" srcOrd="3" destOrd="0" presId="urn:microsoft.com/office/officeart/2008/layout/VerticalCurvedList"/>
+    <dgm:cxn modelId="{D8647F62-561C-4F91-BB1C-AF725EF0ECFE}" type="presParOf" srcId="{E5537B9F-DE05-4E9A-999A-593FB3579CF3}" destId="{95596B58-8926-4091-8B3E-6E86B60DC964}" srcOrd="1" destOrd="0" presId="urn:microsoft.com/office/officeart/2008/layout/VerticalCurvedList"/>
+    <dgm:cxn modelId="{D4E3041A-6CD1-42B9-8997-5C01AE4E6ACB}" type="presParOf" srcId="{E5537B9F-DE05-4E9A-999A-593FB3579CF3}" destId="{3B121901-C3E6-491E-9C02-32F4C0664DB2}" srcOrd="2" destOrd="0" presId="urn:microsoft.com/office/officeart/2008/layout/VerticalCurvedList"/>
+    <dgm:cxn modelId="{E81436F1-C558-4779-AE63-49E4DA4345CB}" type="presParOf" srcId="{3B121901-C3E6-491E-9C02-32F4C0664DB2}" destId="{DD36496A-D057-4746-AE3C-7729F4286BD9}" srcOrd="0" destOrd="0" presId="urn:microsoft.com/office/officeart/2008/layout/VerticalCurvedList"/>
+    <dgm:cxn modelId="{32385081-9F85-4740-B09C-7E358BEF458B}" type="presParOf" srcId="{E5537B9F-DE05-4E9A-999A-593FB3579CF3}" destId="{8F106C55-7CCF-4CC7-80AC-9FA8A00AB89E}" srcOrd="3" destOrd="0" presId="urn:microsoft.com/office/officeart/2008/layout/VerticalCurvedList"/>
+    <dgm:cxn modelId="{CA4B5D92-A592-4B8B-9922-2B001CFD5963}" type="presParOf" srcId="{E5537B9F-DE05-4E9A-999A-593FB3579CF3}" destId="{2ADFA38C-012B-462A-A4D9-BEE2C48F72A1}" srcOrd="4" destOrd="0" presId="urn:microsoft.com/office/officeart/2008/layout/VerticalCurvedList"/>
+    <dgm:cxn modelId="{17B1ED7B-86F8-4ACF-9045-BC0B46B9B780}" type="presParOf" srcId="{2ADFA38C-012B-462A-A4D9-BEE2C48F72A1}" destId="{822F0B8B-6883-4CCB-881A-763886D4AC82}" srcOrd="0" destOrd="0" presId="urn:microsoft.com/office/officeart/2008/layout/VerticalCurvedList"/>
+    <dgm:cxn modelId="{757C6E9A-9EA1-407D-96FD-DB13347D65FD}" type="presParOf" srcId="{E5537B9F-DE05-4E9A-999A-593FB3579CF3}" destId="{9AF82E93-4BA3-4D23-9BF1-B66BB39C23C9}" srcOrd="5" destOrd="0" presId="urn:microsoft.com/office/officeart/2008/layout/VerticalCurvedList"/>
+    <dgm:cxn modelId="{98F946BA-91C2-4667-B97F-0E7C72048FC5}" type="presParOf" srcId="{E5537B9F-DE05-4E9A-999A-593FB3579CF3}" destId="{BA78F9F7-5959-4D7A-BB37-55E9D2E511EF}" srcOrd="6" destOrd="0" presId="urn:microsoft.com/office/officeart/2008/layout/VerticalCurvedList"/>
+    <dgm:cxn modelId="{84AB3F2F-1756-4A80-92FC-FEBB8514298A}" type="presParOf" srcId="{BA78F9F7-5959-4D7A-BB37-55E9D2E511EF}" destId="{D75F3729-6A9B-48DA-BBBE-143C785BA27D}" srcOrd="0" destOrd="0" presId="urn:microsoft.com/office/officeart/2008/layout/VerticalCurvedList"/>
+    <dgm:cxn modelId="{0A19398A-2539-4C39-AEBA-BE8E5421E158}" type="presParOf" srcId="{E5537B9F-DE05-4E9A-999A-593FB3579CF3}" destId="{4F34DCA5-E5CC-4E69-8252-F7A1C85E4A3E}" srcOrd="7" destOrd="0" presId="urn:microsoft.com/office/officeart/2008/layout/VerticalCurvedList"/>
+    <dgm:cxn modelId="{2D2CB5D1-4AF5-4BA8-B703-93157726C636}" type="presParOf" srcId="{E5537B9F-DE05-4E9A-999A-593FB3579CF3}" destId="{9FB2098E-E759-4C51-9DF2-8B19231658B9}" srcOrd="8" destOrd="0" presId="urn:microsoft.com/office/officeart/2008/layout/VerticalCurvedList"/>
+    <dgm:cxn modelId="{5149A42C-72B3-4F03-8D27-54DD353CB35B}" type="presParOf" srcId="{9FB2098E-E759-4C51-9DF2-8B19231658B9}" destId="{EC4447CB-F987-4F09-BB25-926D896C3AA0}" srcOrd="0" destOrd="0" presId="urn:microsoft.com/office/officeart/2008/layout/VerticalCurvedList"/>
+    <dgm:cxn modelId="{ABB99C9F-BC53-4233-A6FA-E835D75775A0}" type="presParOf" srcId="{E5537B9F-DE05-4E9A-999A-593FB3579CF3}" destId="{92E3A7C2-753B-419F-9415-A393E096769B}" srcOrd="9" destOrd="0" presId="urn:microsoft.com/office/officeart/2008/layout/VerticalCurvedList"/>
+    <dgm:cxn modelId="{989025EA-575E-4BEC-B974-A14366EA3647}" type="presParOf" srcId="{E5537B9F-DE05-4E9A-999A-593FB3579CF3}" destId="{BF38C2A9-3DA8-463B-85FE-0DAC0D05F5E7}" srcOrd="10" destOrd="0" presId="urn:microsoft.com/office/officeart/2008/layout/VerticalCurvedList"/>
+    <dgm:cxn modelId="{CE45AC9D-EF45-4794-B180-3EDD8C324C79}" type="presParOf" srcId="{BF38C2A9-3DA8-463B-85FE-0DAC0D05F5E7}" destId="{E9A6F88F-74E0-46CA-AA69-433057AC26E1}" srcOrd="0" destOrd="0" presId="urn:microsoft.com/office/officeart/2008/layout/VerticalCurvedList"/>
+    <dgm:cxn modelId="{F601BFAD-8DE4-4FDB-A45A-838396AA29C2}" type="presParOf" srcId="{E5537B9F-DE05-4E9A-999A-593FB3579CF3}" destId="{032A448C-D769-4F26-8F30-5053CA59B032}" srcOrd="11" destOrd="0" presId="urn:microsoft.com/office/officeart/2008/layout/VerticalCurvedList"/>
+    <dgm:cxn modelId="{E68A9047-15A2-4D5F-86DF-651D2840567D}" type="presParOf" srcId="{E5537B9F-DE05-4E9A-999A-593FB3579CF3}" destId="{A66A1E9D-F8B6-42DF-8CC3-5F31A7851E4B}" srcOrd="12" destOrd="0" presId="urn:microsoft.com/office/officeart/2008/layout/VerticalCurvedList"/>
+    <dgm:cxn modelId="{779E5661-96B3-4997-8B0B-AD56EFD5EC3E}" type="presParOf" srcId="{A66A1E9D-F8B6-42DF-8CC3-5F31A7851E4B}" destId="{C00CE06B-EA27-4F2C-8D38-477FDA3E12BC}" srcOrd="0" destOrd="0" presId="urn:microsoft.com/office/officeart/2008/layout/VerticalCurvedList"/>
+    <dgm:cxn modelId="{D5D88229-CE55-4B19-B101-4C19F82A044D}" type="presParOf" srcId="{E5537B9F-DE05-4E9A-999A-593FB3579CF3}" destId="{B9019D3C-89BD-4A71-B0BB-BF5CB0F79341}" srcOrd="13" destOrd="0" presId="urn:microsoft.com/office/officeart/2008/layout/VerticalCurvedList"/>
+    <dgm:cxn modelId="{DD438D2A-9641-4440-AAB3-53C194E1B3E5}" type="presParOf" srcId="{E5537B9F-DE05-4E9A-999A-593FB3579CF3}" destId="{016845AC-0024-4CED-A3C8-EB5464F124F7}" srcOrd="14" destOrd="0" presId="urn:microsoft.com/office/officeart/2008/layout/VerticalCurvedList"/>
+    <dgm:cxn modelId="{BFD138DD-BC3E-4F8E-AA48-46F7C272E4CF}" type="presParOf" srcId="{016845AC-0024-4CED-A3C8-EB5464F124F7}" destId="{B498C2D0-4057-4B27-A940-BBBCEA638006}" srcOrd="0" destOrd="0" presId="urn:microsoft.com/office/officeart/2008/layout/VerticalCurvedList"/>
   </dgm:cxnLst>
   <dgm:bg/>
   <dgm:whole/>
@@ -1438,14 +1489,14 @@
       </dsp:nvSpPr>
       <dsp:spPr>
         <a:xfrm>
-          <a:off x="-7260584" y="-1110767"/>
-          <a:ext cx="8648093" cy="8648093"/>
+          <a:off x="-7435057" y="-1137349"/>
+          <a:ext cx="8855803" cy="8855803"/>
         </a:xfrm>
         <a:prstGeom prst="blockArc">
           <a:avLst>
             <a:gd name="adj1" fmla="val 18900000"/>
             <a:gd name="adj2" fmla="val 2700000"/>
-            <a:gd name="adj3" fmla="val 250"/>
+            <a:gd name="adj3" fmla="val 244"/>
           </a:avLst>
         </a:prstGeom>
         <a:noFill/>
@@ -1483,8 +1534,8 @@
       </dsp:nvSpPr>
       <dsp:spPr>
         <a:xfrm>
-          <a:off x="450823" y="292151"/>
-          <a:ext cx="8060050" cy="584045"/>
+          <a:off x="461664" y="299176"/>
+          <a:ext cx="8047145" cy="598090"/>
         </a:xfrm>
         <a:prstGeom prst="rect">
           <a:avLst/>
@@ -1525,12 +1576,12 @@
         </a:fontRef>
       </dsp:style>
       <dsp:txBody>
-        <a:bodyPr spcFirstLastPara="0" vert="horz" wrap="square" lIns="463586" tIns="78740" rIns="78740" bIns="78740" numCol="1" spcCol="1270" anchor="ctr" anchorCtr="0">
+        <a:bodyPr spcFirstLastPara="0" vert="horz" wrap="square" lIns="474735" tIns="81280" rIns="81280" bIns="81280" numCol="1" spcCol="1270" anchor="ctr" anchorCtr="0">
           <a:noAutofit/>
         </a:bodyPr>
         <a:lstStyle/>
         <a:p>
-          <a:pPr lvl="0" algn="l" defTabSz="1377950">
+          <a:pPr lvl="0" algn="l" defTabSz="1422400">
             <a:lnSpc>
               <a:spcPct val="90000"/>
             </a:lnSpc>
@@ -1542,15 +1593,15 @@
             </a:spcAft>
           </a:pPr>
           <a:r>
-            <a:rPr lang="en-US" sz="3100" kern="1200" dirty="0" smtClean="0"/>
+            <a:rPr lang="en-US" sz="3200" kern="1200" dirty="0" smtClean="0"/>
             <a:t>Nested Rule</a:t>
           </a:r>
-          <a:endParaRPr lang="en-US" sz="3100" kern="1200" dirty="0"/>
+          <a:endParaRPr lang="en-US" sz="3200" kern="1200" dirty="0"/>
         </a:p>
       </dsp:txBody>
       <dsp:txXfrm>
-        <a:off x="450823" y="292151"/>
-        <a:ext cx="8060050" cy="584045"/>
+        <a:off x="461664" y="299176"/>
+        <a:ext cx="8047145" cy="598090"/>
       </dsp:txXfrm>
     </dsp:sp>
     <dsp:sp modelId="{DD36496A-D057-4746-AE3C-7729F4286BD9}">
@@ -1560,8 +1611,8 @@
       </dsp:nvSpPr>
       <dsp:spPr>
         <a:xfrm>
-          <a:off x="85794" y="219145"/>
-          <a:ext cx="730056" cy="730056"/>
+          <a:off x="87857" y="224415"/>
+          <a:ext cx="747613" cy="747613"/>
         </a:xfrm>
         <a:prstGeom prst="ellipse">
           <a:avLst/>
@@ -1607,8 +1658,8 @@
       </dsp:nvSpPr>
       <dsp:spPr>
         <a:xfrm>
-          <a:off x="979728" y="1168733"/>
-          <a:ext cx="7531144" cy="584045"/>
+          <a:off x="1003289" y="1196839"/>
+          <a:ext cx="7505520" cy="598090"/>
         </a:xfrm>
         <a:prstGeom prst="rect">
           <a:avLst/>
@@ -1649,12 +1700,12 @@
         </a:fontRef>
       </dsp:style>
       <dsp:txBody>
-        <a:bodyPr spcFirstLastPara="0" vert="horz" wrap="square" lIns="463586" tIns="78740" rIns="78740" bIns="78740" numCol="1" spcCol="1270" anchor="ctr" anchorCtr="0">
+        <a:bodyPr spcFirstLastPara="0" vert="horz" wrap="square" lIns="474735" tIns="81280" rIns="81280" bIns="81280" numCol="1" spcCol="1270" anchor="ctr" anchorCtr="0">
           <a:noAutofit/>
         </a:bodyPr>
         <a:lstStyle/>
         <a:p>
-          <a:pPr lvl="0" algn="l" defTabSz="1377950">
+          <a:pPr lvl="0" algn="l" defTabSz="1422400">
             <a:lnSpc>
               <a:spcPct val="90000"/>
             </a:lnSpc>
@@ -1666,15 +1717,15 @@
             </a:spcAft>
           </a:pPr>
           <a:r>
-            <a:rPr lang="en-US" sz="3100" kern="1200" dirty="0" smtClean="0"/>
+            <a:rPr lang="en-US" sz="3200" kern="1200" dirty="0" smtClean="0"/>
             <a:t>Variables</a:t>
           </a:r>
-          <a:endParaRPr lang="en-US" sz="3100" kern="1200" dirty="0"/>
+          <a:endParaRPr lang="en-US" sz="3200" kern="1200" dirty="0"/>
         </a:p>
       </dsp:txBody>
       <dsp:txXfrm>
-        <a:off x="979728" y="1168733"/>
-        <a:ext cx="7531144" cy="584045"/>
+        <a:off x="1003289" y="1196839"/>
+        <a:ext cx="7505520" cy="598090"/>
       </dsp:txXfrm>
     </dsp:sp>
     <dsp:sp modelId="{822F0B8B-6883-4CCB-881A-763886D4AC82}">
@@ -1684,8 +1735,8 @@
       </dsp:nvSpPr>
       <dsp:spPr>
         <a:xfrm>
-          <a:off x="614700" y="1095728"/>
-          <a:ext cx="730056" cy="730056"/>
+          <a:off x="629482" y="1122078"/>
+          <a:ext cx="747613" cy="747613"/>
         </a:xfrm>
         <a:prstGeom prst="ellipse">
           <a:avLst/>
@@ -1731,8 +1782,8 @@
       </dsp:nvSpPr>
       <dsp:spPr>
         <a:xfrm>
-          <a:off x="1167753" y="2012919"/>
-          <a:ext cx="7241306" cy="584045"/>
+          <a:off x="1198742" y="2061325"/>
+          <a:ext cx="7208713" cy="598090"/>
         </a:xfrm>
         <a:prstGeom prst="rect">
           <a:avLst/>
@@ -1773,12 +1824,12 @@
         </a:fontRef>
       </dsp:style>
       <dsp:txBody>
-        <a:bodyPr spcFirstLastPara="0" vert="horz" wrap="square" lIns="463586" tIns="78740" rIns="78740" bIns="78740" numCol="1" spcCol="1270" anchor="ctr" anchorCtr="0">
+        <a:bodyPr spcFirstLastPara="0" vert="horz" wrap="square" lIns="474735" tIns="81280" rIns="81280" bIns="81280" numCol="1" spcCol="1270" anchor="ctr" anchorCtr="0">
           <a:noAutofit/>
         </a:bodyPr>
         <a:lstStyle/>
         <a:p>
-          <a:pPr lvl="0" algn="l" defTabSz="1377950">
+          <a:pPr lvl="0" algn="l" defTabSz="1422400">
             <a:lnSpc>
               <a:spcPct val="90000"/>
             </a:lnSpc>
@@ -1790,19 +1841,19 @@
             </a:spcAft>
           </a:pPr>
           <a:r>
-            <a:rPr lang="en-US" sz="3100" kern="1200" dirty="0" smtClean="0"/>
+            <a:rPr lang="en-US" sz="3200" kern="1200" dirty="0" smtClean="0"/>
             <a:t> </a:t>
           </a:r>
           <a:r>
-            <a:rPr lang="en-US" sz="3100" kern="1200" dirty="0" err="1" smtClean="0"/>
+            <a:rPr lang="en-US" sz="3200" kern="1200" dirty="0" err="1" smtClean="0"/>
             <a:t>Mixins</a:t>
           </a:r>
-          <a:endParaRPr lang="en-US" sz="3100" kern="1200" dirty="0"/>
+          <a:endParaRPr lang="en-US" sz="3200" kern="1200" dirty="0"/>
         </a:p>
       </dsp:txBody>
       <dsp:txXfrm>
-        <a:off x="1167753" y="2012919"/>
-        <a:ext cx="7241306" cy="584045"/>
+        <a:off x="1198742" y="2061325"/>
+        <a:ext cx="7208713" cy="598090"/>
       </dsp:txXfrm>
     </dsp:sp>
     <dsp:sp modelId="{D75F3729-6A9B-48DA-BBBE-143C785BA27D}">
@@ -1812,8 +1863,8 @@
       </dsp:nvSpPr>
       <dsp:spPr>
         <a:xfrm>
-          <a:off x="958562" y="1939910"/>
-          <a:ext cx="730056" cy="730056"/>
+          <a:off x="981613" y="1986561"/>
+          <a:ext cx="747613" cy="747613"/>
         </a:xfrm>
         <a:prstGeom prst="ellipse">
           <a:avLst/>
@@ -1859,8 +1910,8 @@
       </dsp:nvSpPr>
       <dsp:spPr>
         <a:xfrm>
-          <a:off x="1207481" y="2923183"/>
-          <a:ext cx="7148764" cy="584045"/>
+          <a:off x="1240990" y="2993480"/>
+          <a:ext cx="7113945" cy="598090"/>
         </a:xfrm>
         <a:prstGeom prst="rect">
           <a:avLst/>
@@ -1901,12 +1952,12 @@
         </a:fontRef>
       </dsp:style>
       <dsp:txBody>
-        <a:bodyPr spcFirstLastPara="0" vert="horz" wrap="square" lIns="463586" tIns="78740" rIns="78740" bIns="78740" numCol="1" spcCol="1270" anchor="ctr" anchorCtr="0">
+        <a:bodyPr spcFirstLastPara="0" vert="horz" wrap="square" lIns="474735" tIns="81280" rIns="81280" bIns="81280" numCol="1" spcCol="1270" anchor="ctr" anchorCtr="0">
           <a:noAutofit/>
         </a:bodyPr>
         <a:lstStyle/>
         <a:p>
-          <a:pPr lvl="0" algn="l" defTabSz="1377950">
+          <a:pPr lvl="0" algn="l" defTabSz="1422400">
             <a:lnSpc>
               <a:spcPct val="90000"/>
             </a:lnSpc>
@@ -1918,15 +1969,15 @@
             </a:spcAft>
           </a:pPr>
           <a:r>
-            <a:rPr lang="en-US" sz="3100" kern="1200" dirty="0" smtClean="0"/>
+            <a:rPr lang="en-US" sz="3200" kern="1200" dirty="0" smtClean="0"/>
             <a:t>  Extend</a:t>
           </a:r>
-          <a:endParaRPr lang="en-US" sz="3100" kern="1200" dirty="0"/>
+          <a:endParaRPr lang="en-US" sz="3200" kern="1200" dirty="0"/>
         </a:p>
       </dsp:txBody>
       <dsp:txXfrm>
-        <a:off x="1207481" y="2923183"/>
-        <a:ext cx="7148764" cy="584045"/>
+        <a:off x="1240990" y="2993480"/>
+        <a:ext cx="7113945" cy="598090"/>
       </dsp:txXfrm>
     </dsp:sp>
     <dsp:sp modelId="{EC4447CB-F987-4F09-BB25-926D896C3AA0}">
@@ -1936,8 +1987,8 @@
       </dsp:nvSpPr>
       <dsp:spPr>
         <a:xfrm>
-          <a:off x="1051104" y="2816493"/>
-          <a:ext cx="730056" cy="730056"/>
+          <a:off x="1076381" y="2884224"/>
+          <a:ext cx="747613" cy="747613"/>
         </a:xfrm>
         <a:prstGeom prst="ellipse">
           <a:avLst/>
@@ -1983,8 +2034,8 @@
       </dsp:nvSpPr>
       <dsp:spPr>
         <a:xfrm>
-          <a:off x="1355361" y="3752405"/>
-          <a:ext cx="7241306" cy="584045"/>
+          <a:off x="1387954" y="3842643"/>
+          <a:ext cx="7208713" cy="598090"/>
         </a:xfrm>
         <a:prstGeom prst="rect">
           <a:avLst/>
@@ -2025,12 +2076,12 @@
         </a:fontRef>
       </dsp:style>
       <dsp:txBody>
-        <a:bodyPr spcFirstLastPara="0" vert="horz" wrap="square" lIns="463586" tIns="78740" rIns="78740" bIns="78740" numCol="1" spcCol="1270" anchor="ctr" anchorCtr="0">
+        <a:bodyPr spcFirstLastPara="0" vert="horz" wrap="square" lIns="474735" tIns="81280" rIns="81280" bIns="81280" numCol="1" spcCol="1270" anchor="ctr" anchorCtr="0">
           <a:noAutofit/>
         </a:bodyPr>
         <a:lstStyle/>
         <a:p>
-          <a:pPr lvl="0" algn="l" defTabSz="1377950">
+          <a:pPr lvl="0" algn="l" defTabSz="1422400">
             <a:lnSpc>
               <a:spcPct val="90000"/>
             </a:lnSpc>
@@ -2042,19 +2093,15 @@
             </a:spcAft>
           </a:pPr>
           <a:r>
-            <a:rPr lang="en-US" sz="3100" b="0" i="0" kern="1200" dirty="0" smtClean="0"/>
-            <a:t> </a:t>
+            <a:rPr lang="en-US" sz="3200" b="0" i="0" kern="1200" dirty="0" smtClean="0"/>
+            <a:t> Imports</a:t>
           </a:r>
-          <a:r>
-            <a:rPr lang="en-US" sz="3100" b="0" i="0" kern="1200" dirty="0" smtClean="0"/>
-            <a:t>Imports</a:t>
-          </a:r>
-          <a:endParaRPr lang="en-US" sz="3100" kern="1200" dirty="0"/>
+          <a:endParaRPr lang="en-US" sz="3200" kern="1200" dirty="0"/>
         </a:p>
       </dsp:txBody>
       <dsp:txXfrm>
-        <a:off x="1355361" y="3752405"/>
-        <a:ext cx="7241306" cy="584045"/>
+        <a:off x="1387954" y="3842643"/>
+        <a:ext cx="7208713" cy="598090"/>
       </dsp:txXfrm>
     </dsp:sp>
     <dsp:sp modelId="{E9A6F88F-74E0-46CA-AA69-433057AC26E1}">
@@ -2064,8 +2111,8 @@
       </dsp:nvSpPr>
       <dsp:spPr>
         <a:xfrm>
-          <a:off x="958562" y="3693075"/>
-          <a:ext cx="730056" cy="730056"/>
+          <a:off x="981613" y="3781886"/>
+          <a:ext cx="747613" cy="747613"/>
         </a:xfrm>
         <a:prstGeom prst="ellipse">
           <a:avLst/>
@@ -2111,8 +2158,8 @@
       </dsp:nvSpPr>
       <dsp:spPr>
         <a:xfrm>
-          <a:off x="873840" y="4642024"/>
-          <a:ext cx="7531144" cy="584045"/>
+          <a:off x="897761" y="4753655"/>
+          <a:ext cx="7505520" cy="598090"/>
         </a:xfrm>
         <a:prstGeom prst="rect">
           <a:avLst/>
@@ -2153,12 +2200,12 @@
         </a:fontRef>
       </dsp:style>
       <dsp:txBody>
-        <a:bodyPr spcFirstLastPara="0" vert="horz" wrap="square" lIns="463586" tIns="78740" rIns="78740" bIns="78740" numCol="1" spcCol="1270" anchor="ctr" anchorCtr="0">
+        <a:bodyPr spcFirstLastPara="0" vert="horz" wrap="square" lIns="474735" tIns="81280" rIns="81280" bIns="81280" numCol="1" spcCol="1270" anchor="ctr" anchorCtr="0">
           <a:noAutofit/>
         </a:bodyPr>
         <a:lstStyle/>
         <a:p>
-          <a:pPr lvl="0" algn="l" defTabSz="1377950">
+          <a:pPr lvl="0" algn="l" defTabSz="1422400">
             <a:lnSpc>
               <a:spcPct val="90000"/>
             </a:lnSpc>
@@ -2170,15 +2217,19 @@
             </a:spcAft>
           </a:pPr>
           <a:r>
-            <a:rPr lang="en-US" sz="3100" b="0" i="0" kern="1200" dirty="0" smtClean="0"/>
-            <a:t> Operators</a:t>
+            <a:rPr lang="en-US" sz="3200" b="0" i="0" kern="1200" dirty="0" smtClean="0"/>
+            <a:t> </a:t>
           </a:r>
-          <a:endParaRPr lang="en-US" sz="3100" kern="1200" dirty="0"/>
+          <a:r>
+            <a:rPr lang="en-US" sz="3200" b="0" i="0" kern="1200" dirty="0" smtClean="0"/>
+            <a:t>Operators / Maps</a:t>
+          </a:r>
+          <a:endParaRPr lang="en-US" sz="3200" kern="1200" dirty="0"/>
         </a:p>
       </dsp:txBody>
       <dsp:txXfrm>
-        <a:off x="873840" y="4642024"/>
-        <a:ext cx="7531144" cy="584045"/>
+        <a:off x="897761" y="4753655"/>
+        <a:ext cx="7505520" cy="598090"/>
       </dsp:txXfrm>
     </dsp:sp>
     <dsp:sp modelId="{C00CE06B-EA27-4F2C-8D38-477FDA3E12BC}">
@@ -2188,8 +2239,8 @@
       </dsp:nvSpPr>
       <dsp:spPr>
         <a:xfrm>
-          <a:off x="668724" y="4569015"/>
-          <a:ext cx="730056" cy="730056"/>
+          <a:off x="684805" y="4678891"/>
+          <a:ext cx="747613" cy="747613"/>
         </a:xfrm>
         <a:prstGeom prst="ellipse">
           <a:avLst/>
@@ -2228,15 +2279,15 @@
         <a:fontRef idx="minor"/>
       </dsp:style>
     </dsp:sp>
-    <dsp:sp modelId="{787FE31F-FFF2-4CEC-B837-567A2ED533F3}">
+    <dsp:sp modelId="{B9019D3C-89BD-4A71-B0BB-BF5CB0F79341}">
       <dsp:nvSpPr>
         <dsp:cNvPr id="0" name=""/>
         <dsp:cNvSpPr/>
       </dsp:nvSpPr>
       <dsp:spPr>
         <a:xfrm>
-          <a:off x="337498" y="5518606"/>
-          <a:ext cx="8060050" cy="584045"/>
+          <a:off x="348521" y="5651318"/>
+          <a:ext cx="8047145" cy="598090"/>
         </a:xfrm>
         <a:prstGeom prst="rect">
           <a:avLst/>
@@ -2277,12 +2328,12 @@
         </a:fontRef>
       </dsp:style>
       <dsp:txBody>
-        <a:bodyPr spcFirstLastPara="0" vert="horz" wrap="square" lIns="463586" tIns="78740" rIns="78740" bIns="78740" numCol="1" spcCol="1270" anchor="ctr" anchorCtr="0">
+        <a:bodyPr spcFirstLastPara="0" vert="horz" wrap="square" lIns="474735" tIns="81280" rIns="81280" bIns="81280" numCol="1" spcCol="1270" anchor="ctr" anchorCtr="0">
           <a:noAutofit/>
         </a:bodyPr>
         <a:lstStyle/>
         <a:p>
-          <a:pPr lvl="0" algn="l" defTabSz="1377950">
+          <a:pPr lvl="0" algn="l" defTabSz="1422400">
             <a:lnSpc>
               <a:spcPct val="90000"/>
             </a:lnSpc>
@@ -2294,30 +2345,26 @@
             </a:spcAft>
           </a:pPr>
           <a:r>
-            <a:rPr lang="en-US" sz="3100" b="0" i="0" kern="1200" dirty="0" smtClean="0"/>
-            <a:t> </a:t>
+            <a:rPr lang="en-US" sz="3200" b="0" i="0" kern="1200" dirty="0" smtClean="0"/>
+            <a:t> Operators</a:t>
           </a:r>
-          <a:r>
-            <a:rPr lang="en-US" sz="3100" b="1" i="0" kern="1200" dirty="0" smtClean="0"/>
-            <a:t>Control Directives : if,  for, while</a:t>
-          </a:r>
-          <a:endParaRPr lang="en-US" sz="3100" kern="1200" dirty="0"/>
+          <a:endParaRPr lang="en-US" sz="3200" kern="1200" dirty="0"/>
         </a:p>
       </dsp:txBody>
       <dsp:txXfrm>
-        <a:off x="337498" y="5518606"/>
-        <a:ext cx="8060050" cy="584045"/>
+        <a:off x="348521" y="5651318"/>
+        <a:ext cx="8047145" cy="598090"/>
       </dsp:txXfrm>
     </dsp:sp>
-    <dsp:sp modelId="{F8EB65F1-EDE9-48E4-88DB-107955061843}">
+    <dsp:sp modelId="{B498C2D0-4057-4B27-A940-BBBCEA638006}">
       <dsp:nvSpPr>
         <dsp:cNvPr id="0" name=""/>
         <dsp:cNvSpPr/>
       </dsp:nvSpPr>
       <dsp:spPr>
         <a:xfrm>
-          <a:off x="139818" y="5445597"/>
-          <a:ext cx="730056" cy="730056"/>
+          <a:off x="143181" y="5576553"/>
+          <a:ext cx="747613" cy="747613"/>
         </a:xfrm>
         <a:prstGeom prst="ellipse">
           <a:avLst/>
@@ -5394,7 +5441,7 @@
           <a:p>
             <a:fld id="{01F6EE37-2FFC-4AE8-81E7-66F522072752}" type="datetimeFigureOut">
               <a:rPr lang="en-US" smtClean="0"/>
-              <a:t>2/28/2020</a:t>
+              <a:t>3/6/2020</a:t>
             </a:fld>
             <a:endParaRPr lang="en-US"/>
           </a:p>
@@ -5645,7 +5692,7 @@
           <a:p>
             <a:fld id="{01F6EE37-2FFC-4AE8-81E7-66F522072752}" type="datetimeFigureOut">
               <a:rPr lang="en-US" smtClean="0"/>
-              <a:t>2/28/2020</a:t>
+              <a:t>3/6/2020</a:t>
             </a:fld>
             <a:endParaRPr lang="en-US"/>
           </a:p>
@@ -5959,7 +6006,7 @@
           <a:p>
             <a:fld id="{01F6EE37-2FFC-4AE8-81E7-66F522072752}" type="datetimeFigureOut">
               <a:rPr lang="en-US" smtClean="0"/>
-              <a:t>2/28/2020</a:t>
+              <a:t>3/6/2020</a:t>
             </a:fld>
             <a:endParaRPr lang="en-US"/>
           </a:p>
@@ -6300,7 +6347,7 @@
           <a:p>
             <a:fld id="{01F6EE37-2FFC-4AE8-81E7-66F522072752}" type="datetimeFigureOut">
               <a:rPr lang="en-US" smtClean="0"/>
-              <a:t>2/28/2020</a:t>
+              <a:t>3/6/2020</a:t>
             </a:fld>
             <a:endParaRPr lang="en-US"/>
           </a:p>
@@ -6614,7 +6661,7 @@
           <a:p>
             <a:fld id="{01F6EE37-2FFC-4AE8-81E7-66F522072752}" type="datetimeFigureOut">
               <a:rPr lang="en-US" smtClean="0"/>
-              <a:t>2/28/2020</a:t>
+              <a:t>3/6/2020</a:t>
             </a:fld>
             <a:endParaRPr lang="en-US"/>
           </a:p>
@@ -7007,7 +7054,7 @@
           <a:p>
             <a:fld id="{01F6EE37-2FFC-4AE8-81E7-66F522072752}" type="datetimeFigureOut">
               <a:rPr lang="en-US" smtClean="0"/>
-              <a:t>2/28/2020</a:t>
+              <a:t>3/6/2020</a:t>
             </a:fld>
             <a:endParaRPr lang="en-US"/>
           </a:p>
@@ -7177,7 +7224,7 @@
           <a:p>
             <a:fld id="{01F6EE37-2FFC-4AE8-81E7-66F522072752}" type="datetimeFigureOut">
               <a:rPr lang="en-US" smtClean="0"/>
-              <a:t>2/28/2020</a:t>
+              <a:t>3/6/2020</a:t>
             </a:fld>
             <a:endParaRPr lang="en-US"/>
           </a:p>
@@ -7357,7 +7404,7 @@
           <a:p>
             <a:fld id="{01F6EE37-2FFC-4AE8-81E7-66F522072752}" type="datetimeFigureOut">
               <a:rPr lang="en-US" smtClean="0"/>
-              <a:t>2/28/2020</a:t>
+              <a:t>3/6/2020</a:t>
             </a:fld>
             <a:endParaRPr lang="en-US"/>
           </a:p>
@@ -7533,7 +7580,7 @@
           <a:p>
             <a:fld id="{01F6EE37-2FFC-4AE8-81E7-66F522072752}" type="datetimeFigureOut">
               <a:rPr lang="en-US" smtClean="0"/>
-              <a:t>2/28/2020</a:t>
+              <a:t>3/6/2020</a:t>
             </a:fld>
             <a:endParaRPr lang="en-US"/>
           </a:p>
@@ -7780,7 +7827,7 @@
           <a:p>
             <a:fld id="{01F6EE37-2FFC-4AE8-81E7-66F522072752}" type="datetimeFigureOut">
               <a:rPr lang="en-US" smtClean="0"/>
-              <a:t>2/28/2020</a:t>
+              <a:t>3/6/2020</a:t>
             </a:fld>
             <a:endParaRPr lang="en-US"/>
           </a:p>
@@ -8012,7 +8059,7 @@
           <a:p>
             <a:fld id="{01F6EE37-2FFC-4AE8-81E7-66F522072752}" type="datetimeFigureOut">
               <a:rPr lang="en-US" smtClean="0"/>
-              <a:t>2/28/2020</a:t>
+              <a:t>3/6/2020</a:t>
             </a:fld>
             <a:endParaRPr lang="en-US"/>
           </a:p>
@@ -8386,7 +8433,7 @@
           <a:p>
             <a:fld id="{01F6EE37-2FFC-4AE8-81E7-66F522072752}" type="datetimeFigureOut">
               <a:rPr lang="en-US" smtClean="0"/>
-              <a:t>2/28/2020</a:t>
+              <a:t>3/6/2020</a:t>
             </a:fld>
             <a:endParaRPr lang="en-US"/>
           </a:p>
@@ -8509,7 +8556,7 @@
           <a:p>
             <a:fld id="{01F6EE37-2FFC-4AE8-81E7-66F522072752}" type="datetimeFigureOut">
               <a:rPr lang="en-US" smtClean="0"/>
-              <a:t>2/28/2020</a:t>
+              <a:t>3/6/2020</a:t>
             </a:fld>
             <a:endParaRPr lang="en-US"/>
           </a:p>
@@ -8604,7 +8651,7 @@
           <a:p>
             <a:fld id="{01F6EE37-2FFC-4AE8-81E7-66F522072752}" type="datetimeFigureOut">
               <a:rPr lang="en-US" smtClean="0"/>
-              <a:t>2/28/2020</a:t>
+              <a:t>3/6/2020</a:t>
             </a:fld>
             <a:endParaRPr lang="en-US"/>
           </a:p>
@@ -8859,7 +8906,7 @@
           <a:p>
             <a:fld id="{01F6EE37-2FFC-4AE8-81E7-66F522072752}" type="datetimeFigureOut">
               <a:rPr lang="en-US" smtClean="0"/>
-              <a:t>2/28/2020</a:t>
+              <a:t>3/6/2020</a:t>
             </a:fld>
             <a:endParaRPr lang="en-US"/>
           </a:p>
@@ -9122,7 +9169,7 @@
           <a:p>
             <a:fld id="{01F6EE37-2FFC-4AE8-81E7-66F522072752}" type="datetimeFigureOut">
               <a:rPr lang="en-US" smtClean="0"/>
-              <a:t>2/28/2020</a:t>
+              <a:t>3/6/2020</a:t>
             </a:fld>
             <a:endParaRPr lang="en-US"/>
           </a:p>
@@ -9873,7 +9920,7 @@
           <a:p>
             <a:fld id="{01F6EE37-2FFC-4AE8-81E7-66F522072752}" type="datetimeFigureOut">
               <a:rPr lang="en-US" smtClean="0"/>
-              <a:t>2/28/2020</a:t>
+              <a:t>3/6/2020</a:t>
             </a:fld>
             <a:endParaRPr lang="en-US"/>
           </a:p>
@@ -10427,7 +10474,7 @@
         </p:blipFill>
         <p:spPr>
           <a:xfrm>
-            <a:off x="379829" y="647114"/>
+            <a:off x="392707" y="685751"/>
             <a:ext cx="9087729" cy="4811149"/>
           </a:xfrm>
           <a:prstGeom prst="rect">
@@ -10435,6 +10482,58 @@
           </a:prstGeom>
         </p:spPr>
       </p:pic>
+      <p:sp>
+        <p:nvSpPr>
+          <p:cNvPr id="2" name="TextBox 1"/>
+          <p:cNvSpPr txBox="1"/>
+          <p:nvPr/>
+        </p:nvSpPr>
+        <p:spPr>
+          <a:xfrm>
+            <a:off x="1365161" y="6284890"/>
+            <a:ext cx="2225289" cy="461665"/>
+          </a:xfrm>
+          <a:prstGeom prst="rect">
+            <a:avLst/>
+          </a:prstGeom>
+          <a:noFill/>
+        </p:spPr>
+        <p:txBody>
+          <a:bodyPr wrap="none" rtlCol="0">
+            <a:spAutoFit/>
+          </a:bodyPr>
+          <a:lstStyle/>
+          <a:p>
+            <a:r>
+              <a:rPr lang="en-US" sz="2400" dirty="0" err="1" smtClean="0">
+                <a:solidFill>
+                  <a:srgbClr val="FF0000"/>
+                </a:solidFill>
+                <a:latin typeface="Times New Roman" panose="02020603050405020304" pitchFamily="18" charset="0"/>
+                <a:cs typeface="Times New Roman" panose="02020603050405020304" pitchFamily="18" charset="0"/>
+              </a:rPr>
+              <a:t>Dương</a:t>
+            </a:r>
+            <a:r>
+              <a:rPr lang="en-US" sz="2400" dirty="0" smtClean="0">
+                <a:solidFill>
+                  <a:srgbClr val="FF0000"/>
+                </a:solidFill>
+                <a:latin typeface="Times New Roman" panose="02020603050405020304" pitchFamily="18" charset="0"/>
+                <a:cs typeface="Times New Roman" panose="02020603050405020304" pitchFamily="18" charset="0"/>
+              </a:rPr>
+              <a:t> Quý Cao</a:t>
+            </a:r>
+            <a:endParaRPr lang="en-US" sz="2400" dirty="0">
+              <a:solidFill>
+                <a:srgbClr val="FF0000"/>
+              </a:solidFill>
+              <a:latin typeface="Times New Roman" panose="02020603050405020304" pitchFamily="18" charset="0"/>
+              <a:cs typeface="Times New Roman" panose="02020603050405020304" pitchFamily="18" charset="0"/>
+            </a:endParaRPr>
+          </a:p>
+        </p:txBody>
+      </p:sp>
     </p:spTree>
     <p:extLst>
       <p:ext uri="{BB962C8B-B14F-4D97-AF65-F5344CB8AC3E}">
@@ -11814,6 +11913,475 @@
             <p:ph type="title"/>
           </p:nvPr>
         </p:nvSpPr>
+        <p:spPr/>
+        <p:txBody>
+          <a:bodyPr>
+            <a:noAutofit/>
+          </a:bodyPr>
+          <a:lstStyle/>
+          <a:p>
+            <a:r>
+              <a:rPr lang="en-US" sz="6000" b="1" dirty="0" smtClean="0">
+                <a:solidFill>
+                  <a:srgbClr val="0070C0"/>
+                </a:solidFill>
+                <a:latin typeface="Times New Roman" panose="02020603050405020304" pitchFamily="18" charset="0"/>
+                <a:cs typeface="Times New Roman" panose="02020603050405020304" pitchFamily="18" charset="0"/>
+              </a:rPr>
+              <a:t>Maps</a:t>
+            </a:r>
+            <a:r>
+              <a:rPr lang="en-US" sz="6000" dirty="0"/>
+              <a:t/>
+            </a:r>
+            <a:br>
+              <a:rPr lang="en-US" sz="6000" dirty="0"/>
+            </a:br>
+            <a:endParaRPr lang="en-US" sz="6000" dirty="0"/>
+          </a:p>
+        </p:txBody>
+      </p:sp>
+      <p:sp>
+        <p:nvSpPr>
+          <p:cNvPr id="3" name="Content Placeholder 2"/>
+          <p:cNvSpPr>
+            <a:spLocks noGrp="1"/>
+          </p:cNvSpPr>
+          <p:nvPr>
+            <p:ph idx="1"/>
+          </p:nvPr>
+        </p:nvSpPr>
+        <p:spPr>
+          <a:xfrm>
+            <a:off x="677333" y="1759913"/>
+            <a:ext cx="10836379" cy="1342465"/>
+          </a:xfrm>
+        </p:spPr>
+        <p:txBody>
+          <a:bodyPr>
+            <a:normAutofit/>
+          </a:bodyPr>
+          <a:lstStyle/>
+          <a:p>
+            <a:r>
+              <a:rPr lang="en-US" sz="3200" dirty="0" smtClean="0">
+                <a:latin typeface="Times New Roman" panose="02020603050405020304" pitchFamily="18" charset="0"/>
+                <a:cs typeface="Times New Roman" panose="02020603050405020304" pitchFamily="18" charset="0"/>
+              </a:rPr>
+              <a:t>Maps </a:t>
+            </a:r>
+            <a:r>
+              <a:rPr lang="vi-VN" sz="3200" dirty="0" smtClean="0">
+                <a:latin typeface="Times New Roman" panose="02020603050405020304" pitchFamily="18" charset="0"/>
+                <a:cs typeface="Times New Roman" panose="02020603050405020304" pitchFamily="18" charset="0"/>
+              </a:rPr>
+              <a:t>trong </a:t>
+            </a:r>
+            <a:r>
+              <a:rPr lang="vi-VN" sz="3200" dirty="0">
+                <a:latin typeface="Times New Roman" panose="02020603050405020304" pitchFamily="18" charset="0"/>
+                <a:cs typeface="Times New Roman" panose="02020603050405020304" pitchFamily="18" charset="0"/>
+              </a:rPr>
+              <a:t>Sass chứa các </a:t>
+            </a:r>
+            <a:r>
+              <a:rPr lang="en-US" sz="3200" dirty="0" smtClean="0">
+                <a:latin typeface="Times New Roman" panose="02020603050405020304" pitchFamily="18" charset="0"/>
+                <a:cs typeface="Times New Roman" panose="02020603050405020304" pitchFamily="18" charset="0"/>
+              </a:rPr>
+              <a:t>key </a:t>
+            </a:r>
+            <a:r>
+              <a:rPr lang="vi-VN" sz="3200" dirty="0" smtClean="0">
+                <a:latin typeface="Times New Roman" panose="02020603050405020304" pitchFamily="18" charset="0"/>
+                <a:cs typeface="Times New Roman" panose="02020603050405020304" pitchFamily="18" charset="0"/>
+              </a:rPr>
+              <a:t>và </a:t>
+            </a:r>
+            <a:r>
+              <a:rPr lang="en-US" sz="3200" dirty="0" smtClean="0">
+                <a:latin typeface="Times New Roman" panose="02020603050405020304" pitchFamily="18" charset="0"/>
+                <a:cs typeface="Times New Roman" panose="02020603050405020304" pitchFamily="18" charset="0"/>
+              </a:rPr>
+              <a:t>value</a:t>
+            </a:r>
+            <a:r>
+              <a:rPr lang="vi-VN" sz="3200" dirty="0" smtClean="0">
+                <a:latin typeface="Times New Roman" panose="02020603050405020304" pitchFamily="18" charset="0"/>
+                <a:cs typeface="Times New Roman" panose="02020603050405020304" pitchFamily="18" charset="0"/>
+              </a:rPr>
+              <a:t> </a:t>
+            </a:r>
+            <a:r>
+              <a:rPr lang="vi-VN" sz="3200" dirty="0">
+                <a:latin typeface="Times New Roman" panose="02020603050405020304" pitchFamily="18" charset="0"/>
+                <a:cs typeface="Times New Roman" panose="02020603050405020304" pitchFamily="18" charset="0"/>
+              </a:rPr>
+              <a:t>giúp bạn dễ dàng tìm kiếm một giá trị bằng khóa tương ứng</a:t>
+            </a:r>
+            <a:endParaRPr lang="en-US" sz="3200" dirty="0">
+              <a:latin typeface="Times New Roman" panose="02020603050405020304" pitchFamily="18" charset="0"/>
+              <a:cs typeface="Times New Roman" panose="02020603050405020304" pitchFamily="18" charset="0"/>
+            </a:endParaRPr>
+          </a:p>
+        </p:txBody>
+      </p:sp>
+      <p:pic>
+        <p:nvPicPr>
+          <p:cNvPr id="4" name="Picture 3"/>
+          <p:cNvPicPr>
+            <a:picLocks noChangeAspect="1"/>
+          </p:cNvPicPr>
+          <p:nvPr/>
+        </p:nvPicPr>
+        <p:blipFill>
+          <a:blip r:embed="rId2">
+            <a:extLst>
+              <a:ext uri="{28A0092B-C50C-407E-A947-70E740481C1C}">
+                <a14:useLocalDpi xmlns:a14="http://schemas.microsoft.com/office/drawing/2010/main" val="0"/>
+              </a:ext>
+            </a:extLst>
+          </a:blip>
+          <a:stretch>
+            <a:fillRect/>
+          </a:stretch>
+        </p:blipFill>
+        <p:spPr>
+          <a:xfrm>
+            <a:off x="2032032" y="3080713"/>
+            <a:ext cx="7241970" cy="3590543"/>
+          </a:xfrm>
+          <a:prstGeom prst="rect">
+            <a:avLst/>
+          </a:prstGeom>
+        </p:spPr>
+      </p:pic>
+    </p:spTree>
+    <p:extLst>
+      <p:ext uri="{BB962C8B-B14F-4D97-AF65-F5344CB8AC3E}">
+        <p14:creationId xmlns:p14="http://schemas.microsoft.com/office/powerpoint/2010/main" val="260583218"/>
+      </p:ext>
+    </p:extLst>
+  </p:cSld>
+  <p:clrMapOvr>
+    <a:masterClrMapping/>
+  </p:clrMapOvr>
+  <p:transition spd="slow">
+    <p:push dir="u"/>
+  </p:transition>
+  <p:timing>
+    <p:tnLst>
+      <p:par>
+        <p:cTn id="1" dur="indefinite" restart="never" nodeType="tmRoot">
+          <p:childTnLst>
+            <p:seq concurrent="1" nextAc="seek">
+              <p:cTn id="2" dur="indefinite" nodeType="mainSeq">
+                <p:childTnLst>
+                  <p:par>
+                    <p:cTn id="3" fill="hold">
+                      <p:stCondLst>
+                        <p:cond delay="indefinite"/>
+                      </p:stCondLst>
+                      <p:childTnLst>
+                        <p:par>
+                          <p:cTn id="4" fill="hold">
+                            <p:stCondLst>
+                              <p:cond delay="0"/>
+                            </p:stCondLst>
+                            <p:childTnLst>
+                              <p:par>
+                                <p:cTn id="5" presetID="16" presetClass="entr" presetSubtype="21" fill="hold" grpId="0" nodeType="clickEffect">
+                                  <p:stCondLst>
+                                    <p:cond delay="0"/>
+                                  </p:stCondLst>
+                                  <p:childTnLst>
+                                    <p:set>
+                                      <p:cBhvr>
+                                        <p:cTn id="6" dur="1" fill="hold">
+                                          <p:stCondLst>
+                                            <p:cond delay="0"/>
+                                          </p:stCondLst>
+                                        </p:cTn>
+                                        <p:tgtEl>
+                                          <p:spTgt spid="2"/>
+                                        </p:tgtEl>
+                                        <p:attrNameLst>
+                                          <p:attrName>style.visibility</p:attrName>
+                                        </p:attrNameLst>
+                                      </p:cBhvr>
+                                      <p:to>
+                                        <p:strVal val="visible"/>
+                                      </p:to>
+                                    </p:set>
+                                    <p:animEffect transition="in" filter="barn(inVertical)">
+                                      <p:cBhvr>
+                                        <p:cTn id="7" dur="500"/>
+                                        <p:tgtEl>
+                                          <p:spTgt spid="2"/>
+                                        </p:tgtEl>
+                                      </p:cBhvr>
+                                    </p:animEffect>
+                                  </p:childTnLst>
+                                </p:cTn>
+                              </p:par>
+                            </p:childTnLst>
+                          </p:cTn>
+                        </p:par>
+                      </p:childTnLst>
+                    </p:cTn>
+                  </p:par>
+                  <p:par>
+                    <p:cTn id="8" fill="hold">
+                      <p:stCondLst>
+                        <p:cond delay="indefinite"/>
+                      </p:stCondLst>
+                      <p:childTnLst>
+                        <p:par>
+                          <p:cTn id="9" fill="hold">
+                            <p:stCondLst>
+                              <p:cond delay="0"/>
+                            </p:stCondLst>
+                            <p:childTnLst>
+                              <p:par>
+                                <p:cTn id="10" presetID="42" presetClass="entr" presetSubtype="0" fill="hold" grpId="0" nodeType="clickEffect">
+                                  <p:stCondLst>
+                                    <p:cond delay="0"/>
+                                  </p:stCondLst>
+                                  <p:childTnLst>
+                                    <p:set>
+                                      <p:cBhvr>
+                                        <p:cTn id="11" dur="1" fill="hold">
+                                          <p:stCondLst>
+                                            <p:cond delay="0"/>
+                                          </p:stCondLst>
+                                        </p:cTn>
+                                        <p:tgtEl>
+                                          <p:spTgt spid="3">
+                                            <p:txEl>
+                                              <p:pRg st="0" end="0"/>
+                                            </p:txEl>
+                                          </p:spTgt>
+                                        </p:tgtEl>
+                                        <p:attrNameLst>
+                                          <p:attrName>style.visibility</p:attrName>
+                                        </p:attrNameLst>
+                                      </p:cBhvr>
+                                      <p:to>
+                                        <p:strVal val="visible"/>
+                                      </p:to>
+                                    </p:set>
+                                    <p:animEffect transition="in" filter="fade">
+                                      <p:cBhvr>
+                                        <p:cTn id="12" dur="1000"/>
+                                        <p:tgtEl>
+                                          <p:spTgt spid="3">
+                                            <p:txEl>
+                                              <p:pRg st="0" end="0"/>
+                                            </p:txEl>
+                                          </p:spTgt>
+                                        </p:tgtEl>
+                                      </p:cBhvr>
+                                    </p:animEffect>
+                                    <p:anim calcmode="lin" valueType="num">
+                                      <p:cBhvr>
+                                        <p:cTn id="13" dur="1000" fill="hold"/>
+                                        <p:tgtEl>
+                                          <p:spTgt spid="3">
+                                            <p:txEl>
+                                              <p:pRg st="0" end="0"/>
+                                            </p:txEl>
+                                          </p:spTgt>
+                                        </p:tgtEl>
+                                        <p:attrNameLst>
+                                          <p:attrName>ppt_x</p:attrName>
+                                        </p:attrNameLst>
+                                      </p:cBhvr>
+                                      <p:tavLst>
+                                        <p:tav tm="0">
+                                          <p:val>
+                                            <p:strVal val="#ppt_x"/>
+                                          </p:val>
+                                        </p:tav>
+                                        <p:tav tm="100000">
+                                          <p:val>
+                                            <p:strVal val="#ppt_x"/>
+                                          </p:val>
+                                        </p:tav>
+                                      </p:tavLst>
+                                    </p:anim>
+                                    <p:anim calcmode="lin" valueType="num">
+                                      <p:cBhvr>
+                                        <p:cTn id="14" dur="1000" fill="hold"/>
+                                        <p:tgtEl>
+                                          <p:spTgt spid="3">
+                                            <p:txEl>
+                                              <p:pRg st="0" end="0"/>
+                                            </p:txEl>
+                                          </p:spTgt>
+                                        </p:tgtEl>
+                                        <p:attrNameLst>
+                                          <p:attrName>ppt_y</p:attrName>
+                                        </p:attrNameLst>
+                                      </p:cBhvr>
+                                      <p:tavLst>
+                                        <p:tav tm="0">
+                                          <p:val>
+                                            <p:strVal val="#ppt_y+.1"/>
+                                          </p:val>
+                                        </p:tav>
+                                        <p:tav tm="100000">
+                                          <p:val>
+                                            <p:strVal val="#ppt_y"/>
+                                          </p:val>
+                                        </p:tav>
+                                      </p:tavLst>
+                                    </p:anim>
+                                  </p:childTnLst>
+                                </p:cTn>
+                              </p:par>
+                              <p:par>
+                                <p:cTn id="15" presetID="42" presetClass="entr" presetSubtype="0" fill="hold" nodeType="withEffect">
+                                  <p:stCondLst>
+                                    <p:cond delay="0"/>
+                                  </p:stCondLst>
+                                  <p:childTnLst>
+                                    <p:set>
+                                      <p:cBhvr>
+                                        <p:cTn id="16" dur="1" fill="hold">
+                                          <p:stCondLst>
+                                            <p:cond delay="0"/>
+                                          </p:stCondLst>
+                                        </p:cTn>
+                                        <p:tgtEl>
+                                          <p:spTgt spid="4"/>
+                                        </p:tgtEl>
+                                        <p:attrNameLst>
+                                          <p:attrName>style.visibility</p:attrName>
+                                        </p:attrNameLst>
+                                      </p:cBhvr>
+                                      <p:to>
+                                        <p:strVal val="visible"/>
+                                      </p:to>
+                                    </p:set>
+                                    <p:animEffect transition="in" filter="fade">
+                                      <p:cBhvr>
+                                        <p:cTn id="17" dur="1000"/>
+                                        <p:tgtEl>
+                                          <p:spTgt spid="4"/>
+                                        </p:tgtEl>
+                                      </p:cBhvr>
+                                    </p:animEffect>
+                                    <p:anim calcmode="lin" valueType="num">
+                                      <p:cBhvr>
+                                        <p:cTn id="18" dur="1000" fill="hold"/>
+                                        <p:tgtEl>
+                                          <p:spTgt spid="4"/>
+                                        </p:tgtEl>
+                                        <p:attrNameLst>
+                                          <p:attrName>ppt_x</p:attrName>
+                                        </p:attrNameLst>
+                                      </p:cBhvr>
+                                      <p:tavLst>
+                                        <p:tav tm="0">
+                                          <p:val>
+                                            <p:strVal val="#ppt_x"/>
+                                          </p:val>
+                                        </p:tav>
+                                        <p:tav tm="100000">
+                                          <p:val>
+                                            <p:strVal val="#ppt_x"/>
+                                          </p:val>
+                                        </p:tav>
+                                      </p:tavLst>
+                                    </p:anim>
+                                    <p:anim calcmode="lin" valueType="num">
+                                      <p:cBhvr>
+                                        <p:cTn id="19" dur="1000" fill="hold"/>
+                                        <p:tgtEl>
+                                          <p:spTgt spid="4"/>
+                                        </p:tgtEl>
+                                        <p:attrNameLst>
+                                          <p:attrName>ppt_y</p:attrName>
+                                        </p:attrNameLst>
+                                      </p:cBhvr>
+                                      <p:tavLst>
+                                        <p:tav tm="0">
+                                          <p:val>
+                                            <p:strVal val="#ppt_y+.1"/>
+                                          </p:val>
+                                        </p:tav>
+                                        <p:tav tm="100000">
+                                          <p:val>
+                                            <p:strVal val="#ppt_y"/>
+                                          </p:val>
+                                        </p:tav>
+                                      </p:tavLst>
+                                    </p:anim>
+                                  </p:childTnLst>
+                                </p:cTn>
+                              </p:par>
+                            </p:childTnLst>
+                          </p:cTn>
+                        </p:par>
+                      </p:childTnLst>
+                    </p:cTn>
+                  </p:par>
+                </p:childTnLst>
+              </p:cTn>
+              <p:prevCondLst>
+                <p:cond evt="onPrev" delay="0">
+                  <p:tgtEl>
+                    <p:sldTgt/>
+                  </p:tgtEl>
+                </p:cond>
+              </p:prevCondLst>
+              <p:nextCondLst>
+                <p:cond evt="onNext" delay="0">
+                  <p:tgtEl>
+                    <p:sldTgt/>
+                  </p:tgtEl>
+                </p:cond>
+              </p:nextCondLst>
+            </p:seq>
+          </p:childTnLst>
+        </p:cTn>
+      </p:par>
+    </p:tnLst>
+    <p:bldLst>
+      <p:bldP spid="2" grpId="0"/>
+      <p:bldP spid="3" grpId="0" build="p"/>
+    </p:bldLst>
+  </p:timing>
+</p:sld>
+</file>
+
+<file path=ppt/slides/slide13.xml><?xml version="1.0" encoding="utf-8"?>
+<p:sld xmlns:a="http://schemas.openxmlformats.org/drawingml/2006/main" xmlns:r="http://schemas.openxmlformats.org/officeDocument/2006/relationships" xmlns:p="http://schemas.openxmlformats.org/presentationml/2006/main">
+  <p:cSld>
+    <p:spTree>
+      <p:nvGrpSpPr>
+        <p:cNvPr id="1" name=""/>
+        <p:cNvGrpSpPr/>
+        <p:nvPr/>
+      </p:nvGrpSpPr>
+      <p:grpSpPr>
+        <a:xfrm>
+          <a:off x="0" y="0"/>
+          <a:ext cx="0" cy="0"/>
+          <a:chOff x="0" y="0"/>
+          <a:chExt cx="0" cy="0"/>
+        </a:xfrm>
+      </p:grpSpPr>
+      <p:sp>
+        <p:nvSpPr>
+          <p:cNvPr id="2" name="Title 1"/>
+          <p:cNvSpPr>
+            <a:spLocks noGrp="1"/>
+          </p:cNvSpPr>
+          <p:nvPr>
+            <p:ph type="title"/>
+          </p:nvPr>
+        </p:nvSpPr>
         <p:spPr>
           <a:xfrm>
             <a:off x="677334" y="519448"/>
@@ -11997,13 +12565,13 @@
   <p:clrMapOvr>
     <a:masterClrMapping/>
   </p:clrMapOvr>
-  <mc:AlternateContent xmlns:mc="http://schemas.openxmlformats.org/markup-compatibility/2006">
-    <mc:Choice xmlns:p14="http://schemas.microsoft.com/office/powerpoint/2010/main" Requires="p14">
+  <mc:AlternateContent xmlns:mc="http://schemas.openxmlformats.org/markup-compatibility/2006" xmlns:p14="http://schemas.microsoft.com/office/powerpoint/2010/main">
+    <mc:Choice Requires="p14">
       <p:transition spd="slow" p14:dur="2000">
         <p:split orient="vert"/>
       </p:transition>
     </mc:Choice>
-    <mc:Fallback>
+    <mc:Fallback xmlns="">
       <p:transition spd="slow">
         <p:split orient="vert"/>
       </p:transition>
@@ -12440,7 +13008,7 @@
 </p:sld>
 </file>
 
-<file path=ppt/slides/slide13.xml><?xml version="1.0" encoding="utf-8"?>
+<file path=ppt/slides/slide14.xml><?xml version="1.0" encoding="utf-8"?>
 <p:sld xmlns:a="http://schemas.openxmlformats.org/drawingml/2006/main" xmlns:r="http://schemas.openxmlformats.org/officeDocument/2006/relationships" xmlns:p="http://schemas.openxmlformats.org/presentationml/2006/main">
   <p:cSld>
     <p:spTree>
@@ -12809,10 +13377,6 @@
               </a:rPr>
               <a:t> from &lt;start&gt; to &lt;end&gt;</a:t>
             </a:r>
-            <a:endParaRPr lang="en-US" dirty="0">
-              <a:latin typeface="Times New Roman" panose="02020603050405020304" pitchFamily="18" charset="0"/>
-              <a:cs typeface="Times New Roman" panose="02020603050405020304" pitchFamily="18" charset="0"/>
-            </a:endParaRPr>
           </a:p>
         </p:txBody>
       </p:sp>
@@ -12906,11 +13470,11 @@
   <p:clrMapOvr>
     <a:masterClrMapping/>
   </p:clrMapOvr>
-  <mc:AlternateContent xmlns:mc="http://schemas.openxmlformats.org/markup-compatibility/2006">
-    <mc:Choice xmlns:p14="http://schemas.microsoft.com/office/powerpoint/2010/main" Requires="p14">
+  <mc:AlternateContent xmlns:mc="http://schemas.openxmlformats.org/markup-compatibility/2006" xmlns:p14="http://schemas.microsoft.com/office/powerpoint/2010/main">
+    <mc:Choice Requires="p14">
       <p:transition spd="slow" p14:dur="2000"/>
     </mc:Choice>
-    <mc:Fallback>
+    <mc:Fallback xmlns="">
       <p:transition spd="slow"/>
     </mc:Fallback>
   </mc:AlternateContent>
@@ -13807,7 +14371,7 @@
 </p:sld>
 </file>
 
-<file path=ppt/slides/slide14.xml><?xml version="1.0" encoding="utf-8"?>
+<file path=ppt/slides/slide15.xml><?xml version="1.0" encoding="utf-8"?>
 <p:sld xmlns:a="http://schemas.openxmlformats.org/drawingml/2006/main" xmlns:r="http://schemas.openxmlformats.org/officeDocument/2006/relationships" xmlns:p="http://schemas.openxmlformats.org/presentationml/2006/main">
   <p:cSld>
     <p:spTree>
@@ -14701,7 +15265,7 @@
 </p:sld>
 </file>
 
-<file path=ppt/slides/slide15.xml><?xml version="1.0" encoding="utf-8"?>
+<file path=ppt/slides/slide16.xml><?xml version="1.0" encoding="utf-8"?>
 <p:sld xmlns:a="http://schemas.openxmlformats.org/drawingml/2006/main" xmlns:r="http://schemas.openxmlformats.org/officeDocument/2006/relationships" xmlns:p="http://schemas.openxmlformats.org/presentationml/2006/main">
   <p:cSld>
     <p:spTree>
@@ -14976,1631 +15540,6 @@
           <a:chExt cx="0" cy="0"/>
         </a:xfrm>
       </p:grpSpPr>
-      <p:sp>
-        <p:nvSpPr>
-          <p:cNvPr id="2" name="Title 1"/>
-          <p:cNvSpPr>
-            <a:spLocks noGrp="1"/>
-          </p:cNvSpPr>
-          <p:nvPr>
-            <p:ph type="title"/>
-          </p:nvPr>
-        </p:nvSpPr>
-        <p:spPr/>
-        <p:txBody>
-          <a:bodyPr>
-            <a:noAutofit/>
-          </a:bodyPr>
-          <a:lstStyle/>
-          <a:p>
-            <a:r>
-              <a:rPr lang="en-US" sz="6000" b="1" dirty="0">
-                <a:solidFill>
-                  <a:srgbClr val="0070C0"/>
-                </a:solidFill>
-                <a:latin typeface="Times New Roman" panose="02020603050405020304" pitchFamily="18" charset="0"/>
-                <a:cs typeface="Times New Roman" panose="02020603050405020304" pitchFamily="18" charset="0"/>
-              </a:rPr>
-              <a:t>CSS Preprocessor</a:t>
-            </a:r>
-            <a:r>
-              <a:rPr lang="en-US" sz="4800" b="1" dirty="0">
-                <a:solidFill>
-                  <a:srgbClr val="0070C0"/>
-                </a:solidFill>
-              </a:rPr>
-              <a:t/>
-            </a:r>
-            <a:br>
-              <a:rPr lang="en-US" sz="4800" b="1" dirty="0">
-                <a:solidFill>
-                  <a:srgbClr val="0070C0"/>
-                </a:solidFill>
-              </a:rPr>
-            </a:br>
-            <a:endParaRPr lang="en-US" sz="4800" dirty="0">
-              <a:solidFill>
-                <a:srgbClr val="0070C0"/>
-              </a:solidFill>
-            </a:endParaRPr>
-          </a:p>
-        </p:txBody>
-      </p:sp>
-      <p:sp>
-        <p:nvSpPr>
-          <p:cNvPr id="3" name="Content Placeholder 2"/>
-          <p:cNvSpPr>
-            <a:spLocks noGrp="1"/>
-          </p:cNvSpPr>
-          <p:nvPr>
-            <p:ph idx="1"/>
-          </p:nvPr>
-        </p:nvSpPr>
-        <p:spPr>
-          <a:xfrm>
-            <a:off x="644904" y="2076182"/>
-            <a:ext cx="10876536" cy="3880773"/>
-          </a:xfrm>
-        </p:spPr>
-        <p:txBody>
-          <a:bodyPr>
-            <a:normAutofit/>
-          </a:bodyPr>
-          <a:lstStyle/>
-          <a:p>
-            <a:pPr>
-              <a:buClr>
-                <a:schemeClr val="tx1"/>
-              </a:buClr>
-              <a:buFont typeface="Wingdings" panose="05000000000000000000" pitchFamily="2" charset="2"/>
-              <a:buChar char="Ø"/>
-            </a:pPr>
-            <a:r>
-              <a:rPr lang="en-US" sz="3200" dirty="0" err="1" smtClean="0">
-                <a:latin typeface="Times New Roman" panose="02020603050405020304" pitchFamily="18" charset="0"/>
-                <a:cs typeface="Times New Roman" panose="02020603050405020304" pitchFamily="18" charset="0"/>
-              </a:rPr>
-              <a:t>Ngôn</a:t>
-            </a:r>
-            <a:r>
-              <a:rPr lang="en-US" sz="3200" dirty="0" smtClean="0">
-                <a:latin typeface="Times New Roman" panose="02020603050405020304" pitchFamily="18" charset="0"/>
-                <a:cs typeface="Times New Roman" panose="02020603050405020304" pitchFamily="18" charset="0"/>
-              </a:rPr>
-              <a:t> </a:t>
-            </a:r>
-            <a:r>
-              <a:rPr lang="en-US" sz="3200" dirty="0" err="1">
-                <a:latin typeface="Times New Roman" panose="02020603050405020304" pitchFamily="18" charset="0"/>
-                <a:cs typeface="Times New Roman" panose="02020603050405020304" pitchFamily="18" charset="0"/>
-              </a:rPr>
-              <a:t>ngữ</a:t>
-            </a:r>
-            <a:r>
-              <a:rPr lang="en-US" sz="3200" dirty="0">
-                <a:latin typeface="Times New Roman" panose="02020603050405020304" pitchFamily="18" charset="0"/>
-                <a:cs typeface="Times New Roman" panose="02020603050405020304" pitchFamily="18" charset="0"/>
-              </a:rPr>
-              <a:t> </a:t>
-            </a:r>
-            <a:r>
-              <a:rPr lang="en-US" sz="3200" dirty="0" err="1">
-                <a:latin typeface="Times New Roman" panose="02020603050405020304" pitchFamily="18" charset="0"/>
-                <a:cs typeface="Times New Roman" panose="02020603050405020304" pitchFamily="18" charset="0"/>
-              </a:rPr>
-              <a:t>kịch</a:t>
-            </a:r>
-            <a:r>
-              <a:rPr lang="en-US" sz="3200" dirty="0">
-                <a:latin typeface="Times New Roman" panose="02020603050405020304" pitchFamily="18" charset="0"/>
-                <a:cs typeface="Times New Roman" panose="02020603050405020304" pitchFamily="18" charset="0"/>
-              </a:rPr>
-              <a:t> </a:t>
-            </a:r>
-            <a:r>
-              <a:rPr lang="en-US" sz="3200" dirty="0" err="1">
-                <a:latin typeface="Times New Roman" panose="02020603050405020304" pitchFamily="18" charset="0"/>
-                <a:cs typeface="Times New Roman" panose="02020603050405020304" pitchFamily="18" charset="0"/>
-              </a:rPr>
-              <a:t>bản</a:t>
-            </a:r>
-            <a:r>
-              <a:rPr lang="en-US" sz="3200" dirty="0">
-                <a:latin typeface="Times New Roman" panose="02020603050405020304" pitchFamily="18" charset="0"/>
-                <a:cs typeface="Times New Roman" panose="02020603050405020304" pitchFamily="18" charset="0"/>
-              </a:rPr>
-              <a:t> </a:t>
-            </a:r>
-            <a:r>
-              <a:rPr lang="en-US" sz="3200" dirty="0" err="1">
-                <a:latin typeface="Times New Roman" panose="02020603050405020304" pitchFamily="18" charset="0"/>
-                <a:cs typeface="Times New Roman" panose="02020603050405020304" pitchFamily="18" charset="0"/>
-              </a:rPr>
-              <a:t>mở</a:t>
-            </a:r>
-            <a:r>
-              <a:rPr lang="en-US" sz="3200" dirty="0">
-                <a:latin typeface="Times New Roman" panose="02020603050405020304" pitchFamily="18" charset="0"/>
-                <a:cs typeface="Times New Roman" panose="02020603050405020304" pitchFamily="18" charset="0"/>
-              </a:rPr>
-              <a:t> </a:t>
-            </a:r>
-            <a:r>
-              <a:rPr lang="en-US" sz="3200" dirty="0" err="1">
-                <a:latin typeface="Times New Roman" panose="02020603050405020304" pitchFamily="18" charset="0"/>
-                <a:cs typeface="Times New Roman" panose="02020603050405020304" pitchFamily="18" charset="0"/>
-              </a:rPr>
-              <a:t>rộng</a:t>
-            </a:r>
-            <a:r>
-              <a:rPr lang="en-US" sz="3200" dirty="0">
-                <a:latin typeface="Times New Roman" panose="02020603050405020304" pitchFamily="18" charset="0"/>
-                <a:cs typeface="Times New Roman" panose="02020603050405020304" pitchFamily="18" charset="0"/>
-              </a:rPr>
-              <a:t> </a:t>
-            </a:r>
-            <a:r>
-              <a:rPr lang="en-US" sz="3200" dirty="0" err="1">
-                <a:latin typeface="Times New Roman" panose="02020603050405020304" pitchFamily="18" charset="0"/>
-                <a:cs typeface="Times New Roman" panose="02020603050405020304" pitchFamily="18" charset="0"/>
-              </a:rPr>
-              <a:t>của</a:t>
-            </a:r>
-            <a:r>
-              <a:rPr lang="en-US" sz="3200" dirty="0">
-                <a:latin typeface="Times New Roman" panose="02020603050405020304" pitchFamily="18" charset="0"/>
-                <a:cs typeface="Times New Roman" panose="02020603050405020304" pitchFamily="18" charset="0"/>
-              </a:rPr>
-              <a:t> </a:t>
-            </a:r>
-            <a:r>
-              <a:rPr lang="en-US" sz="3200" dirty="0" smtClean="0">
-                <a:latin typeface="Times New Roman" panose="02020603050405020304" pitchFamily="18" charset="0"/>
-                <a:cs typeface="Times New Roman" panose="02020603050405020304" pitchFamily="18" charset="0"/>
-              </a:rPr>
-              <a:t>CSS</a:t>
-            </a:r>
-          </a:p>
-          <a:p>
-            <a:pPr>
-              <a:buClr>
-                <a:schemeClr val="tx1"/>
-              </a:buClr>
-              <a:buFont typeface="Wingdings" panose="05000000000000000000" pitchFamily="2" charset="2"/>
-              <a:buChar char="Ø"/>
-            </a:pPr>
-            <a:r>
-              <a:rPr lang="en-US" sz="3200" dirty="0">
-                <a:latin typeface="Times New Roman" panose="02020603050405020304" pitchFamily="18" charset="0"/>
-                <a:cs typeface="Times New Roman" panose="02020603050405020304" pitchFamily="18" charset="0"/>
-              </a:rPr>
-              <a:t>B</a:t>
-            </a:r>
-            <a:r>
-              <a:rPr lang="vi-VN" sz="3200" dirty="0" smtClean="0">
-                <a:latin typeface="Times New Roman" panose="02020603050405020304" pitchFamily="18" charset="0"/>
-                <a:cs typeface="Times New Roman" panose="02020603050405020304" pitchFamily="18" charset="0"/>
-              </a:rPr>
-              <a:t>iên </a:t>
-            </a:r>
-            <a:r>
-              <a:rPr lang="vi-VN" sz="3200" dirty="0">
-                <a:latin typeface="Times New Roman" panose="02020603050405020304" pitchFamily="18" charset="0"/>
-                <a:cs typeface="Times New Roman" panose="02020603050405020304" pitchFamily="18" charset="0"/>
-              </a:rPr>
-              <a:t>dịch </a:t>
-            </a:r>
-            <a:r>
-              <a:rPr lang="vi-VN" sz="3200" dirty="0" smtClean="0">
-                <a:latin typeface="Times New Roman" panose="02020603050405020304" pitchFamily="18" charset="0"/>
-                <a:cs typeface="Times New Roman" panose="02020603050405020304" pitchFamily="18" charset="0"/>
-              </a:rPr>
-              <a:t>CSS </a:t>
-            </a:r>
-            <a:r>
-              <a:rPr lang="vi-VN" sz="3200" dirty="0">
-                <a:latin typeface="Times New Roman" panose="02020603050405020304" pitchFamily="18" charset="0"/>
-                <a:cs typeface="Times New Roman" panose="02020603050405020304" pitchFamily="18" charset="0"/>
-              </a:rPr>
-              <a:t>nhanh hơn và có cấu trúc rõ ràng </a:t>
-            </a:r>
-            <a:r>
-              <a:rPr lang="vi-VN" sz="3200" dirty="0" smtClean="0">
-                <a:latin typeface="Times New Roman" panose="02020603050405020304" pitchFamily="18" charset="0"/>
-                <a:cs typeface="Times New Roman" panose="02020603050405020304" pitchFamily="18" charset="0"/>
-              </a:rPr>
-              <a:t>hơn</a:t>
-            </a:r>
-            <a:r>
-              <a:rPr lang="en-US" sz="3200" dirty="0" smtClean="0">
-                <a:latin typeface="Times New Roman" panose="02020603050405020304" pitchFamily="18" charset="0"/>
-                <a:cs typeface="Times New Roman" panose="02020603050405020304" pitchFamily="18" charset="0"/>
-              </a:rPr>
-              <a:t>.</a:t>
-            </a:r>
-          </a:p>
-          <a:p>
-            <a:pPr>
-              <a:buClrTx/>
-              <a:buFont typeface="Wingdings" panose="05000000000000000000" pitchFamily="2" charset="2"/>
-              <a:buChar char="Ø"/>
-            </a:pPr>
-            <a:r>
-              <a:rPr lang="en-US" sz="3200" dirty="0" err="1" smtClean="0">
-                <a:latin typeface="Times New Roman" panose="02020603050405020304" pitchFamily="18" charset="0"/>
-                <a:cs typeface="Times New Roman" panose="02020603050405020304" pitchFamily="18" charset="0"/>
-              </a:rPr>
-              <a:t>Có</a:t>
-            </a:r>
-            <a:r>
-              <a:rPr lang="en-US" sz="3200" dirty="0" smtClean="0">
-                <a:latin typeface="Times New Roman" panose="02020603050405020304" pitchFamily="18" charset="0"/>
-                <a:cs typeface="Times New Roman" panose="02020603050405020304" pitchFamily="18" charset="0"/>
-              </a:rPr>
-              <a:t> </a:t>
-            </a:r>
-            <a:r>
-              <a:rPr lang="en-US" sz="3200" dirty="0" err="1">
-                <a:latin typeface="Times New Roman" panose="02020603050405020304" pitchFamily="18" charset="0"/>
-                <a:cs typeface="Times New Roman" panose="02020603050405020304" pitchFamily="18" charset="0"/>
-              </a:rPr>
-              <a:t>thể</a:t>
-            </a:r>
-            <a:r>
-              <a:rPr lang="en-US" sz="3200" dirty="0">
-                <a:latin typeface="Times New Roman" panose="02020603050405020304" pitchFamily="18" charset="0"/>
-                <a:cs typeface="Times New Roman" panose="02020603050405020304" pitchFamily="18" charset="0"/>
-              </a:rPr>
-              <a:t> </a:t>
-            </a:r>
-            <a:r>
-              <a:rPr lang="en-US" sz="3200" dirty="0" err="1">
-                <a:latin typeface="Times New Roman" panose="02020603050405020304" pitchFamily="18" charset="0"/>
-                <a:cs typeface="Times New Roman" panose="02020603050405020304" pitchFamily="18" charset="0"/>
-              </a:rPr>
-              <a:t>giúp</a:t>
-            </a:r>
-            <a:r>
-              <a:rPr lang="en-US" sz="3200" dirty="0">
-                <a:latin typeface="Times New Roman" panose="02020603050405020304" pitchFamily="18" charset="0"/>
-                <a:cs typeface="Times New Roman" panose="02020603050405020304" pitchFamily="18" charset="0"/>
-              </a:rPr>
-              <a:t> </a:t>
-            </a:r>
-            <a:r>
-              <a:rPr lang="en-US" sz="3200" dirty="0" err="1">
-                <a:latin typeface="Times New Roman" panose="02020603050405020304" pitchFamily="18" charset="0"/>
-                <a:cs typeface="Times New Roman" panose="02020603050405020304" pitchFamily="18" charset="0"/>
-              </a:rPr>
-              <a:t>bạn</a:t>
-            </a:r>
-            <a:r>
-              <a:rPr lang="en-US" sz="3200" dirty="0">
-                <a:latin typeface="Times New Roman" panose="02020603050405020304" pitchFamily="18" charset="0"/>
-                <a:cs typeface="Times New Roman" panose="02020603050405020304" pitchFamily="18" charset="0"/>
-              </a:rPr>
-              <a:t> </a:t>
-            </a:r>
-            <a:r>
-              <a:rPr lang="en-US" sz="3200" dirty="0" err="1">
-                <a:latin typeface="Times New Roman" panose="02020603050405020304" pitchFamily="18" charset="0"/>
-                <a:cs typeface="Times New Roman" panose="02020603050405020304" pitchFamily="18" charset="0"/>
-              </a:rPr>
-              <a:t>tiết</a:t>
-            </a:r>
-            <a:r>
-              <a:rPr lang="en-US" sz="3200" dirty="0">
-                <a:latin typeface="Times New Roman" panose="02020603050405020304" pitchFamily="18" charset="0"/>
-                <a:cs typeface="Times New Roman" panose="02020603050405020304" pitchFamily="18" charset="0"/>
-              </a:rPr>
-              <a:t> </a:t>
-            </a:r>
-            <a:r>
-              <a:rPr lang="en-US" sz="3200" dirty="0" err="1">
-                <a:latin typeface="Times New Roman" panose="02020603050405020304" pitchFamily="18" charset="0"/>
-                <a:cs typeface="Times New Roman" panose="02020603050405020304" pitchFamily="18" charset="0"/>
-              </a:rPr>
-              <a:t>kiệm</a:t>
-            </a:r>
-            <a:r>
-              <a:rPr lang="en-US" sz="3200" dirty="0">
-                <a:latin typeface="Times New Roman" panose="02020603050405020304" pitchFamily="18" charset="0"/>
-                <a:cs typeface="Times New Roman" panose="02020603050405020304" pitchFamily="18" charset="0"/>
-              </a:rPr>
-              <a:t> </a:t>
-            </a:r>
-            <a:r>
-              <a:rPr lang="en-US" sz="3200" dirty="0" err="1">
-                <a:latin typeface="Times New Roman" panose="02020603050405020304" pitchFamily="18" charset="0"/>
-                <a:cs typeface="Times New Roman" panose="02020603050405020304" pitchFamily="18" charset="0"/>
-              </a:rPr>
-              <a:t>thời</a:t>
-            </a:r>
-            <a:r>
-              <a:rPr lang="en-US" sz="3200" dirty="0">
-                <a:latin typeface="Times New Roman" panose="02020603050405020304" pitchFamily="18" charset="0"/>
-                <a:cs typeface="Times New Roman" panose="02020603050405020304" pitchFamily="18" charset="0"/>
-              </a:rPr>
-              <a:t> </a:t>
-            </a:r>
-            <a:r>
-              <a:rPr lang="en-US" sz="3200" dirty="0" err="1">
-                <a:latin typeface="Times New Roman" panose="02020603050405020304" pitchFamily="18" charset="0"/>
-                <a:cs typeface="Times New Roman" panose="02020603050405020304" pitchFamily="18" charset="0"/>
-              </a:rPr>
-              <a:t>gian</a:t>
-            </a:r>
-            <a:r>
-              <a:rPr lang="en-US" sz="3200" dirty="0">
-                <a:latin typeface="Times New Roman" panose="02020603050405020304" pitchFamily="18" charset="0"/>
-                <a:cs typeface="Times New Roman" panose="02020603050405020304" pitchFamily="18" charset="0"/>
-              </a:rPr>
-              <a:t> </a:t>
-            </a:r>
-            <a:r>
-              <a:rPr lang="en-US" sz="3200" dirty="0" err="1">
-                <a:latin typeface="Times New Roman" panose="02020603050405020304" pitchFamily="18" charset="0"/>
-                <a:cs typeface="Times New Roman" panose="02020603050405020304" pitchFamily="18" charset="0"/>
-              </a:rPr>
-              <a:t>viết</a:t>
-            </a:r>
-            <a:r>
-              <a:rPr lang="en-US" sz="3200" dirty="0">
-                <a:latin typeface="Times New Roman" panose="02020603050405020304" pitchFamily="18" charset="0"/>
-                <a:cs typeface="Times New Roman" panose="02020603050405020304" pitchFamily="18" charset="0"/>
-              </a:rPr>
-              <a:t> CSS, </a:t>
-            </a:r>
-            <a:r>
-              <a:rPr lang="en-US" sz="3200" dirty="0" err="1">
-                <a:latin typeface="Times New Roman" panose="02020603050405020304" pitchFamily="18" charset="0"/>
-                <a:cs typeface="Times New Roman" panose="02020603050405020304" pitchFamily="18" charset="0"/>
-              </a:rPr>
-              <a:t>dễ</a:t>
-            </a:r>
-            <a:r>
-              <a:rPr lang="en-US" sz="3200" dirty="0">
-                <a:latin typeface="Times New Roman" panose="02020603050405020304" pitchFamily="18" charset="0"/>
-                <a:cs typeface="Times New Roman" panose="02020603050405020304" pitchFamily="18" charset="0"/>
-              </a:rPr>
-              <a:t> </a:t>
-            </a:r>
-            <a:r>
-              <a:rPr lang="en-US" sz="3200" dirty="0" err="1">
-                <a:latin typeface="Times New Roman" panose="02020603050405020304" pitchFamily="18" charset="0"/>
-                <a:cs typeface="Times New Roman" panose="02020603050405020304" pitchFamily="18" charset="0"/>
-              </a:rPr>
-              <a:t>dàng</a:t>
-            </a:r>
-            <a:r>
-              <a:rPr lang="en-US" sz="3200" dirty="0">
-                <a:latin typeface="Times New Roman" panose="02020603050405020304" pitchFamily="18" charset="0"/>
-                <a:cs typeface="Times New Roman" panose="02020603050405020304" pitchFamily="18" charset="0"/>
-              </a:rPr>
-              <a:t> </a:t>
-            </a:r>
-            <a:r>
-              <a:rPr lang="en-US" sz="3200" dirty="0" err="1">
-                <a:latin typeface="Times New Roman" panose="02020603050405020304" pitchFamily="18" charset="0"/>
-                <a:cs typeface="Times New Roman" panose="02020603050405020304" pitchFamily="18" charset="0"/>
-              </a:rPr>
-              <a:t>bảo</a:t>
-            </a:r>
-            <a:r>
-              <a:rPr lang="en-US" sz="3200" dirty="0">
-                <a:latin typeface="Times New Roman" panose="02020603050405020304" pitchFamily="18" charset="0"/>
-                <a:cs typeface="Times New Roman" panose="02020603050405020304" pitchFamily="18" charset="0"/>
-              </a:rPr>
-              <a:t> </a:t>
-            </a:r>
-            <a:r>
-              <a:rPr lang="en-US" sz="3200" dirty="0" err="1">
-                <a:latin typeface="Times New Roman" panose="02020603050405020304" pitchFamily="18" charset="0"/>
-                <a:cs typeface="Times New Roman" panose="02020603050405020304" pitchFamily="18" charset="0"/>
-              </a:rPr>
-              <a:t>trì</a:t>
-            </a:r>
-            <a:r>
-              <a:rPr lang="en-US" sz="3200" dirty="0">
-                <a:latin typeface="Times New Roman" panose="02020603050405020304" pitchFamily="18" charset="0"/>
-                <a:cs typeface="Times New Roman" panose="02020603050405020304" pitchFamily="18" charset="0"/>
-              </a:rPr>
-              <a:t> </a:t>
-            </a:r>
-            <a:r>
-              <a:rPr lang="en-US" sz="3200" dirty="0" err="1">
-                <a:latin typeface="Times New Roman" panose="02020603050405020304" pitchFamily="18" charset="0"/>
-                <a:cs typeface="Times New Roman" panose="02020603050405020304" pitchFamily="18" charset="0"/>
-              </a:rPr>
-              <a:t>và</a:t>
-            </a:r>
-            <a:r>
-              <a:rPr lang="en-US" sz="3200" dirty="0">
-                <a:latin typeface="Times New Roman" panose="02020603050405020304" pitchFamily="18" charset="0"/>
-                <a:cs typeface="Times New Roman" panose="02020603050405020304" pitchFamily="18" charset="0"/>
-              </a:rPr>
-              <a:t> </a:t>
-            </a:r>
-            <a:r>
-              <a:rPr lang="en-US" sz="3200" dirty="0" err="1">
-                <a:latin typeface="Times New Roman" panose="02020603050405020304" pitchFamily="18" charset="0"/>
-                <a:cs typeface="Times New Roman" panose="02020603050405020304" pitchFamily="18" charset="0"/>
-              </a:rPr>
-              <a:t>phát</a:t>
-            </a:r>
-            <a:r>
-              <a:rPr lang="en-US" sz="3200" dirty="0">
-                <a:latin typeface="Times New Roman" panose="02020603050405020304" pitchFamily="18" charset="0"/>
-                <a:cs typeface="Times New Roman" panose="02020603050405020304" pitchFamily="18" charset="0"/>
-              </a:rPr>
-              <a:t> </a:t>
-            </a:r>
-            <a:r>
-              <a:rPr lang="en-US" sz="3200" dirty="0" err="1">
-                <a:latin typeface="Times New Roman" panose="02020603050405020304" pitchFamily="18" charset="0"/>
-                <a:cs typeface="Times New Roman" panose="02020603050405020304" pitchFamily="18" charset="0"/>
-              </a:rPr>
-              <a:t>triển</a:t>
-            </a:r>
-            <a:r>
-              <a:rPr lang="en-US" sz="3200" dirty="0">
-                <a:latin typeface="Times New Roman" panose="02020603050405020304" pitchFamily="18" charset="0"/>
-                <a:cs typeface="Times New Roman" panose="02020603050405020304" pitchFamily="18" charset="0"/>
-              </a:rPr>
-              <a:t> CSS,...</a:t>
-            </a:r>
-          </a:p>
-        </p:txBody>
-      </p:sp>
-    </p:spTree>
-    <p:extLst>
-      <p:ext uri="{BB962C8B-B14F-4D97-AF65-F5344CB8AC3E}">
-        <p14:creationId xmlns:p14="http://schemas.microsoft.com/office/powerpoint/2010/main" val="1957928922"/>
-      </p:ext>
-    </p:extLst>
-  </p:cSld>
-  <p:clrMapOvr>
-    <a:masterClrMapping/>
-  </p:clrMapOvr>
-  <mc:AlternateContent xmlns:mc="http://schemas.openxmlformats.org/markup-compatibility/2006" xmlns:p14="http://schemas.microsoft.com/office/powerpoint/2010/main">
-    <mc:Choice Requires="p14">
-      <p:transition spd="slow" p14:dur="2000">
-        <p:split orient="vert"/>
-      </p:transition>
-    </mc:Choice>
-    <mc:Fallback xmlns="">
-      <p:transition spd="slow">
-        <p:split orient="vert"/>
-      </p:transition>
-    </mc:Fallback>
-  </mc:AlternateContent>
-  <p:timing>
-    <p:tnLst>
-      <p:par>
-        <p:cTn id="1" dur="indefinite" restart="never" nodeType="tmRoot">
-          <p:childTnLst>
-            <p:seq concurrent="1" nextAc="seek">
-              <p:cTn id="2" dur="indefinite" nodeType="mainSeq">
-                <p:childTnLst>
-                  <p:par>
-                    <p:cTn id="3" fill="hold">
-                      <p:stCondLst>
-                        <p:cond delay="indefinite"/>
-                      </p:stCondLst>
-                      <p:childTnLst>
-                        <p:par>
-                          <p:cTn id="4" fill="hold">
-                            <p:stCondLst>
-                              <p:cond delay="0"/>
-                            </p:stCondLst>
-                            <p:childTnLst>
-                              <p:par>
-                                <p:cTn id="5" presetID="16" presetClass="entr" presetSubtype="21" fill="hold" grpId="0" nodeType="clickEffect">
-                                  <p:stCondLst>
-                                    <p:cond delay="0"/>
-                                  </p:stCondLst>
-                                  <p:childTnLst>
-                                    <p:set>
-                                      <p:cBhvr>
-                                        <p:cTn id="6" dur="1" fill="hold">
-                                          <p:stCondLst>
-                                            <p:cond delay="0"/>
-                                          </p:stCondLst>
-                                        </p:cTn>
-                                        <p:tgtEl>
-                                          <p:spTgt spid="2"/>
-                                        </p:tgtEl>
-                                        <p:attrNameLst>
-                                          <p:attrName>style.visibility</p:attrName>
-                                        </p:attrNameLst>
-                                      </p:cBhvr>
-                                      <p:to>
-                                        <p:strVal val="visible"/>
-                                      </p:to>
-                                    </p:set>
-                                    <p:animEffect transition="in" filter="barn(inVertical)">
-                                      <p:cBhvr>
-                                        <p:cTn id="7" dur="500"/>
-                                        <p:tgtEl>
-                                          <p:spTgt spid="2"/>
-                                        </p:tgtEl>
-                                      </p:cBhvr>
-                                    </p:animEffect>
-                                  </p:childTnLst>
-                                </p:cTn>
-                              </p:par>
-                            </p:childTnLst>
-                          </p:cTn>
-                        </p:par>
-                      </p:childTnLst>
-                    </p:cTn>
-                  </p:par>
-                  <p:par>
-                    <p:cTn id="8" fill="hold">
-                      <p:stCondLst>
-                        <p:cond delay="indefinite"/>
-                      </p:stCondLst>
-                      <p:childTnLst>
-                        <p:par>
-                          <p:cTn id="9" fill="hold">
-                            <p:stCondLst>
-                              <p:cond delay="0"/>
-                            </p:stCondLst>
-                            <p:childTnLst>
-                              <p:par>
-                                <p:cTn id="10" presetID="16" presetClass="entr" presetSubtype="21" fill="hold" grpId="0" nodeType="clickEffect">
-                                  <p:stCondLst>
-                                    <p:cond delay="0"/>
-                                  </p:stCondLst>
-                                  <p:childTnLst>
-                                    <p:set>
-                                      <p:cBhvr>
-                                        <p:cTn id="11" dur="1" fill="hold">
-                                          <p:stCondLst>
-                                            <p:cond delay="0"/>
-                                          </p:stCondLst>
-                                        </p:cTn>
-                                        <p:tgtEl>
-                                          <p:spTgt spid="3">
-                                            <p:txEl>
-                                              <p:pRg st="0" end="0"/>
-                                            </p:txEl>
-                                          </p:spTgt>
-                                        </p:tgtEl>
-                                        <p:attrNameLst>
-                                          <p:attrName>style.visibility</p:attrName>
-                                        </p:attrNameLst>
-                                      </p:cBhvr>
-                                      <p:to>
-                                        <p:strVal val="visible"/>
-                                      </p:to>
-                                    </p:set>
-                                    <p:animEffect transition="in" filter="barn(inVertical)">
-                                      <p:cBhvr>
-                                        <p:cTn id="12" dur="500"/>
-                                        <p:tgtEl>
-                                          <p:spTgt spid="3">
-                                            <p:txEl>
-                                              <p:pRg st="0" end="0"/>
-                                            </p:txEl>
-                                          </p:spTgt>
-                                        </p:tgtEl>
-                                      </p:cBhvr>
-                                    </p:animEffect>
-                                  </p:childTnLst>
-                                </p:cTn>
-                              </p:par>
-                            </p:childTnLst>
-                          </p:cTn>
-                        </p:par>
-                      </p:childTnLst>
-                    </p:cTn>
-                  </p:par>
-                  <p:par>
-                    <p:cTn id="13" fill="hold">
-                      <p:stCondLst>
-                        <p:cond delay="indefinite"/>
-                      </p:stCondLst>
-                      <p:childTnLst>
-                        <p:par>
-                          <p:cTn id="14" fill="hold">
-                            <p:stCondLst>
-                              <p:cond delay="0"/>
-                            </p:stCondLst>
-                            <p:childTnLst>
-                              <p:par>
-                                <p:cTn id="15" presetID="16" presetClass="entr" presetSubtype="21" fill="hold" grpId="0" nodeType="clickEffect">
-                                  <p:stCondLst>
-                                    <p:cond delay="0"/>
-                                  </p:stCondLst>
-                                  <p:childTnLst>
-                                    <p:set>
-                                      <p:cBhvr>
-                                        <p:cTn id="16" dur="1" fill="hold">
-                                          <p:stCondLst>
-                                            <p:cond delay="0"/>
-                                          </p:stCondLst>
-                                        </p:cTn>
-                                        <p:tgtEl>
-                                          <p:spTgt spid="3">
-                                            <p:txEl>
-                                              <p:pRg st="1" end="1"/>
-                                            </p:txEl>
-                                          </p:spTgt>
-                                        </p:tgtEl>
-                                        <p:attrNameLst>
-                                          <p:attrName>style.visibility</p:attrName>
-                                        </p:attrNameLst>
-                                      </p:cBhvr>
-                                      <p:to>
-                                        <p:strVal val="visible"/>
-                                      </p:to>
-                                    </p:set>
-                                    <p:animEffect transition="in" filter="barn(inVertical)">
-                                      <p:cBhvr>
-                                        <p:cTn id="17" dur="500"/>
-                                        <p:tgtEl>
-                                          <p:spTgt spid="3">
-                                            <p:txEl>
-                                              <p:pRg st="1" end="1"/>
-                                            </p:txEl>
-                                          </p:spTgt>
-                                        </p:tgtEl>
-                                      </p:cBhvr>
-                                    </p:animEffect>
-                                  </p:childTnLst>
-                                </p:cTn>
-                              </p:par>
-                            </p:childTnLst>
-                          </p:cTn>
-                        </p:par>
-                      </p:childTnLst>
-                    </p:cTn>
-                  </p:par>
-                  <p:par>
-                    <p:cTn id="18" fill="hold">
-                      <p:stCondLst>
-                        <p:cond delay="indefinite"/>
-                      </p:stCondLst>
-                      <p:childTnLst>
-                        <p:par>
-                          <p:cTn id="19" fill="hold">
-                            <p:stCondLst>
-                              <p:cond delay="0"/>
-                            </p:stCondLst>
-                            <p:childTnLst>
-                              <p:par>
-                                <p:cTn id="20" presetID="16" presetClass="entr" presetSubtype="21" fill="hold" grpId="0" nodeType="clickEffect">
-                                  <p:stCondLst>
-                                    <p:cond delay="0"/>
-                                  </p:stCondLst>
-                                  <p:childTnLst>
-                                    <p:set>
-                                      <p:cBhvr>
-                                        <p:cTn id="21" dur="1" fill="hold">
-                                          <p:stCondLst>
-                                            <p:cond delay="0"/>
-                                          </p:stCondLst>
-                                        </p:cTn>
-                                        <p:tgtEl>
-                                          <p:spTgt spid="3">
-                                            <p:txEl>
-                                              <p:pRg st="2" end="2"/>
-                                            </p:txEl>
-                                          </p:spTgt>
-                                        </p:tgtEl>
-                                        <p:attrNameLst>
-                                          <p:attrName>style.visibility</p:attrName>
-                                        </p:attrNameLst>
-                                      </p:cBhvr>
-                                      <p:to>
-                                        <p:strVal val="visible"/>
-                                      </p:to>
-                                    </p:set>
-                                    <p:animEffect transition="in" filter="barn(inVertical)">
-                                      <p:cBhvr>
-                                        <p:cTn id="22" dur="500"/>
-                                        <p:tgtEl>
-                                          <p:spTgt spid="3">
-                                            <p:txEl>
-                                              <p:pRg st="2" end="2"/>
-                                            </p:txEl>
-                                          </p:spTgt>
-                                        </p:tgtEl>
-                                      </p:cBhvr>
-                                    </p:animEffect>
-                                  </p:childTnLst>
-                                </p:cTn>
-                              </p:par>
-                            </p:childTnLst>
-                          </p:cTn>
-                        </p:par>
-                      </p:childTnLst>
-                    </p:cTn>
-                  </p:par>
-                </p:childTnLst>
-              </p:cTn>
-              <p:prevCondLst>
-                <p:cond evt="onPrev" delay="0">
-                  <p:tgtEl>
-                    <p:sldTgt/>
-                  </p:tgtEl>
-                </p:cond>
-              </p:prevCondLst>
-              <p:nextCondLst>
-                <p:cond evt="onNext" delay="0">
-                  <p:tgtEl>
-                    <p:sldTgt/>
-                  </p:tgtEl>
-                </p:cond>
-              </p:nextCondLst>
-            </p:seq>
-          </p:childTnLst>
-        </p:cTn>
-      </p:par>
-    </p:tnLst>
-    <p:bldLst>
-      <p:bldP spid="2" grpId="0"/>
-      <p:bldP spid="3" grpId="0" build="p"/>
-    </p:bldLst>
-  </p:timing>
-</p:sld>
-</file>
-
-<file path=ppt/slides/slide3.xml><?xml version="1.0" encoding="utf-8"?>
-<p:sld xmlns:a="http://schemas.openxmlformats.org/drawingml/2006/main" xmlns:r="http://schemas.openxmlformats.org/officeDocument/2006/relationships" xmlns:p="http://schemas.openxmlformats.org/presentationml/2006/main">
-  <p:cSld>
-    <p:spTree>
-      <p:nvGrpSpPr>
-        <p:cNvPr id="1" name=""/>
-        <p:cNvGrpSpPr/>
-        <p:nvPr/>
-      </p:nvGrpSpPr>
-      <p:grpSpPr>
-        <a:xfrm>
-          <a:off x="0" y="0"/>
-          <a:ext cx="0" cy="0"/>
-          <a:chOff x="0" y="0"/>
-          <a:chExt cx="0" cy="0"/>
-        </a:xfrm>
-      </p:grpSpPr>
-      <p:sp>
-        <p:nvSpPr>
-          <p:cNvPr id="2" name="Title 1"/>
-          <p:cNvSpPr>
-            <a:spLocks noGrp="1"/>
-          </p:cNvSpPr>
-          <p:nvPr>
-            <p:ph type="title"/>
-          </p:nvPr>
-        </p:nvSpPr>
-        <p:spPr/>
-        <p:txBody>
-          <a:bodyPr>
-            <a:noAutofit/>
-          </a:bodyPr>
-          <a:lstStyle/>
-          <a:p>
-            <a:r>
-              <a:rPr lang="en-US" sz="6000" b="1" dirty="0">
-                <a:solidFill>
-                  <a:srgbClr val="0070C0"/>
-                </a:solidFill>
-                <a:latin typeface="Times New Roman" panose="02020603050405020304" pitchFamily="18" charset="0"/>
-                <a:cs typeface="Times New Roman" panose="02020603050405020304" pitchFamily="18" charset="0"/>
-              </a:rPr>
-              <a:t>SASS</a:t>
-            </a:r>
-            <a:br>
-              <a:rPr lang="en-US" sz="6000" b="1" dirty="0">
-                <a:solidFill>
-                  <a:srgbClr val="0070C0"/>
-                </a:solidFill>
-                <a:latin typeface="Times New Roman" panose="02020603050405020304" pitchFamily="18" charset="0"/>
-                <a:cs typeface="Times New Roman" panose="02020603050405020304" pitchFamily="18" charset="0"/>
-              </a:rPr>
-            </a:br>
-            <a:endParaRPr lang="en-US" sz="6000" dirty="0">
-              <a:solidFill>
-                <a:srgbClr val="0070C0"/>
-              </a:solidFill>
-              <a:latin typeface="Times New Roman" panose="02020603050405020304" pitchFamily="18" charset="0"/>
-              <a:cs typeface="Times New Roman" panose="02020603050405020304" pitchFamily="18" charset="0"/>
-            </a:endParaRPr>
-          </a:p>
-        </p:txBody>
-      </p:sp>
-      <p:sp>
-        <p:nvSpPr>
-          <p:cNvPr id="3" name="Content Placeholder 2"/>
-          <p:cNvSpPr>
-            <a:spLocks noGrp="1"/>
-          </p:cNvSpPr>
-          <p:nvPr>
-            <p:ph idx="1"/>
-          </p:nvPr>
-        </p:nvSpPr>
-        <p:spPr>
-          <a:xfrm>
-            <a:off x="677333" y="2132454"/>
-            <a:ext cx="10815971" cy="3880773"/>
-          </a:xfrm>
-        </p:spPr>
-        <p:txBody>
-          <a:bodyPr>
-            <a:normAutofit lnSpcReduction="10000"/>
-          </a:bodyPr>
-          <a:lstStyle/>
-          <a:p>
-            <a:pPr>
-              <a:buClrTx/>
-              <a:buFont typeface="Wingdings" panose="05000000000000000000" pitchFamily="2" charset="2"/>
-              <a:buChar char="Ø"/>
-            </a:pPr>
-            <a:r>
-              <a:rPr lang="vi-VN" sz="3200" dirty="0" smtClean="0">
-                <a:latin typeface="Times New Roman" panose="02020603050405020304" pitchFamily="18" charset="0"/>
-                <a:cs typeface="Times New Roman" panose="02020603050405020304" pitchFamily="18" charset="0"/>
-              </a:rPr>
-              <a:t>Hoàn </a:t>
-            </a:r>
-            <a:r>
-              <a:rPr lang="vi-VN" sz="3200" dirty="0">
-                <a:latin typeface="Times New Roman" panose="02020603050405020304" pitchFamily="18" charset="0"/>
-                <a:cs typeface="Times New Roman" panose="02020603050405020304" pitchFamily="18" charset="0"/>
-              </a:rPr>
-              <a:t>toàn tương thích với </a:t>
-            </a:r>
-            <a:r>
-              <a:rPr lang="vi-VN" sz="3200" dirty="0" smtClean="0">
-                <a:latin typeface="Times New Roman" panose="02020603050405020304" pitchFamily="18" charset="0"/>
-                <a:cs typeface="Times New Roman" panose="02020603050405020304" pitchFamily="18" charset="0"/>
-              </a:rPr>
-              <a:t>CSS</a:t>
-            </a:r>
-            <a:endParaRPr lang="en-US" sz="3200" dirty="0" smtClean="0">
-              <a:latin typeface="Times New Roman" panose="02020603050405020304" pitchFamily="18" charset="0"/>
-              <a:cs typeface="Times New Roman" panose="02020603050405020304" pitchFamily="18" charset="0"/>
-            </a:endParaRPr>
-          </a:p>
-          <a:p>
-            <a:pPr>
-              <a:buClrTx/>
-              <a:buFont typeface="Wingdings" panose="05000000000000000000" pitchFamily="2" charset="2"/>
-              <a:buChar char="Ø"/>
-            </a:pPr>
-            <a:r>
-              <a:rPr lang="vi-VN" sz="3200" dirty="0">
-                <a:latin typeface="Times New Roman" panose="02020603050405020304" pitchFamily="18" charset="0"/>
-                <a:cs typeface="Times New Roman" panose="02020603050405020304" pitchFamily="18" charset="0"/>
-              </a:rPr>
-              <a:t>Cung cấp các tiện ích vô cùng mạnh mẽ như variables, nesting, mixins,...</a:t>
-            </a:r>
-          </a:p>
-          <a:p>
-            <a:pPr>
-              <a:buClrTx/>
-              <a:buFont typeface="Wingdings" panose="05000000000000000000" pitchFamily="2" charset="2"/>
-              <a:buChar char="Ø"/>
-            </a:pPr>
-            <a:r>
-              <a:rPr lang="en-US" sz="3200" dirty="0" err="1">
-                <a:latin typeface="Times New Roman" panose="02020603050405020304" pitchFamily="18" charset="0"/>
-                <a:cs typeface="Times New Roman" panose="02020603050405020304" pitchFamily="18" charset="0"/>
-              </a:rPr>
-              <a:t>Giúp</a:t>
-            </a:r>
-            <a:r>
-              <a:rPr lang="en-US" sz="3200" dirty="0">
-                <a:latin typeface="Times New Roman" panose="02020603050405020304" pitchFamily="18" charset="0"/>
-                <a:cs typeface="Times New Roman" panose="02020603050405020304" pitchFamily="18" charset="0"/>
-              </a:rPr>
-              <a:t> </a:t>
-            </a:r>
-            <a:r>
-              <a:rPr lang="en-US" sz="3200" dirty="0" err="1">
-                <a:latin typeface="Times New Roman" panose="02020603050405020304" pitchFamily="18" charset="0"/>
-                <a:cs typeface="Times New Roman" panose="02020603050405020304" pitchFamily="18" charset="0"/>
-              </a:rPr>
-              <a:t>tiết</a:t>
-            </a:r>
-            <a:r>
-              <a:rPr lang="en-US" sz="3200" dirty="0">
-                <a:latin typeface="Times New Roman" panose="02020603050405020304" pitchFamily="18" charset="0"/>
-                <a:cs typeface="Times New Roman" panose="02020603050405020304" pitchFamily="18" charset="0"/>
-              </a:rPr>
-              <a:t> </a:t>
-            </a:r>
-            <a:r>
-              <a:rPr lang="en-US" sz="3200" dirty="0" err="1">
-                <a:latin typeface="Times New Roman" panose="02020603050405020304" pitchFamily="18" charset="0"/>
-                <a:cs typeface="Times New Roman" panose="02020603050405020304" pitchFamily="18" charset="0"/>
-              </a:rPr>
-              <a:t>kiệm</a:t>
-            </a:r>
-            <a:r>
-              <a:rPr lang="en-US" sz="3200" dirty="0">
-                <a:latin typeface="Times New Roman" panose="02020603050405020304" pitchFamily="18" charset="0"/>
-                <a:cs typeface="Times New Roman" panose="02020603050405020304" pitchFamily="18" charset="0"/>
-              </a:rPr>
-              <a:t> </a:t>
-            </a:r>
-            <a:r>
-              <a:rPr lang="en-US" sz="3200" dirty="0" err="1">
-                <a:latin typeface="Times New Roman" panose="02020603050405020304" pitchFamily="18" charset="0"/>
-                <a:cs typeface="Times New Roman" panose="02020603050405020304" pitchFamily="18" charset="0"/>
-              </a:rPr>
-              <a:t>thời</a:t>
-            </a:r>
-            <a:r>
-              <a:rPr lang="en-US" sz="3200" dirty="0">
-                <a:latin typeface="Times New Roman" panose="02020603050405020304" pitchFamily="18" charset="0"/>
-                <a:cs typeface="Times New Roman" panose="02020603050405020304" pitchFamily="18" charset="0"/>
-              </a:rPr>
-              <a:t> </a:t>
-            </a:r>
-            <a:r>
-              <a:rPr lang="en-US" sz="3200" dirty="0" err="1">
-                <a:latin typeface="Times New Roman" panose="02020603050405020304" pitchFamily="18" charset="0"/>
-                <a:cs typeface="Times New Roman" panose="02020603050405020304" pitchFamily="18" charset="0"/>
-              </a:rPr>
-              <a:t>gian</a:t>
-            </a:r>
-            <a:r>
-              <a:rPr lang="en-US" sz="3200" dirty="0">
-                <a:latin typeface="Times New Roman" panose="02020603050405020304" pitchFamily="18" charset="0"/>
-                <a:cs typeface="Times New Roman" panose="02020603050405020304" pitchFamily="18" charset="0"/>
-              </a:rPr>
-              <a:t> </a:t>
-            </a:r>
-            <a:r>
-              <a:rPr lang="en-US" sz="3200" dirty="0" err="1">
-                <a:latin typeface="Times New Roman" panose="02020603050405020304" pitchFamily="18" charset="0"/>
-                <a:cs typeface="Times New Roman" panose="02020603050405020304" pitchFamily="18" charset="0"/>
-              </a:rPr>
-              <a:t>viết</a:t>
-            </a:r>
-            <a:r>
-              <a:rPr lang="en-US" sz="3200" dirty="0">
-                <a:latin typeface="Times New Roman" panose="02020603050405020304" pitchFamily="18" charset="0"/>
-                <a:cs typeface="Times New Roman" panose="02020603050405020304" pitchFamily="18" charset="0"/>
-              </a:rPr>
-              <a:t> </a:t>
-            </a:r>
-            <a:r>
-              <a:rPr lang="en-US" sz="3200" dirty="0" smtClean="0">
-                <a:latin typeface="Times New Roman" panose="02020603050405020304" pitchFamily="18" charset="0"/>
-                <a:cs typeface="Times New Roman" panose="02020603050405020304" pitchFamily="18" charset="0"/>
-              </a:rPr>
-              <a:t>CSS</a:t>
-            </a:r>
-            <a:endParaRPr lang="en-US" sz="3200" dirty="0" smtClean="0">
-              <a:latin typeface="Times New Roman" panose="02020603050405020304" pitchFamily="18" charset="0"/>
-              <a:cs typeface="Times New Roman" panose="02020603050405020304" pitchFamily="18" charset="0"/>
-            </a:endParaRPr>
-          </a:p>
-          <a:p>
-            <a:pPr>
-              <a:buClrTx/>
-              <a:buFont typeface="Wingdings" panose="05000000000000000000" pitchFamily="2" charset="2"/>
-              <a:buChar char="Ø"/>
-            </a:pPr>
-            <a:r>
-              <a:rPr lang="en-US" sz="3200" dirty="0" smtClean="0">
-                <a:latin typeface="Times New Roman" panose="02020603050405020304" pitchFamily="18" charset="0"/>
-                <a:cs typeface="Times New Roman" panose="02020603050405020304" pitchFamily="18" charset="0"/>
-              </a:rPr>
-              <a:t>C</a:t>
-            </a:r>
-            <a:r>
-              <a:rPr lang="vi-VN" sz="3200" dirty="0" smtClean="0">
-                <a:latin typeface="Times New Roman" panose="02020603050405020304" pitchFamily="18" charset="0"/>
-                <a:cs typeface="Times New Roman" panose="02020603050405020304" pitchFamily="18" charset="0"/>
-              </a:rPr>
-              <a:t>ó </a:t>
-            </a:r>
-            <a:r>
-              <a:rPr lang="vi-VN" sz="3200" dirty="0">
-                <a:latin typeface="Times New Roman" panose="02020603050405020304" pitchFamily="18" charset="0"/>
-                <a:cs typeface="Times New Roman" panose="02020603050405020304" pitchFamily="18" charset="0"/>
-              </a:rPr>
-              <a:t>thể viết CSS theo thứ tự rõ ràng, quản lý các biến đã được định nghĩa </a:t>
-            </a:r>
-            <a:r>
-              <a:rPr lang="vi-VN" sz="3200" dirty="0" smtClean="0">
-                <a:latin typeface="Times New Roman" panose="02020603050405020304" pitchFamily="18" charset="0"/>
-                <a:cs typeface="Times New Roman" panose="02020603050405020304" pitchFamily="18" charset="0"/>
-              </a:rPr>
-              <a:t>sẵn</a:t>
-            </a:r>
-            <a:r>
-              <a:rPr lang="en-US" sz="3200" dirty="0" smtClean="0">
-                <a:latin typeface="Times New Roman" panose="02020603050405020304" pitchFamily="18" charset="0"/>
-                <a:cs typeface="Times New Roman" panose="02020603050405020304" pitchFamily="18" charset="0"/>
-              </a:rPr>
-              <a:t>.</a:t>
-            </a:r>
-          </a:p>
-          <a:p>
-            <a:pPr>
-              <a:buClrTx/>
-              <a:buFont typeface="Wingdings" panose="05000000000000000000" pitchFamily="2" charset="2"/>
-              <a:buChar char="Ø"/>
-            </a:pPr>
-            <a:r>
-              <a:rPr lang="en-US" sz="3200" dirty="0" err="1">
-                <a:latin typeface="Times New Roman" panose="02020603050405020304" pitchFamily="18" charset="0"/>
-                <a:cs typeface="Times New Roman" panose="02020603050405020304" pitchFamily="18" charset="0"/>
-              </a:rPr>
-              <a:t>C</a:t>
-            </a:r>
-            <a:r>
-              <a:rPr lang="en-US" sz="3200" dirty="0" err="1" smtClean="0">
-                <a:latin typeface="Times New Roman" panose="02020603050405020304" pitchFamily="18" charset="0"/>
-                <a:cs typeface="Times New Roman" panose="02020603050405020304" pitchFamily="18" charset="0"/>
-              </a:rPr>
-              <a:t>ó</a:t>
-            </a:r>
-            <a:r>
-              <a:rPr lang="en-US" sz="3200" dirty="0" smtClean="0">
-                <a:latin typeface="Times New Roman" panose="02020603050405020304" pitchFamily="18" charset="0"/>
-                <a:cs typeface="Times New Roman" panose="02020603050405020304" pitchFamily="18" charset="0"/>
-              </a:rPr>
-              <a:t> </a:t>
-            </a:r>
-            <a:r>
-              <a:rPr lang="en-US" sz="3200" dirty="0" err="1">
-                <a:latin typeface="Times New Roman" panose="02020603050405020304" pitchFamily="18" charset="0"/>
-                <a:cs typeface="Times New Roman" panose="02020603050405020304" pitchFamily="18" charset="0"/>
-              </a:rPr>
-              <a:t>thể</a:t>
-            </a:r>
-            <a:r>
-              <a:rPr lang="en-US" sz="3200" dirty="0">
-                <a:latin typeface="Times New Roman" panose="02020603050405020304" pitchFamily="18" charset="0"/>
-                <a:cs typeface="Times New Roman" panose="02020603050405020304" pitchFamily="18" charset="0"/>
-              </a:rPr>
-              <a:t> </a:t>
-            </a:r>
-            <a:r>
-              <a:rPr lang="en-US" sz="3200" dirty="0" err="1">
-                <a:latin typeface="Times New Roman" panose="02020603050405020304" pitchFamily="18" charset="0"/>
-                <a:cs typeface="Times New Roman" panose="02020603050405020304" pitchFamily="18" charset="0"/>
-              </a:rPr>
-              <a:t>tự</a:t>
-            </a:r>
-            <a:r>
-              <a:rPr lang="en-US" sz="3200" dirty="0">
-                <a:latin typeface="Times New Roman" panose="02020603050405020304" pitchFamily="18" charset="0"/>
-                <a:cs typeface="Times New Roman" panose="02020603050405020304" pitchFamily="18" charset="0"/>
-              </a:rPr>
-              <a:t> </a:t>
-            </a:r>
-            <a:r>
-              <a:rPr lang="en-US" sz="3200" dirty="0" err="1">
-                <a:latin typeface="Times New Roman" panose="02020603050405020304" pitchFamily="18" charset="0"/>
-                <a:cs typeface="Times New Roman" panose="02020603050405020304" pitchFamily="18" charset="0"/>
-              </a:rPr>
-              <a:t>động</a:t>
-            </a:r>
-            <a:r>
-              <a:rPr lang="en-US" sz="3200" dirty="0">
-                <a:latin typeface="Times New Roman" panose="02020603050405020304" pitchFamily="18" charset="0"/>
-                <a:cs typeface="Times New Roman" panose="02020603050405020304" pitchFamily="18" charset="0"/>
-              </a:rPr>
-              <a:t> </a:t>
-            </a:r>
-            <a:r>
-              <a:rPr lang="en-US" sz="3200" dirty="0" err="1">
-                <a:latin typeface="Times New Roman" panose="02020603050405020304" pitchFamily="18" charset="0"/>
-                <a:cs typeface="Times New Roman" panose="02020603050405020304" pitchFamily="18" charset="0"/>
-              </a:rPr>
-              <a:t>nén</a:t>
-            </a:r>
-            <a:r>
-              <a:rPr lang="en-US" sz="3200" dirty="0">
-                <a:latin typeface="Times New Roman" panose="02020603050405020304" pitchFamily="18" charset="0"/>
-                <a:cs typeface="Times New Roman" panose="02020603050405020304" pitchFamily="18" charset="0"/>
-              </a:rPr>
-              <a:t> </a:t>
-            </a:r>
-            <a:r>
-              <a:rPr lang="en-US" sz="3200" dirty="0" err="1">
-                <a:latin typeface="Times New Roman" panose="02020603050405020304" pitchFamily="18" charset="0"/>
-                <a:cs typeface="Times New Roman" panose="02020603050405020304" pitchFamily="18" charset="0"/>
-              </a:rPr>
-              <a:t>tập</a:t>
-            </a:r>
-            <a:r>
-              <a:rPr lang="en-US" sz="3200" dirty="0">
-                <a:latin typeface="Times New Roman" panose="02020603050405020304" pitchFamily="18" charset="0"/>
-                <a:cs typeface="Times New Roman" panose="02020603050405020304" pitchFamily="18" charset="0"/>
-              </a:rPr>
-              <a:t> tin CSS.</a:t>
-            </a:r>
-          </a:p>
-        </p:txBody>
-      </p:sp>
-    </p:spTree>
-    <p:extLst>
-      <p:ext uri="{BB962C8B-B14F-4D97-AF65-F5344CB8AC3E}">
-        <p14:creationId xmlns:p14="http://schemas.microsoft.com/office/powerpoint/2010/main" val="2797218876"/>
-      </p:ext>
-    </p:extLst>
-  </p:cSld>
-  <p:clrMapOvr>
-    <a:masterClrMapping/>
-  </p:clrMapOvr>
-  <mc:AlternateContent xmlns:mc="http://schemas.openxmlformats.org/markup-compatibility/2006" xmlns:p14="http://schemas.microsoft.com/office/powerpoint/2010/main">
-    <mc:Choice Requires="p14">
-      <p:transition spd="slow" p14:dur="2000">
-        <p:split orient="vert"/>
-      </p:transition>
-    </mc:Choice>
-    <mc:Fallback xmlns="">
-      <p:transition spd="slow">
-        <p:split orient="vert"/>
-      </p:transition>
-    </mc:Fallback>
-  </mc:AlternateContent>
-  <p:timing>
-    <p:tnLst>
-      <p:par>
-        <p:cTn id="1" dur="indefinite" restart="never" nodeType="tmRoot">
-          <p:childTnLst>
-            <p:seq concurrent="1" nextAc="seek">
-              <p:cTn id="2" dur="indefinite" nodeType="mainSeq">
-                <p:childTnLst>
-                  <p:par>
-                    <p:cTn id="3" fill="hold">
-                      <p:stCondLst>
-                        <p:cond delay="indefinite"/>
-                      </p:stCondLst>
-                      <p:childTnLst>
-                        <p:par>
-                          <p:cTn id="4" fill="hold">
-                            <p:stCondLst>
-                              <p:cond delay="0"/>
-                            </p:stCondLst>
-                            <p:childTnLst>
-                              <p:par>
-                                <p:cTn id="5" presetID="42" presetClass="entr" presetSubtype="0" fill="hold" grpId="0" nodeType="clickEffect">
-                                  <p:stCondLst>
-                                    <p:cond delay="0"/>
-                                  </p:stCondLst>
-                                  <p:childTnLst>
-                                    <p:set>
-                                      <p:cBhvr>
-                                        <p:cTn id="6" dur="1" fill="hold">
-                                          <p:stCondLst>
-                                            <p:cond delay="0"/>
-                                          </p:stCondLst>
-                                        </p:cTn>
-                                        <p:tgtEl>
-                                          <p:spTgt spid="2"/>
-                                        </p:tgtEl>
-                                        <p:attrNameLst>
-                                          <p:attrName>style.visibility</p:attrName>
-                                        </p:attrNameLst>
-                                      </p:cBhvr>
-                                      <p:to>
-                                        <p:strVal val="visible"/>
-                                      </p:to>
-                                    </p:set>
-                                    <p:animEffect transition="in" filter="fade">
-                                      <p:cBhvr>
-                                        <p:cTn id="7" dur="1000"/>
-                                        <p:tgtEl>
-                                          <p:spTgt spid="2"/>
-                                        </p:tgtEl>
-                                      </p:cBhvr>
-                                    </p:animEffect>
-                                    <p:anim calcmode="lin" valueType="num">
-                                      <p:cBhvr>
-                                        <p:cTn id="8" dur="1000" fill="hold"/>
-                                        <p:tgtEl>
-                                          <p:spTgt spid="2"/>
-                                        </p:tgtEl>
-                                        <p:attrNameLst>
-                                          <p:attrName>ppt_x</p:attrName>
-                                        </p:attrNameLst>
-                                      </p:cBhvr>
-                                      <p:tavLst>
-                                        <p:tav tm="0">
-                                          <p:val>
-                                            <p:strVal val="#ppt_x"/>
-                                          </p:val>
-                                        </p:tav>
-                                        <p:tav tm="100000">
-                                          <p:val>
-                                            <p:strVal val="#ppt_x"/>
-                                          </p:val>
-                                        </p:tav>
-                                      </p:tavLst>
-                                    </p:anim>
-                                    <p:anim calcmode="lin" valueType="num">
-                                      <p:cBhvr>
-                                        <p:cTn id="9" dur="1000" fill="hold"/>
-                                        <p:tgtEl>
-                                          <p:spTgt spid="2"/>
-                                        </p:tgtEl>
-                                        <p:attrNameLst>
-                                          <p:attrName>ppt_y</p:attrName>
-                                        </p:attrNameLst>
-                                      </p:cBhvr>
-                                      <p:tavLst>
-                                        <p:tav tm="0">
-                                          <p:val>
-                                            <p:strVal val="#ppt_y+.1"/>
-                                          </p:val>
-                                        </p:tav>
-                                        <p:tav tm="100000">
-                                          <p:val>
-                                            <p:strVal val="#ppt_y"/>
-                                          </p:val>
-                                        </p:tav>
-                                      </p:tavLst>
-                                    </p:anim>
-                                  </p:childTnLst>
-                                </p:cTn>
-                              </p:par>
-                            </p:childTnLst>
-                          </p:cTn>
-                        </p:par>
-                      </p:childTnLst>
-                    </p:cTn>
-                  </p:par>
-                  <p:par>
-                    <p:cTn id="10" fill="hold">
-                      <p:stCondLst>
-                        <p:cond delay="indefinite"/>
-                      </p:stCondLst>
-                      <p:childTnLst>
-                        <p:par>
-                          <p:cTn id="11" fill="hold">
-                            <p:stCondLst>
-                              <p:cond delay="0"/>
-                            </p:stCondLst>
-                            <p:childTnLst>
-                              <p:par>
-                                <p:cTn id="12" presetID="22" presetClass="entr" presetSubtype="4" fill="hold" grpId="0" nodeType="clickEffect">
-                                  <p:stCondLst>
-                                    <p:cond delay="0"/>
-                                  </p:stCondLst>
-                                  <p:childTnLst>
-                                    <p:set>
-                                      <p:cBhvr>
-                                        <p:cTn id="13" dur="1" fill="hold">
-                                          <p:stCondLst>
-                                            <p:cond delay="0"/>
-                                          </p:stCondLst>
-                                        </p:cTn>
-                                        <p:tgtEl>
-                                          <p:spTgt spid="3">
-                                            <p:txEl>
-                                              <p:pRg st="0" end="0"/>
-                                            </p:txEl>
-                                          </p:spTgt>
-                                        </p:tgtEl>
-                                        <p:attrNameLst>
-                                          <p:attrName>style.visibility</p:attrName>
-                                        </p:attrNameLst>
-                                      </p:cBhvr>
-                                      <p:to>
-                                        <p:strVal val="visible"/>
-                                      </p:to>
-                                    </p:set>
-                                    <p:animEffect transition="in" filter="wipe(down)">
-                                      <p:cBhvr>
-                                        <p:cTn id="14" dur="500"/>
-                                        <p:tgtEl>
-                                          <p:spTgt spid="3">
-                                            <p:txEl>
-                                              <p:pRg st="0" end="0"/>
-                                            </p:txEl>
-                                          </p:spTgt>
-                                        </p:tgtEl>
-                                      </p:cBhvr>
-                                    </p:animEffect>
-                                  </p:childTnLst>
-                                </p:cTn>
-                              </p:par>
-                            </p:childTnLst>
-                          </p:cTn>
-                        </p:par>
-                      </p:childTnLst>
-                    </p:cTn>
-                  </p:par>
-                  <p:par>
-                    <p:cTn id="15" fill="hold">
-                      <p:stCondLst>
-                        <p:cond delay="indefinite"/>
-                      </p:stCondLst>
-                      <p:childTnLst>
-                        <p:par>
-                          <p:cTn id="16" fill="hold">
-                            <p:stCondLst>
-                              <p:cond delay="0"/>
-                            </p:stCondLst>
-                            <p:childTnLst>
-                              <p:par>
-                                <p:cTn id="17" presetID="22" presetClass="entr" presetSubtype="4" fill="hold" grpId="0" nodeType="clickEffect">
-                                  <p:stCondLst>
-                                    <p:cond delay="0"/>
-                                  </p:stCondLst>
-                                  <p:childTnLst>
-                                    <p:set>
-                                      <p:cBhvr>
-                                        <p:cTn id="18" dur="1" fill="hold">
-                                          <p:stCondLst>
-                                            <p:cond delay="0"/>
-                                          </p:stCondLst>
-                                        </p:cTn>
-                                        <p:tgtEl>
-                                          <p:spTgt spid="3">
-                                            <p:txEl>
-                                              <p:pRg st="1" end="1"/>
-                                            </p:txEl>
-                                          </p:spTgt>
-                                        </p:tgtEl>
-                                        <p:attrNameLst>
-                                          <p:attrName>style.visibility</p:attrName>
-                                        </p:attrNameLst>
-                                      </p:cBhvr>
-                                      <p:to>
-                                        <p:strVal val="visible"/>
-                                      </p:to>
-                                    </p:set>
-                                    <p:animEffect transition="in" filter="wipe(down)">
-                                      <p:cBhvr>
-                                        <p:cTn id="19" dur="500"/>
-                                        <p:tgtEl>
-                                          <p:spTgt spid="3">
-                                            <p:txEl>
-                                              <p:pRg st="1" end="1"/>
-                                            </p:txEl>
-                                          </p:spTgt>
-                                        </p:tgtEl>
-                                      </p:cBhvr>
-                                    </p:animEffect>
-                                  </p:childTnLst>
-                                </p:cTn>
-                              </p:par>
-                            </p:childTnLst>
-                          </p:cTn>
-                        </p:par>
-                      </p:childTnLst>
-                    </p:cTn>
-                  </p:par>
-                  <p:par>
-                    <p:cTn id="20" fill="hold">
-                      <p:stCondLst>
-                        <p:cond delay="indefinite"/>
-                      </p:stCondLst>
-                      <p:childTnLst>
-                        <p:par>
-                          <p:cTn id="21" fill="hold">
-                            <p:stCondLst>
-                              <p:cond delay="0"/>
-                            </p:stCondLst>
-                            <p:childTnLst>
-                              <p:par>
-                                <p:cTn id="22" presetID="22" presetClass="entr" presetSubtype="4" fill="hold" grpId="0" nodeType="clickEffect">
-                                  <p:stCondLst>
-                                    <p:cond delay="0"/>
-                                  </p:stCondLst>
-                                  <p:childTnLst>
-                                    <p:set>
-                                      <p:cBhvr>
-                                        <p:cTn id="23" dur="1" fill="hold">
-                                          <p:stCondLst>
-                                            <p:cond delay="0"/>
-                                          </p:stCondLst>
-                                        </p:cTn>
-                                        <p:tgtEl>
-                                          <p:spTgt spid="3">
-                                            <p:txEl>
-                                              <p:pRg st="2" end="2"/>
-                                            </p:txEl>
-                                          </p:spTgt>
-                                        </p:tgtEl>
-                                        <p:attrNameLst>
-                                          <p:attrName>style.visibility</p:attrName>
-                                        </p:attrNameLst>
-                                      </p:cBhvr>
-                                      <p:to>
-                                        <p:strVal val="visible"/>
-                                      </p:to>
-                                    </p:set>
-                                    <p:animEffect transition="in" filter="wipe(down)">
-                                      <p:cBhvr>
-                                        <p:cTn id="24" dur="500"/>
-                                        <p:tgtEl>
-                                          <p:spTgt spid="3">
-                                            <p:txEl>
-                                              <p:pRg st="2" end="2"/>
-                                            </p:txEl>
-                                          </p:spTgt>
-                                        </p:tgtEl>
-                                      </p:cBhvr>
-                                    </p:animEffect>
-                                  </p:childTnLst>
-                                </p:cTn>
-                              </p:par>
-                            </p:childTnLst>
-                          </p:cTn>
-                        </p:par>
-                      </p:childTnLst>
-                    </p:cTn>
-                  </p:par>
-                  <p:par>
-                    <p:cTn id="25" fill="hold">
-                      <p:stCondLst>
-                        <p:cond delay="indefinite"/>
-                      </p:stCondLst>
-                      <p:childTnLst>
-                        <p:par>
-                          <p:cTn id="26" fill="hold">
-                            <p:stCondLst>
-                              <p:cond delay="0"/>
-                            </p:stCondLst>
-                            <p:childTnLst>
-                              <p:par>
-                                <p:cTn id="27" presetID="22" presetClass="entr" presetSubtype="4" fill="hold" grpId="0" nodeType="clickEffect">
-                                  <p:stCondLst>
-                                    <p:cond delay="0"/>
-                                  </p:stCondLst>
-                                  <p:childTnLst>
-                                    <p:set>
-                                      <p:cBhvr>
-                                        <p:cTn id="28" dur="1" fill="hold">
-                                          <p:stCondLst>
-                                            <p:cond delay="0"/>
-                                          </p:stCondLst>
-                                        </p:cTn>
-                                        <p:tgtEl>
-                                          <p:spTgt spid="3">
-                                            <p:txEl>
-                                              <p:pRg st="3" end="3"/>
-                                            </p:txEl>
-                                          </p:spTgt>
-                                        </p:tgtEl>
-                                        <p:attrNameLst>
-                                          <p:attrName>style.visibility</p:attrName>
-                                        </p:attrNameLst>
-                                      </p:cBhvr>
-                                      <p:to>
-                                        <p:strVal val="visible"/>
-                                      </p:to>
-                                    </p:set>
-                                    <p:animEffect transition="in" filter="wipe(down)">
-                                      <p:cBhvr>
-                                        <p:cTn id="29" dur="500"/>
-                                        <p:tgtEl>
-                                          <p:spTgt spid="3">
-                                            <p:txEl>
-                                              <p:pRg st="3" end="3"/>
-                                            </p:txEl>
-                                          </p:spTgt>
-                                        </p:tgtEl>
-                                      </p:cBhvr>
-                                    </p:animEffect>
-                                  </p:childTnLst>
-                                </p:cTn>
-                              </p:par>
-                            </p:childTnLst>
-                          </p:cTn>
-                        </p:par>
-                      </p:childTnLst>
-                    </p:cTn>
-                  </p:par>
-                  <p:par>
-                    <p:cTn id="30" fill="hold">
-                      <p:stCondLst>
-                        <p:cond delay="indefinite"/>
-                      </p:stCondLst>
-                      <p:childTnLst>
-                        <p:par>
-                          <p:cTn id="31" fill="hold">
-                            <p:stCondLst>
-                              <p:cond delay="0"/>
-                            </p:stCondLst>
-                            <p:childTnLst>
-                              <p:par>
-                                <p:cTn id="32" presetID="22" presetClass="entr" presetSubtype="4" fill="hold" grpId="0" nodeType="clickEffect">
-                                  <p:stCondLst>
-                                    <p:cond delay="0"/>
-                                  </p:stCondLst>
-                                  <p:childTnLst>
-                                    <p:set>
-                                      <p:cBhvr>
-                                        <p:cTn id="33" dur="1" fill="hold">
-                                          <p:stCondLst>
-                                            <p:cond delay="0"/>
-                                          </p:stCondLst>
-                                        </p:cTn>
-                                        <p:tgtEl>
-                                          <p:spTgt spid="3">
-                                            <p:txEl>
-                                              <p:pRg st="4" end="4"/>
-                                            </p:txEl>
-                                          </p:spTgt>
-                                        </p:tgtEl>
-                                        <p:attrNameLst>
-                                          <p:attrName>style.visibility</p:attrName>
-                                        </p:attrNameLst>
-                                      </p:cBhvr>
-                                      <p:to>
-                                        <p:strVal val="visible"/>
-                                      </p:to>
-                                    </p:set>
-                                    <p:animEffect transition="in" filter="wipe(down)">
-                                      <p:cBhvr>
-                                        <p:cTn id="34" dur="500"/>
-                                        <p:tgtEl>
-                                          <p:spTgt spid="3">
-                                            <p:txEl>
-                                              <p:pRg st="4" end="4"/>
-                                            </p:txEl>
-                                          </p:spTgt>
-                                        </p:tgtEl>
-                                      </p:cBhvr>
-                                    </p:animEffect>
-                                  </p:childTnLst>
-                                </p:cTn>
-                              </p:par>
-                            </p:childTnLst>
-                          </p:cTn>
-                        </p:par>
-                      </p:childTnLst>
-                    </p:cTn>
-                  </p:par>
-                </p:childTnLst>
-              </p:cTn>
-              <p:prevCondLst>
-                <p:cond evt="onPrev" delay="0">
-                  <p:tgtEl>
-                    <p:sldTgt/>
-                  </p:tgtEl>
-                </p:cond>
-              </p:prevCondLst>
-              <p:nextCondLst>
-                <p:cond evt="onNext" delay="0">
-                  <p:tgtEl>
-                    <p:sldTgt/>
-                  </p:tgtEl>
-                </p:cond>
-              </p:nextCondLst>
-            </p:seq>
-          </p:childTnLst>
-        </p:cTn>
-      </p:par>
-    </p:tnLst>
-    <p:bldLst>
-      <p:bldP spid="2" grpId="0"/>
-      <p:bldP spid="3" grpId="0" build="p"/>
-    </p:bldLst>
-  </p:timing>
-</p:sld>
-</file>
-
-<file path=ppt/slides/slide4.xml><?xml version="1.0" encoding="utf-8"?>
-<p:sld xmlns:a="http://schemas.openxmlformats.org/drawingml/2006/main" xmlns:r="http://schemas.openxmlformats.org/officeDocument/2006/relationships" xmlns:p="http://schemas.openxmlformats.org/presentationml/2006/main">
-  <p:cSld>
-    <p:spTree>
-      <p:nvGrpSpPr>
-        <p:cNvPr id="1" name=""/>
-        <p:cNvGrpSpPr/>
-        <p:nvPr/>
-      </p:nvGrpSpPr>
-      <p:grpSpPr>
-        <a:xfrm>
-          <a:off x="0" y="0"/>
-          <a:ext cx="0" cy="0"/>
-          <a:chOff x="0" y="0"/>
-          <a:chExt cx="0" cy="0"/>
-        </a:xfrm>
-      </p:grpSpPr>
       <p:graphicFrame>
         <p:nvGraphicFramePr>
           <p:cNvPr id="8" name="Content Placeholder 7"/>
@@ -16611,14 +15550,14 @@
             <p:ph idx="1"/>
             <p:extLst>
               <p:ext uri="{D42A27DB-BD31-4B8C-83A1-F6EECF244321}">
-                <p14:modId xmlns:p14="http://schemas.microsoft.com/office/powerpoint/2010/main" val="108304283"/>
+                <p14:modId xmlns:p14="http://schemas.microsoft.com/office/powerpoint/2010/main" val="1572191381"/>
               </p:ext>
             </p:extLst>
           </p:nvPr>
         </p:nvGraphicFramePr>
         <p:xfrm>
-          <a:off x="2815624" y="257577"/>
-          <a:ext cx="8596668" cy="6426558"/>
+          <a:off x="2815624" y="103031"/>
+          <a:ext cx="8596668" cy="6581104"/>
         </p:xfrm>
         <a:graphic>
           <a:graphicData uri="http://schemas.openxmlformats.org/drawingml/2006/diagram">
@@ -16688,7 +15627,7 @@
         </p:nvSpPr>
         <p:spPr>
           <a:xfrm>
-            <a:off x="3038621" y="427033"/>
+            <a:off x="3038621" y="298244"/>
             <a:ext cx="548640" cy="769441"/>
           </a:xfrm>
           <a:prstGeom prst="rect">
@@ -16730,7 +15669,7 @@
         </p:nvSpPr>
         <p:spPr>
           <a:xfrm>
-            <a:off x="3587261" y="1320300"/>
+            <a:off x="3587261" y="1217268"/>
             <a:ext cx="548640" cy="769441"/>
           </a:xfrm>
           <a:prstGeom prst="rect">
@@ -16772,7 +15711,7 @@
         </p:nvSpPr>
         <p:spPr>
           <a:xfrm>
-            <a:off x="3913097" y="2169848"/>
+            <a:off x="3925976" y="2118332"/>
             <a:ext cx="548640" cy="769441"/>
           </a:xfrm>
           <a:prstGeom prst="rect">
@@ -16814,7 +15753,7 @@
         </p:nvSpPr>
         <p:spPr>
           <a:xfrm>
-            <a:off x="4008895" y="3113582"/>
+            <a:off x="4060411" y="3010550"/>
             <a:ext cx="548640" cy="646331"/>
           </a:xfrm>
           <a:prstGeom prst="rect">
@@ -16856,7 +15795,7 @@
         </p:nvSpPr>
         <p:spPr>
           <a:xfrm>
-            <a:off x="3913097" y="3934206"/>
+            <a:off x="3938855" y="3895569"/>
             <a:ext cx="548640" cy="769441"/>
           </a:xfrm>
           <a:prstGeom prst="rect">
@@ -16964,33 +15903,26 @@
               </a:rPr>
               <a:t>7</a:t>
             </a:r>
-            <a:endParaRPr lang="en-US" sz="3600" b="1" dirty="0">
-              <a:solidFill>
-                <a:schemeClr val="accent4"/>
-              </a:solidFill>
-              <a:latin typeface="Times New Roman" panose="02020603050405020304" pitchFamily="18" charset="0"/>
-              <a:cs typeface="Times New Roman" panose="02020603050405020304" pitchFamily="18" charset="0"/>
-            </a:endParaRPr>
           </a:p>
         </p:txBody>
       </p:sp>
     </p:spTree>
     <p:extLst>
       <p:ext uri="{BB962C8B-B14F-4D97-AF65-F5344CB8AC3E}">
-        <p14:creationId xmlns:p14="http://schemas.microsoft.com/office/powerpoint/2010/main" val="3320237644"/>
+        <p14:creationId xmlns:p14="http://schemas.microsoft.com/office/powerpoint/2010/main" val="1832477226"/>
       </p:ext>
     </p:extLst>
   </p:cSld>
   <p:clrMapOvr>
     <a:masterClrMapping/>
   </p:clrMapOvr>
-  <mc:AlternateContent xmlns:mc="http://schemas.openxmlformats.org/markup-compatibility/2006" xmlns:p14="http://schemas.microsoft.com/office/powerpoint/2010/main">
-    <mc:Choice Requires="p14">
+  <mc:AlternateContent xmlns:mc="http://schemas.openxmlformats.org/markup-compatibility/2006">
+    <mc:Choice xmlns:p14="http://schemas.microsoft.com/office/powerpoint/2010/main" Requires="p14">
       <p:transition spd="slow" p14:dur="2000">
         <p:split orient="vert"/>
       </p:transition>
     </mc:Choice>
-    <mc:Fallback xmlns="">
+    <mc:Fallback>
       <p:transition spd="slow">
         <p:split orient="vert"/>
       </p:transition>
@@ -17761,6 +16693,1627 @@
 </p:sld>
 </file>
 
+<file path=ppt/slides/slide3.xml><?xml version="1.0" encoding="utf-8"?>
+<p:sld xmlns:a="http://schemas.openxmlformats.org/drawingml/2006/main" xmlns:r="http://schemas.openxmlformats.org/officeDocument/2006/relationships" xmlns:p="http://schemas.openxmlformats.org/presentationml/2006/main">
+  <p:cSld>
+    <p:spTree>
+      <p:nvGrpSpPr>
+        <p:cNvPr id="1" name=""/>
+        <p:cNvGrpSpPr/>
+        <p:nvPr/>
+      </p:nvGrpSpPr>
+      <p:grpSpPr>
+        <a:xfrm>
+          <a:off x="0" y="0"/>
+          <a:ext cx="0" cy="0"/>
+          <a:chOff x="0" y="0"/>
+          <a:chExt cx="0" cy="0"/>
+        </a:xfrm>
+      </p:grpSpPr>
+      <p:sp>
+        <p:nvSpPr>
+          <p:cNvPr id="2" name="Title 1"/>
+          <p:cNvSpPr>
+            <a:spLocks noGrp="1"/>
+          </p:cNvSpPr>
+          <p:nvPr>
+            <p:ph type="title"/>
+          </p:nvPr>
+        </p:nvSpPr>
+        <p:spPr/>
+        <p:txBody>
+          <a:bodyPr>
+            <a:noAutofit/>
+          </a:bodyPr>
+          <a:lstStyle/>
+          <a:p>
+            <a:r>
+              <a:rPr lang="en-US" sz="6000" b="1" dirty="0">
+                <a:solidFill>
+                  <a:srgbClr val="0070C0"/>
+                </a:solidFill>
+                <a:latin typeface="Times New Roman" panose="02020603050405020304" pitchFamily="18" charset="0"/>
+                <a:cs typeface="Times New Roman" panose="02020603050405020304" pitchFamily="18" charset="0"/>
+              </a:rPr>
+              <a:t>CSS Preprocessor</a:t>
+            </a:r>
+            <a:r>
+              <a:rPr lang="en-US" sz="4800" b="1" dirty="0">
+                <a:solidFill>
+                  <a:srgbClr val="0070C0"/>
+                </a:solidFill>
+              </a:rPr>
+              <a:t/>
+            </a:r>
+            <a:br>
+              <a:rPr lang="en-US" sz="4800" b="1" dirty="0">
+                <a:solidFill>
+                  <a:srgbClr val="0070C0"/>
+                </a:solidFill>
+              </a:rPr>
+            </a:br>
+            <a:endParaRPr lang="en-US" sz="4800" dirty="0">
+              <a:solidFill>
+                <a:srgbClr val="0070C0"/>
+              </a:solidFill>
+            </a:endParaRPr>
+          </a:p>
+        </p:txBody>
+      </p:sp>
+      <p:sp>
+        <p:nvSpPr>
+          <p:cNvPr id="3" name="Content Placeholder 2"/>
+          <p:cNvSpPr>
+            <a:spLocks noGrp="1"/>
+          </p:cNvSpPr>
+          <p:nvPr>
+            <p:ph idx="1"/>
+          </p:nvPr>
+        </p:nvSpPr>
+        <p:spPr>
+          <a:xfrm>
+            <a:off x="644904" y="2076182"/>
+            <a:ext cx="10876536" cy="3880773"/>
+          </a:xfrm>
+        </p:spPr>
+        <p:txBody>
+          <a:bodyPr>
+            <a:normAutofit/>
+          </a:bodyPr>
+          <a:lstStyle/>
+          <a:p>
+            <a:pPr>
+              <a:buClr>
+                <a:schemeClr val="tx1"/>
+              </a:buClr>
+              <a:buFont typeface="Wingdings" panose="05000000000000000000" pitchFamily="2" charset="2"/>
+              <a:buChar char="Ø"/>
+            </a:pPr>
+            <a:r>
+              <a:rPr lang="en-US" sz="3200" dirty="0" err="1" smtClean="0">
+                <a:latin typeface="Times New Roman" panose="02020603050405020304" pitchFamily="18" charset="0"/>
+                <a:cs typeface="Times New Roman" panose="02020603050405020304" pitchFamily="18" charset="0"/>
+              </a:rPr>
+              <a:t>Ngôn</a:t>
+            </a:r>
+            <a:r>
+              <a:rPr lang="en-US" sz="3200" dirty="0" smtClean="0">
+                <a:latin typeface="Times New Roman" panose="02020603050405020304" pitchFamily="18" charset="0"/>
+                <a:cs typeface="Times New Roman" panose="02020603050405020304" pitchFamily="18" charset="0"/>
+              </a:rPr>
+              <a:t> </a:t>
+            </a:r>
+            <a:r>
+              <a:rPr lang="en-US" sz="3200" dirty="0" err="1">
+                <a:latin typeface="Times New Roman" panose="02020603050405020304" pitchFamily="18" charset="0"/>
+                <a:cs typeface="Times New Roman" panose="02020603050405020304" pitchFamily="18" charset="0"/>
+              </a:rPr>
+              <a:t>ngữ</a:t>
+            </a:r>
+            <a:r>
+              <a:rPr lang="en-US" sz="3200" dirty="0">
+                <a:latin typeface="Times New Roman" panose="02020603050405020304" pitchFamily="18" charset="0"/>
+                <a:cs typeface="Times New Roman" panose="02020603050405020304" pitchFamily="18" charset="0"/>
+              </a:rPr>
+              <a:t> </a:t>
+            </a:r>
+            <a:r>
+              <a:rPr lang="en-US" sz="3200" dirty="0" err="1">
+                <a:latin typeface="Times New Roman" panose="02020603050405020304" pitchFamily="18" charset="0"/>
+                <a:cs typeface="Times New Roman" panose="02020603050405020304" pitchFamily="18" charset="0"/>
+              </a:rPr>
+              <a:t>kịch</a:t>
+            </a:r>
+            <a:r>
+              <a:rPr lang="en-US" sz="3200" dirty="0">
+                <a:latin typeface="Times New Roman" panose="02020603050405020304" pitchFamily="18" charset="0"/>
+                <a:cs typeface="Times New Roman" panose="02020603050405020304" pitchFamily="18" charset="0"/>
+              </a:rPr>
+              <a:t> </a:t>
+            </a:r>
+            <a:r>
+              <a:rPr lang="en-US" sz="3200" dirty="0" err="1">
+                <a:latin typeface="Times New Roman" panose="02020603050405020304" pitchFamily="18" charset="0"/>
+                <a:cs typeface="Times New Roman" panose="02020603050405020304" pitchFamily="18" charset="0"/>
+              </a:rPr>
+              <a:t>bản</a:t>
+            </a:r>
+            <a:r>
+              <a:rPr lang="en-US" sz="3200" dirty="0">
+                <a:latin typeface="Times New Roman" panose="02020603050405020304" pitchFamily="18" charset="0"/>
+                <a:cs typeface="Times New Roman" panose="02020603050405020304" pitchFamily="18" charset="0"/>
+              </a:rPr>
+              <a:t> </a:t>
+            </a:r>
+            <a:r>
+              <a:rPr lang="en-US" sz="3200" dirty="0" err="1">
+                <a:latin typeface="Times New Roman" panose="02020603050405020304" pitchFamily="18" charset="0"/>
+                <a:cs typeface="Times New Roman" panose="02020603050405020304" pitchFamily="18" charset="0"/>
+              </a:rPr>
+              <a:t>mở</a:t>
+            </a:r>
+            <a:r>
+              <a:rPr lang="en-US" sz="3200" dirty="0">
+                <a:latin typeface="Times New Roman" panose="02020603050405020304" pitchFamily="18" charset="0"/>
+                <a:cs typeface="Times New Roman" panose="02020603050405020304" pitchFamily="18" charset="0"/>
+              </a:rPr>
+              <a:t> </a:t>
+            </a:r>
+            <a:r>
+              <a:rPr lang="en-US" sz="3200" dirty="0" err="1">
+                <a:latin typeface="Times New Roman" panose="02020603050405020304" pitchFamily="18" charset="0"/>
+                <a:cs typeface="Times New Roman" panose="02020603050405020304" pitchFamily="18" charset="0"/>
+              </a:rPr>
+              <a:t>rộng</a:t>
+            </a:r>
+            <a:r>
+              <a:rPr lang="en-US" sz="3200" dirty="0">
+                <a:latin typeface="Times New Roman" panose="02020603050405020304" pitchFamily="18" charset="0"/>
+                <a:cs typeface="Times New Roman" panose="02020603050405020304" pitchFamily="18" charset="0"/>
+              </a:rPr>
+              <a:t> </a:t>
+            </a:r>
+            <a:r>
+              <a:rPr lang="en-US" sz="3200" dirty="0" err="1">
+                <a:latin typeface="Times New Roman" panose="02020603050405020304" pitchFamily="18" charset="0"/>
+                <a:cs typeface="Times New Roman" panose="02020603050405020304" pitchFamily="18" charset="0"/>
+              </a:rPr>
+              <a:t>của</a:t>
+            </a:r>
+            <a:r>
+              <a:rPr lang="en-US" sz="3200" dirty="0">
+                <a:latin typeface="Times New Roman" panose="02020603050405020304" pitchFamily="18" charset="0"/>
+                <a:cs typeface="Times New Roman" panose="02020603050405020304" pitchFamily="18" charset="0"/>
+              </a:rPr>
+              <a:t> </a:t>
+            </a:r>
+            <a:r>
+              <a:rPr lang="en-US" sz="3200" dirty="0" smtClean="0">
+                <a:latin typeface="Times New Roman" panose="02020603050405020304" pitchFamily="18" charset="0"/>
+                <a:cs typeface="Times New Roman" panose="02020603050405020304" pitchFamily="18" charset="0"/>
+              </a:rPr>
+              <a:t>CSS</a:t>
+            </a:r>
+          </a:p>
+          <a:p>
+            <a:pPr>
+              <a:buClr>
+                <a:schemeClr val="tx1"/>
+              </a:buClr>
+              <a:buFont typeface="Wingdings" panose="05000000000000000000" pitchFamily="2" charset="2"/>
+              <a:buChar char="Ø"/>
+            </a:pPr>
+            <a:r>
+              <a:rPr lang="en-US" sz="3200" dirty="0">
+                <a:latin typeface="Times New Roman" panose="02020603050405020304" pitchFamily="18" charset="0"/>
+                <a:cs typeface="Times New Roman" panose="02020603050405020304" pitchFamily="18" charset="0"/>
+              </a:rPr>
+              <a:t>B</a:t>
+            </a:r>
+            <a:r>
+              <a:rPr lang="vi-VN" sz="3200" dirty="0" smtClean="0">
+                <a:latin typeface="Times New Roman" panose="02020603050405020304" pitchFamily="18" charset="0"/>
+                <a:cs typeface="Times New Roman" panose="02020603050405020304" pitchFamily="18" charset="0"/>
+              </a:rPr>
+              <a:t>iên </a:t>
+            </a:r>
+            <a:r>
+              <a:rPr lang="vi-VN" sz="3200" dirty="0">
+                <a:latin typeface="Times New Roman" panose="02020603050405020304" pitchFamily="18" charset="0"/>
+                <a:cs typeface="Times New Roman" panose="02020603050405020304" pitchFamily="18" charset="0"/>
+              </a:rPr>
+              <a:t>dịch </a:t>
+            </a:r>
+            <a:r>
+              <a:rPr lang="vi-VN" sz="3200" dirty="0" smtClean="0">
+                <a:latin typeface="Times New Roman" panose="02020603050405020304" pitchFamily="18" charset="0"/>
+                <a:cs typeface="Times New Roman" panose="02020603050405020304" pitchFamily="18" charset="0"/>
+              </a:rPr>
+              <a:t>CSS </a:t>
+            </a:r>
+            <a:r>
+              <a:rPr lang="vi-VN" sz="3200" dirty="0">
+                <a:latin typeface="Times New Roman" panose="02020603050405020304" pitchFamily="18" charset="0"/>
+                <a:cs typeface="Times New Roman" panose="02020603050405020304" pitchFamily="18" charset="0"/>
+              </a:rPr>
+              <a:t>nhanh hơn và có cấu trúc rõ ràng </a:t>
+            </a:r>
+            <a:r>
+              <a:rPr lang="vi-VN" sz="3200" dirty="0" smtClean="0">
+                <a:latin typeface="Times New Roman" panose="02020603050405020304" pitchFamily="18" charset="0"/>
+                <a:cs typeface="Times New Roman" panose="02020603050405020304" pitchFamily="18" charset="0"/>
+              </a:rPr>
+              <a:t>hơn</a:t>
+            </a:r>
+            <a:r>
+              <a:rPr lang="en-US" sz="3200" dirty="0" smtClean="0">
+                <a:latin typeface="Times New Roman" panose="02020603050405020304" pitchFamily="18" charset="0"/>
+                <a:cs typeface="Times New Roman" panose="02020603050405020304" pitchFamily="18" charset="0"/>
+              </a:rPr>
+              <a:t>.</a:t>
+            </a:r>
+          </a:p>
+          <a:p>
+            <a:pPr>
+              <a:buClrTx/>
+              <a:buFont typeface="Wingdings" panose="05000000000000000000" pitchFamily="2" charset="2"/>
+              <a:buChar char="Ø"/>
+            </a:pPr>
+            <a:r>
+              <a:rPr lang="en-US" sz="3200" dirty="0" err="1" smtClean="0">
+                <a:latin typeface="Times New Roman" panose="02020603050405020304" pitchFamily="18" charset="0"/>
+                <a:cs typeface="Times New Roman" panose="02020603050405020304" pitchFamily="18" charset="0"/>
+              </a:rPr>
+              <a:t>Có</a:t>
+            </a:r>
+            <a:r>
+              <a:rPr lang="en-US" sz="3200" dirty="0" smtClean="0">
+                <a:latin typeface="Times New Roman" panose="02020603050405020304" pitchFamily="18" charset="0"/>
+                <a:cs typeface="Times New Roman" panose="02020603050405020304" pitchFamily="18" charset="0"/>
+              </a:rPr>
+              <a:t> </a:t>
+            </a:r>
+            <a:r>
+              <a:rPr lang="en-US" sz="3200" dirty="0" err="1">
+                <a:latin typeface="Times New Roman" panose="02020603050405020304" pitchFamily="18" charset="0"/>
+                <a:cs typeface="Times New Roman" panose="02020603050405020304" pitchFamily="18" charset="0"/>
+              </a:rPr>
+              <a:t>thể</a:t>
+            </a:r>
+            <a:r>
+              <a:rPr lang="en-US" sz="3200" dirty="0">
+                <a:latin typeface="Times New Roman" panose="02020603050405020304" pitchFamily="18" charset="0"/>
+                <a:cs typeface="Times New Roman" panose="02020603050405020304" pitchFamily="18" charset="0"/>
+              </a:rPr>
+              <a:t> </a:t>
+            </a:r>
+            <a:r>
+              <a:rPr lang="en-US" sz="3200" dirty="0" err="1">
+                <a:latin typeface="Times New Roman" panose="02020603050405020304" pitchFamily="18" charset="0"/>
+                <a:cs typeface="Times New Roman" panose="02020603050405020304" pitchFamily="18" charset="0"/>
+              </a:rPr>
+              <a:t>giúp</a:t>
+            </a:r>
+            <a:r>
+              <a:rPr lang="en-US" sz="3200" dirty="0">
+                <a:latin typeface="Times New Roman" panose="02020603050405020304" pitchFamily="18" charset="0"/>
+                <a:cs typeface="Times New Roman" panose="02020603050405020304" pitchFamily="18" charset="0"/>
+              </a:rPr>
+              <a:t> </a:t>
+            </a:r>
+            <a:r>
+              <a:rPr lang="en-US" sz="3200" dirty="0" err="1">
+                <a:latin typeface="Times New Roman" panose="02020603050405020304" pitchFamily="18" charset="0"/>
+                <a:cs typeface="Times New Roman" panose="02020603050405020304" pitchFamily="18" charset="0"/>
+              </a:rPr>
+              <a:t>bạn</a:t>
+            </a:r>
+            <a:r>
+              <a:rPr lang="en-US" sz="3200" dirty="0">
+                <a:latin typeface="Times New Roman" panose="02020603050405020304" pitchFamily="18" charset="0"/>
+                <a:cs typeface="Times New Roman" panose="02020603050405020304" pitchFamily="18" charset="0"/>
+              </a:rPr>
+              <a:t> </a:t>
+            </a:r>
+            <a:r>
+              <a:rPr lang="en-US" sz="3200" dirty="0" err="1">
+                <a:latin typeface="Times New Roman" panose="02020603050405020304" pitchFamily="18" charset="0"/>
+                <a:cs typeface="Times New Roman" panose="02020603050405020304" pitchFamily="18" charset="0"/>
+              </a:rPr>
+              <a:t>tiết</a:t>
+            </a:r>
+            <a:r>
+              <a:rPr lang="en-US" sz="3200" dirty="0">
+                <a:latin typeface="Times New Roman" panose="02020603050405020304" pitchFamily="18" charset="0"/>
+                <a:cs typeface="Times New Roman" panose="02020603050405020304" pitchFamily="18" charset="0"/>
+              </a:rPr>
+              <a:t> </a:t>
+            </a:r>
+            <a:r>
+              <a:rPr lang="en-US" sz="3200" dirty="0" err="1">
+                <a:latin typeface="Times New Roman" panose="02020603050405020304" pitchFamily="18" charset="0"/>
+                <a:cs typeface="Times New Roman" panose="02020603050405020304" pitchFamily="18" charset="0"/>
+              </a:rPr>
+              <a:t>kiệm</a:t>
+            </a:r>
+            <a:r>
+              <a:rPr lang="en-US" sz="3200" dirty="0">
+                <a:latin typeface="Times New Roman" panose="02020603050405020304" pitchFamily="18" charset="0"/>
+                <a:cs typeface="Times New Roman" panose="02020603050405020304" pitchFamily="18" charset="0"/>
+              </a:rPr>
+              <a:t> </a:t>
+            </a:r>
+            <a:r>
+              <a:rPr lang="en-US" sz="3200" dirty="0" err="1">
+                <a:latin typeface="Times New Roman" panose="02020603050405020304" pitchFamily="18" charset="0"/>
+                <a:cs typeface="Times New Roman" panose="02020603050405020304" pitchFamily="18" charset="0"/>
+              </a:rPr>
+              <a:t>thời</a:t>
+            </a:r>
+            <a:r>
+              <a:rPr lang="en-US" sz="3200" dirty="0">
+                <a:latin typeface="Times New Roman" panose="02020603050405020304" pitchFamily="18" charset="0"/>
+                <a:cs typeface="Times New Roman" panose="02020603050405020304" pitchFamily="18" charset="0"/>
+              </a:rPr>
+              <a:t> </a:t>
+            </a:r>
+            <a:r>
+              <a:rPr lang="en-US" sz="3200" dirty="0" err="1">
+                <a:latin typeface="Times New Roman" panose="02020603050405020304" pitchFamily="18" charset="0"/>
+                <a:cs typeface="Times New Roman" panose="02020603050405020304" pitchFamily="18" charset="0"/>
+              </a:rPr>
+              <a:t>gian</a:t>
+            </a:r>
+            <a:r>
+              <a:rPr lang="en-US" sz="3200" dirty="0">
+                <a:latin typeface="Times New Roman" panose="02020603050405020304" pitchFamily="18" charset="0"/>
+                <a:cs typeface="Times New Roman" panose="02020603050405020304" pitchFamily="18" charset="0"/>
+              </a:rPr>
+              <a:t> </a:t>
+            </a:r>
+            <a:r>
+              <a:rPr lang="en-US" sz="3200" dirty="0" err="1">
+                <a:latin typeface="Times New Roman" panose="02020603050405020304" pitchFamily="18" charset="0"/>
+                <a:cs typeface="Times New Roman" panose="02020603050405020304" pitchFamily="18" charset="0"/>
+              </a:rPr>
+              <a:t>viết</a:t>
+            </a:r>
+            <a:r>
+              <a:rPr lang="en-US" sz="3200" dirty="0">
+                <a:latin typeface="Times New Roman" panose="02020603050405020304" pitchFamily="18" charset="0"/>
+                <a:cs typeface="Times New Roman" panose="02020603050405020304" pitchFamily="18" charset="0"/>
+              </a:rPr>
+              <a:t> CSS, </a:t>
+            </a:r>
+            <a:r>
+              <a:rPr lang="en-US" sz="3200" dirty="0" err="1">
+                <a:latin typeface="Times New Roman" panose="02020603050405020304" pitchFamily="18" charset="0"/>
+                <a:cs typeface="Times New Roman" panose="02020603050405020304" pitchFamily="18" charset="0"/>
+              </a:rPr>
+              <a:t>dễ</a:t>
+            </a:r>
+            <a:r>
+              <a:rPr lang="en-US" sz="3200" dirty="0">
+                <a:latin typeface="Times New Roman" panose="02020603050405020304" pitchFamily="18" charset="0"/>
+                <a:cs typeface="Times New Roman" panose="02020603050405020304" pitchFamily="18" charset="0"/>
+              </a:rPr>
+              <a:t> </a:t>
+            </a:r>
+            <a:r>
+              <a:rPr lang="en-US" sz="3200" dirty="0" err="1">
+                <a:latin typeface="Times New Roman" panose="02020603050405020304" pitchFamily="18" charset="0"/>
+                <a:cs typeface="Times New Roman" panose="02020603050405020304" pitchFamily="18" charset="0"/>
+              </a:rPr>
+              <a:t>dàng</a:t>
+            </a:r>
+            <a:r>
+              <a:rPr lang="en-US" sz="3200" dirty="0">
+                <a:latin typeface="Times New Roman" panose="02020603050405020304" pitchFamily="18" charset="0"/>
+                <a:cs typeface="Times New Roman" panose="02020603050405020304" pitchFamily="18" charset="0"/>
+              </a:rPr>
+              <a:t> </a:t>
+            </a:r>
+            <a:r>
+              <a:rPr lang="en-US" sz="3200" dirty="0" err="1">
+                <a:latin typeface="Times New Roman" panose="02020603050405020304" pitchFamily="18" charset="0"/>
+                <a:cs typeface="Times New Roman" panose="02020603050405020304" pitchFamily="18" charset="0"/>
+              </a:rPr>
+              <a:t>bảo</a:t>
+            </a:r>
+            <a:r>
+              <a:rPr lang="en-US" sz="3200" dirty="0">
+                <a:latin typeface="Times New Roman" panose="02020603050405020304" pitchFamily="18" charset="0"/>
+                <a:cs typeface="Times New Roman" panose="02020603050405020304" pitchFamily="18" charset="0"/>
+              </a:rPr>
+              <a:t> </a:t>
+            </a:r>
+            <a:r>
+              <a:rPr lang="en-US" sz="3200" dirty="0" err="1">
+                <a:latin typeface="Times New Roman" panose="02020603050405020304" pitchFamily="18" charset="0"/>
+                <a:cs typeface="Times New Roman" panose="02020603050405020304" pitchFamily="18" charset="0"/>
+              </a:rPr>
+              <a:t>trì</a:t>
+            </a:r>
+            <a:r>
+              <a:rPr lang="en-US" sz="3200" dirty="0">
+                <a:latin typeface="Times New Roman" panose="02020603050405020304" pitchFamily="18" charset="0"/>
+                <a:cs typeface="Times New Roman" panose="02020603050405020304" pitchFamily="18" charset="0"/>
+              </a:rPr>
+              <a:t> </a:t>
+            </a:r>
+            <a:r>
+              <a:rPr lang="en-US" sz="3200" dirty="0" err="1">
+                <a:latin typeface="Times New Roman" panose="02020603050405020304" pitchFamily="18" charset="0"/>
+                <a:cs typeface="Times New Roman" panose="02020603050405020304" pitchFamily="18" charset="0"/>
+              </a:rPr>
+              <a:t>và</a:t>
+            </a:r>
+            <a:r>
+              <a:rPr lang="en-US" sz="3200" dirty="0">
+                <a:latin typeface="Times New Roman" panose="02020603050405020304" pitchFamily="18" charset="0"/>
+                <a:cs typeface="Times New Roman" panose="02020603050405020304" pitchFamily="18" charset="0"/>
+              </a:rPr>
+              <a:t> </a:t>
+            </a:r>
+            <a:r>
+              <a:rPr lang="en-US" sz="3200" dirty="0" err="1">
+                <a:latin typeface="Times New Roman" panose="02020603050405020304" pitchFamily="18" charset="0"/>
+                <a:cs typeface="Times New Roman" panose="02020603050405020304" pitchFamily="18" charset="0"/>
+              </a:rPr>
+              <a:t>phát</a:t>
+            </a:r>
+            <a:r>
+              <a:rPr lang="en-US" sz="3200" dirty="0">
+                <a:latin typeface="Times New Roman" panose="02020603050405020304" pitchFamily="18" charset="0"/>
+                <a:cs typeface="Times New Roman" panose="02020603050405020304" pitchFamily="18" charset="0"/>
+              </a:rPr>
+              <a:t> </a:t>
+            </a:r>
+            <a:r>
+              <a:rPr lang="en-US" sz="3200" dirty="0" err="1">
+                <a:latin typeface="Times New Roman" panose="02020603050405020304" pitchFamily="18" charset="0"/>
+                <a:cs typeface="Times New Roman" panose="02020603050405020304" pitchFamily="18" charset="0"/>
+              </a:rPr>
+              <a:t>triển</a:t>
+            </a:r>
+            <a:r>
+              <a:rPr lang="en-US" sz="3200" dirty="0">
+                <a:latin typeface="Times New Roman" panose="02020603050405020304" pitchFamily="18" charset="0"/>
+                <a:cs typeface="Times New Roman" panose="02020603050405020304" pitchFamily="18" charset="0"/>
+              </a:rPr>
+              <a:t> CSS,...</a:t>
+            </a:r>
+          </a:p>
+        </p:txBody>
+      </p:sp>
+    </p:spTree>
+    <p:extLst>
+      <p:ext uri="{BB962C8B-B14F-4D97-AF65-F5344CB8AC3E}">
+        <p14:creationId xmlns:p14="http://schemas.microsoft.com/office/powerpoint/2010/main" val="1957928922"/>
+      </p:ext>
+    </p:extLst>
+  </p:cSld>
+  <p:clrMapOvr>
+    <a:masterClrMapping/>
+  </p:clrMapOvr>
+  <mc:AlternateContent xmlns:mc="http://schemas.openxmlformats.org/markup-compatibility/2006" xmlns:p14="http://schemas.microsoft.com/office/powerpoint/2010/main">
+    <mc:Choice Requires="p14">
+      <p:transition spd="slow" p14:dur="2000">
+        <p:split orient="vert"/>
+      </p:transition>
+    </mc:Choice>
+    <mc:Fallback xmlns="">
+      <p:transition spd="slow">
+        <p:split orient="vert"/>
+      </p:transition>
+    </mc:Fallback>
+  </mc:AlternateContent>
+  <p:timing>
+    <p:tnLst>
+      <p:par>
+        <p:cTn id="1" dur="indefinite" restart="never" nodeType="tmRoot">
+          <p:childTnLst>
+            <p:seq concurrent="1" nextAc="seek">
+              <p:cTn id="2" dur="indefinite" nodeType="mainSeq">
+                <p:childTnLst>
+                  <p:par>
+                    <p:cTn id="3" fill="hold">
+                      <p:stCondLst>
+                        <p:cond delay="indefinite"/>
+                      </p:stCondLst>
+                      <p:childTnLst>
+                        <p:par>
+                          <p:cTn id="4" fill="hold">
+                            <p:stCondLst>
+                              <p:cond delay="0"/>
+                            </p:stCondLst>
+                            <p:childTnLst>
+                              <p:par>
+                                <p:cTn id="5" presetID="16" presetClass="entr" presetSubtype="21" fill="hold" grpId="0" nodeType="clickEffect">
+                                  <p:stCondLst>
+                                    <p:cond delay="0"/>
+                                  </p:stCondLst>
+                                  <p:childTnLst>
+                                    <p:set>
+                                      <p:cBhvr>
+                                        <p:cTn id="6" dur="1" fill="hold">
+                                          <p:stCondLst>
+                                            <p:cond delay="0"/>
+                                          </p:stCondLst>
+                                        </p:cTn>
+                                        <p:tgtEl>
+                                          <p:spTgt spid="2"/>
+                                        </p:tgtEl>
+                                        <p:attrNameLst>
+                                          <p:attrName>style.visibility</p:attrName>
+                                        </p:attrNameLst>
+                                      </p:cBhvr>
+                                      <p:to>
+                                        <p:strVal val="visible"/>
+                                      </p:to>
+                                    </p:set>
+                                    <p:animEffect transition="in" filter="barn(inVertical)">
+                                      <p:cBhvr>
+                                        <p:cTn id="7" dur="500"/>
+                                        <p:tgtEl>
+                                          <p:spTgt spid="2"/>
+                                        </p:tgtEl>
+                                      </p:cBhvr>
+                                    </p:animEffect>
+                                  </p:childTnLst>
+                                </p:cTn>
+                              </p:par>
+                            </p:childTnLst>
+                          </p:cTn>
+                        </p:par>
+                      </p:childTnLst>
+                    </p:cTn>
+                  </p:par>
+                  <p:par>
+                    <p:cTn id="8" fill="hold">
+                      <p:stCondLst>
+                        <p:cond delay="indefinite"/>
+                      </p:stCondLst>
+                      <p:childTnLst>
+                        <p:par>
+                          <p:cTn id="9" fill="hold">
+                            <p:stCondLst>
+                              <p:cond delay="0"/>
+                            </p:stCondLst>
+                            <p:childTnLst>
+                              <p:par>
+                                <p:cTn id="10" presetID="16" presetClass="entr" presetSubtype="21" fill="hold" grpId="0" nodeType="clickEffect">
+                                  <p:stCondLst>
+                                    <p:cond delay="0"/>
+                                  </p:stCondLst>
+                                  <p:childTnLst>
+                                    <p:set>
+                                      <p:cBhvr>
+                                        <p:cTn id="11" dur="1" fill="hold">
+                                          <p:stCondLst>
+                                            <p:cond delay="0"/>
+                                          </p:stCondLst>
+                                        </p:cTn>
+                                        <p:tgtEl>
+                                          <p:spTgt spid="3">
+                                            <p:txEl>
+                                              <p:pRg st="0" end="0"/>
+                                            </p:txEl>
+                                          </p:spTgt>
+                                        </p:tgtEl>
+                                        <p:attrNameLst>
+                                          <p:attrName>style.visibility</p:attrName>
+                                        </p:attrNameLst>
+                                      </p:cBhvr>
+                                      <p:to>
+                                        <p:strVal val="visible"/>
+                                      </p:to>
+                                    </p:set>
+                                    <p:animEffect transition="in" filter="barn(inVertical)">
+                                      <p:cBhvr>
+                                        <p:cTn id="12" dur="500"/>
+                                        <p:tgtEl>
+                                          <p:spTgt spid="3">
+                                            <p:txEl>
+                                              <p:pRg st="0" end="0"/>
+                                            </p:txEl>
+                                          </p:spTgt>
+                                        </p:tgtEl>
+                                      </p:cBhvr>
+                                    </p:animEffect>
+                                  </p:childTnLst>
+                                </p:cTn>
+                              </p:par>
+                            </p:childTnLst>
+                          </p:cTn>
+                        </p:par>
+                      </p:childTnLst>
+                    </p:cTn>
+                  </p:par>
+                  <p:par>
+                    <p:cTn id="13" fill="hold">
+                      <p:stCondLst>
+                        <p:cond delay="indefinite"/>
+                      </p:stCondLst>
+                      <p:childTnLst>
+                        <p:par>
+                          <p:cTn id="14" fill="hold">
+                            <p:stCondLst>
+                              <p:cond delay="0"/>
+                            </p:stCondLst>
+                            <p:childTnLst>
+                              <p:par>
+                                <p:cTn id="15" presetID="16" presetClass="entr" presetSubtype="21" fill="hold" grpId="0" nodeType="clickEffect">
+                                  <p:stCondLst>
+                                    <p:cond delay="0"/>
+                                  </p:stCondLst>
+                                  <p:childTnLst>
+                                    <p:set>
+                                      <p:cBhvr>
+                                        <p:cTn id="16" dur="1" fill="hold">
+                                          <p:stCondLst>
+                                            <p:cond delay="0"/>
+                                          </p:stCondLst>
+                                        </p:cTn>
+                                        <p:tgtEl>
+                                          <p:spTgt spid="3">
+                                            <p:txEl>
+                                              <p:pRg st="1" end="1"/>
+                                            </p:txEl>
+                                          </p:spTgt>
+                                        </p:tgtEl>
+                                        <p:attrNameLst>
+                                          <p:attrName>style.visibility</p:attrName>
+                                        </p:attrNameLst>
+                                      </p:cBhvr>
+                                      <p:to>
+                                        <p:strVal val="visible"/>
+                                      </p:to>
+                                    </p:set>
+                                    <p:animEffect transition="in" filter="barn(inVertical)">
+                                      <p:cBhvr>
+                                        <p:cTn id="17" dur="500"/>
+                                        <p:tgtEl>
+                                          <p:spTgt spid="3">
+                                            <p:txEl>
+                                              <p:pRg st="1" end="1"/>
+                                            </p:txEl>
+                                          </p:spTgt>
+                                        </p:tgtEl>
+                                      </p:cBhvr>
+                                    </p:animEffect>
+                                  </p:childTnLst>
+                                </p:cTn>
+                              </p:par>
+                            </p:childTnLst>
+                          </p:cTn>
+                        </p:par>
+                      </p:childTnLst>
+                    </p:cTn>
+                  </p:par>
+                  <p:par>
+                    <p:cTn id="18" fill="hold">
+                      <p:stCondLst>
+                        <p:cond delay="indefinite"/>
+                      </p:stCondLst>
+                      <p:childTnLst>
+                        <p:par>
+                          <p:cTn id="19" fill="hold">
+                            <p:stCondLst>
+                              <p:cond delay="0"/>
+                            </p:stCondLst>
+                            <p:childTnLst>
+                              <p:par>
+                                <p:cTn id="20" presetID="16" presetClass="entr" presetSubtype="21" fill="hold" grpId="0" nodeType="clickEffect">
+                                  <p:stCondLst>
+                                    <p:cond delay="0"/>
+                                  </p:stCondLst>
+                                  <p:childTnLst>
+                                    <p:set>
+                                      <p:cBhvr>
+                                        <p:cTn id="21" dur="1" fill="hold">
+                                          <p:stCondLst>
+                                            <p:cond delay="0"/>
+                                          </p:stCondLst>
+                                        </p:cTn>
+                                        <p:tgtEl>
+                                          <p:spTgt spid="3">
+                                            <p:txEl>
+                                              <p:pRg st="2" end="2"/>
+                                            </p:txEl>
+                                          </p:spTgt>
+                                        </p:tgtEl>
+                                        <p:attrNameLst>
+                                          <p:attrName>style.visibility</p:attrName>
+                                        </p:attrNameLst>
+                                      </p:cBhvr>
+                                      <p:to>
+                                        <p:strVal val="visible"/>
+                                      </p:to>
+                                    </p:set>
+                                    <p:animEffect transition="in" filter="barn(inVertical)">
+                                      <p:cBhvr>
+                                        <p:cTn id="22" dur="500"/>
+                                        <p:tgtEl>
+                                          <p:spTgt spid="3">
+                                            <p:txEl>
+                                              <p:pRg st="2" end="2"/>
+                                            </p:txEl>
+                                          </p:spTgt>
+                                        </p:tgtEl>
+                                      </p:cBhvr>
+                                    </p:animEffect>
+                                  </p:childTnLst>
+                                </p:cTn>
+                              </p:par>
+                            </p:childTnLst>
+                          </p:cTn>
+                        </p:par>
+                      </p:childTnLst>
+                    </p:cTn>
+                  </p:par>
+                </p:childTnLst>
+              </p:cTn>
+              <p:prevCondLst>
+                <p:cond evt="onPrev" delay="0">
+                  <p:tgtEl>
+                    <p:sldTgt/>
+                  </p:tgtEl>
+                </p:cond>
+              </p:prevCondLst>
+              <p:nextCondLst>
+                <p:cond evt="onNext" delay="0">
+                  <p:tgtEl>
+                    <p:sldTgt/>
+                  </p:tgtEl>
+                </p:cond>
+              </p:nextCondLst>
+            </p:seq>
+          </p:childTnLst>
+        </p:cTn>
+      </p:par>
+    </p:tnLst>
+    <p:bldLst>
+      <p:bldP spid="2" grpId="0"/>
+      <p:bldP spid="3" grpId="0" build="p"/>
+    </p:bldLst>
+  </p:timing>
+</p:sld>
+</file>
+
+<file path=ppt/slides/slide4.xml><?xml version="1.0" encoding="utf-8"?>
+<p:sld xmlns:a="http://schemas.openxmlformats.org/drawingml/2006/main" xmlns:r="http://schemas.openxmlformats.org/officeDocument/2006/relationships" xmlns:p="http://schemas.openxmlformats.org/presentationml/2006/main">
+  <p:cSld>
+    <p:spTree>
+      <p:nvGrpSpPr>
+        <p:cNvPr id="1" name=""/>
+        <p:cNvGrpSpPr/>
+        <p:nvPr/>
+      </p:nvGrpSpPr>
+      <p:grpSpPr>
+        <a:xfrm>
+          <a:off x="0" y="0"/>
+          <a:ext cx="0" cy="0"/>
+          <a:chOff x="0" y="0"/>
+          <a:chExt cx="0" cy="0"/>
+        </a:xfrm>
+      </p:grpSpPr>
+      <p:sp>
+        <p:nvSpPr>
+          <p:cNvPr id="2" name="Title 1"/>
+          <p:cNvSpPr>
+            <a:spLocks noGrp="1"/>
+          </p:cNvSpPr>
+          <p:nvPr>
+            <p:ph type="title"/>
+          </p:nvPr>
+        </p:nvSpPr>
+        <p:spPr/>
+        <p:txBody>
+          <a:bodyPr>
+            <a:noAutofit/>
+          </a:bodyPr>
+          <a:lstStyle/>
+          <a:p>
+            <a:r>
+              <a:rPr lang="en-US" sz="6000" b="1" dirty="0">
+                <a:solidFill>
+                  <a:srgbClr val="0070C0"/>
+                </a:solidFill>
+                <a:latin typeface="Times New Roman" panose="02020603050405020304" pitchFamily="18" charset="0"/>
+                <a:cs typeface="Times New Roman" panose="02020603050405020304" pitchFamily="18" charset="0"/>
+              </a:rPr>
+              <a:t>SASS</a:t>
+            </a:r>
+            <a:br>
+              <a:rPr lang="en-US" sz="6000" b="1" dirty="0">
+                <a:solidFill>
+                  <a:srgbClr val="0070C0"/>
+                </a:solidFill>
+                <a:latin typeface="Times New Roman" panose="02020603050405020304" pitchFamily="18" charset="0"/>
+                <a:cs typeface="Times New Roman" panose="02020603050405020304" pitchFamily="18" charset="0"/>
+              </a:rPr>
+            </a:br>
+            <a:endParaRPr lang="en-US" sz="6000" dirty="0">
+              <a:solidFill>
+                <a:srgbClr val="0070C0"/>
+              </a:solidFill>
+              <a:latin typeface="Times New Roman" panose="02020603050405020304" pitchFamily="18" charset="0"/>
+              <a:cs typeface="Times New Roman" panose="02020603050405020304" pitchFamily="18" charset="0"/>
+            </a:endParaRPr>
+          </a:p>
+        </p:txBody>
+      </p:sp>
+      <p:sp>
+        <p:nvSpPr>
+          <p:cNvPr id="3" name="Content Placeholder 2"/>
+          <p:cNvSpPr>
+            <a:spLocks noGrp="1"/>
+          </p:cNvSpPr>
+          <p:nvPr>
+            <p:ph idx="1"/>
+          </p:nvPr>
+        </p:nvSpPr>
+        <p:spPr>
+          <a:xfrm>
+            <a:off x="677333" y="2132454"/>
+            <a:ext cx="10815971" cy="3880773"/>
+          </a:xfrm>
+        </p:spPr>
+        <p:txBody>
+          <a:bodyPr>
+            <a:normAutofit lnSpcReduction="10000"/>
+          </a:bodyPr>
+          <a:lstStyle/>
+          <a:p>
+            <a:pPr>
+              <a:buClrTx/>
+              <a:buFont typeface="Wingdings" panose="05000000000000000000" pitchFamily="2" charset="2"/>
+              <a:buChar char="Ø"/>
+            </a:pPr>
+            <a:r>
+              <a:rPr lang="vi-VN" sz="3200" dirty="0" smtClean="0">
+                <a:latin typeface="Times New Roman" panose="02020603050405020304" pitchFamily="18" charset="0"/>
+                <a:cs typeface="Times New Roman" panose="02020603050405020304" pitchFamily="18" charset="0"/>
+              </a:rPr>
+              <a:t>Hoàn </a:t>
+            </a:r>
+            <a:r>
+              <a:rPr lang="vi-VN" sz="3200" dirty="0">
+                <a:latin typeface="Times New Roman" panose="02020603050405020304" pitchFamily="18" charset="0"/>
+                <a:cs typeface="Times New Roman" panose="02020603050405020304" pitchFamily="18" charset="0"/>
+              </a:rPr>
+              <a:t>toàn tương thích với </a:t>
+            </a:r>
+            <a:r>
+              <a:rPr lang="vi-VN" sz="3200" dirty="0" smtClean="0">
+                <a:latin typeface="Times New Roman" panose="02020603050405020304" pitchFamily="18" charset="0"/>
+                <a:cs typeface="Times New Roman" panose="02020603050405020304" pitchFamily="18" charset="0"/>
+              </a:rPr>
+              <a:t>CSS</a:t>
+            </a:r>
+            <a:endParaRPr lang="en-US" sz="3200" dirty="0" smtClean="0">
+              <a:latin typeface="Times New Roman" panose="02020603050405020304" pitchFamily="18" charset="0"/>
+              <a:cs typeface="Times New Roman" panose="02020603050405020304" pitchFamily="18" charset="0"/>
+            </a:endParaRPr>
+          </a:p>
+          <a:p>
+            <a:pPr>
+              <a:buClrTx/>
+              <a:buFont typeface="Wingdings" panose="05000000000000000000" pitchFamily="2" charset="2"/>
+              <a:buChar char="Ø"/>
+            </a:pPr>
+            <a:r>
+              <a:rPr lang="vi-VN" sz="3200" dirty="0">
+                <a:latin typeface="Times New Roman" panose="02020603050405020304" pitchFamily="18" charset="0"/>
+                <a:cs typeface="Times New Roman" panose="02020603050405020304" pitchFamily="18" charset="0"/>
+              </a:rPr>
+              <a:t>Cung cấp các tiện ích vô cùng mạnh mẽ như variables, nesting, mixins,...</a:t>
+            </a:r>
+          </a:p>
+          <a:p>
+            <a:pPr>
+              <a:buClrTx/>
+              <a:buFont typeface="Wingdings" panose="05000000000000000000" pitchFamily="2" charset="2"/>
+              <a:buChar char="Ø"/>
+            </a:pPr>
+            <a:r>
+              <a:rPr lang="en-US" sz="3200" dirty="0" err="1">
+                <a:latin typeface="Times New Roman" panose="02020603050405020304" pitchFamily="18" charset="0"/>
+                <a:cs typeface="Times New Roman" panose="02020603050405020304" pitchFamily="18" charset="0"/>
+              </a:rPr>
+              <a:t>Giúp</a:t>
+            </a:r>
+            <a:r>
+              <a:rPr lang="en-US" sz="3200" dirty="0">
+                <a:latin typeface="Times New Roman" panose="02020603050405020304" pitchFamily="18" charset="0"/>
+                <a:cs typeface="Times New Roman" panose="02020603050405020304" pitchFamily="18" charset="0"/>
+              </a:rPr>
+              <a:t> </a:t>
+            </a:r>
+            <a:r>
+              <a:rPr lang="en-US" sz="3200" dirty="0" err="1">
+                <a:latin typeface="Times New Roman" panose="02020603050405020304" pitchFamily="18" charset="0"/>
+                <a:cs typeface="Times New Roman" panose="02020603050405020304" pitchFamily="18" charset="0"/>
+              </a:rPr>
+              <a:t>tiết</a:t>
+            </a:r>
+            <a:r>
+              <a:rPr lang="en-US" sz="3200" dirty="0">
+                <a:latin typeface="Times New Roman" panose="02020603050405020304" pitchFamily="18" charset="0"/>
+                <a:cs typeface="Times New Roman" panose="02020603050405020304" pitchFamily="18" charset="0"/>
+              </a:rPr>
+              <a:t> </a:t>
+            </a:r>
+            <a:r>
+              <a:rPr lang="en-US" sz="3200" dirty="0" err="1">
+                <a:latin typeface="Times New Roman" panose="02020603050405020304" pitchFamily="18" charset="0"/>
+                <a:cs typeface="Times New Roman" panose="02020603050405020304" pitchFamily="18" charset="0"/>
+              </a:rPr>
+              <a:t>kiệm</a:t>
+            </a:r>
+            <a:r>
+              <a:rPr lang="en-US" sz="3200" dirty="0">
+                <a:latin typeface="Times New Roman" panose="02020603050405020304" pitchFamily="18" charset="0"/>
+                <a:cs typeface="Times New Roman" panose="02020603050405020304" pitchFamily="18" charset="0"/>
+              </a:rPr>
+              <a:t> </a:t>
+            </a:r>
+            <a:r>
+              <a:rPr lang="en-US" sz="3200" dirty="0" err="1">
+                <a:latin typeface="Times New Roman" panose="02020603050405020304" pitchFamily="18" charset="0"/>
+                <a:cs typeface="Times New Roman" panose="02020603050405020304" pitchFamily="18" charset="0"/>
+              </a:rPr>
+              <a:t>thời</a:t>
+            </a:r>
+            <a:r>
+              <a:rPr lang="en-US" sz="3200" dirty="0">
+                <a:latin typeface="Times New Roman" panose="02020603050405020304" pitchFamily="18" charset="0"/>
+                <a:cs typeface="Times New Roman" panose="02020603050405020304" pitchFamily="18" charset="0"/>
+              </a:rPr>
+              <a:t> </a:t>
+            </a:r>
+            <a:r>
+              <a:rPr lang="en-US" sz="3200" dirty="0" err="1">
+                <a:latin typeface="Times New Roman" panose="02020603050405020304" pitchFamily="18" charset="0"/>
+                <a:cs typeface="Times New Roman" panose="02020603050405020304" pitchFamily="18" charset="0"/>
+              </a:rPr>
+              <a:t>gian</a:t>
+            </a:r>
+            <a:r>
+              <a:rPr lang="en-US" sz="3200" dirty="0">
+                <a:latin typeface="Times New Roman" panose="02020603050405020304" pitchFamily="18" charset="0"/>
+                <a:cs typeface="Times New Roman" panose="02020603050405020304" pitchFamily="18" charset="0"/>
+              </a:rPr>
+              <a:t> </a:t>
+            </a:r>
+            <a:r>
+              <a:rPr lang="en-US" sz="3200" dirty="0" err="1">
+                <a:latin typeface="Times New Roman" panose="02020603050405020304" pitchFamily="18" charset="0"/>
+                <a:cs typeface="Times New Roman" panose="02020603050405020304" pitchFamily="18" charset="0"/>
+              </a:rPr>
+              <a:t>viết</a:t>
+            </a:r>
+            <a:r>
+              <a:rPr lang="en-US" sz="3200" dirty="0">
+                <a:latin typeface="Times New Roman" panose="02020603050405020304" pitchFamily="18" charset="0"/>
+                <a:cs typeface="Times New Roman" panose="02020603050405020304" pitchFamily="18" charset="0"/>
+              </a:rPr>
+              <a:t> </a:t>
+            </a:r>
+            <a:r>
+              <a:rPr lang="en-US" sz="3200" dirty="0" smtClean="0">
+                <a:latin typeface="Times New Roman" panose="02020603050405020304" pitchFamily="18" charset="0"/>
+                <a:cs typeface="Times New Roman" panose="02020603050405020304" pitchFamily="18" charset="0"/>
+              </a:rPr>
+              <a:t>CSS</a:t>
+            </a:r>
+          </a:p>
+          <a:p>
+            <a:pPr>
+              <a:buClrTx/>
+              <a:buFont typeface="Wingdings" panose="05000000000000000000" pitchFamily="2" charset="2"/>
+              <a:buChar char="Ø"/>
+            </a:pPr>
+            <a:r>
+              <a:rPr lang="en-US" sz="3200" dirty="0" smtClean="0">
+                <a:latin typeface="Times New Roman" panose="02020603050405020304" pitchFamily="18" charset="0"/>
+                <a:cs typeface="Times New Roman" panose="02020603050405020304" pitchFamily="18" charset="0"/>
+              </a:rPr>
+              <a:t>C</a:t>
+            </a:r>
+            <a:r>
+              <a:rPr lang="vi-VN" sz="3200" dirty="0" smtClean="0">
+                <a:latin typeface="Times New Roman" panose="02020603050405020304" pitchFamily="18" charset="0"/>
+                <a:cs typeface="Times New Roman" panose="02020603050405020304" pitchFamily="18" charset="0"/>
+              </a:rPr>
+              <a:t>ó </a:t>
+            </a:r>
+            <a:r>
+              <a:rPr lang="vi-VN" sz="3200" dirty="0">
+                <a:latin typeface="Times New Roman" panose="02020603050405020304" pitchFamily="18" charset="0"/>
+                <a:cs typeface="Times New Roman" panose="02020603050405020304" pitchFamily="18" charset="0"/>
+              </a:rPr>
+              <a:t>thể viết CSS theo thứ tự rõ ràng, quản lý các biến đã được định nghĩa </a:t>
+            </a:r>
+            <a:r>
+              <a:rPr lang="vi-VN" sz="3200" dirty="0" smtClean="0">
+                <a:latin typeface="Times New Roman" panose="02020603050405020304" pitchFamily="18" charset="0"/>
+                <a:cs typeface="Times New Roman" panose="02020603050405020304" pitchFamily="18" charset="0"/>
+              </a:rPr>
+              <a:t>sẵn</a:t>
+            </a:r>
+            <a:r>
+              <a:rPr lang="en-US" sz="3200" dirty="0" smtClean="0">
+                <a:latin typeface="Times New Roman" panose="02020603050405020304" pitchFamily="18" charset="0"/>
+                <a:cs typeface="Times New Roman" panose="02020603050405020304" pitchFamily="18" charset="0"/>
+              </a:rPr>
+              <a:t>.</a:t>
+            </a:r>
+          </a:p>
+          <a:p>
+            <a:pPr>
+              <a:buClrTx/>
+              <a:buFont typeface="Wingdings" panose="05000000000000000000" pitchFamily="2" charset="2"/>
+              <a:buChar char="Ø"/>
+            </a:pPr>
+            <a:r>
+              <a:rPr lang="en-US" sz="3200" dirty="0" err="1">
+                <a:latin typeface="Times New Roman" panose="02020603050405020304" pitchFamily="18" charset="0"/>
+                <a:cs typeface="Times New Roman" panose="02020603050405020304" pitchFamily="18" charset="0"/>
+              </a:rPr>
+              <a:t>C</a:t>
+            </a:r>
+            <a:r>
+              <a:rPr lang="en-US" sz="3200" dirty="0" err="1" smtClean="0">
+                <a:latin typeface="Times New Roman" panose="02020603050405020304" pitchFamily="18" charset="0"/>
+                <a:cs typeface="Times New Roman" panose="02020603050405020304" pitchFamily="18" charset="0"/>
+              </a:rPr>
+              <a:t>ó</a:t>
+            </a:r>
+            <a:r>
+              <a:rPr lang="en-US" sz="3200" dirty="0" smtClean="0">
+                <a:latin typeface="Times New Roman" panose="02020603050405020304" pitchFamily="18" charset="0"/>
+                <a:cs typeface="Times New Roman" panose="02020603050405020304" pitchFamily="18" charset="0"/>
+              </a:rPr>
+              <a:t> </a:t>
+            </a:r>
+            <a:r>
+              <a:rPr lang="en-US" sz="3200" dirty="0" err="1">
+                <a:latin typeface="Times New Roman" panose="02020603050405020304" pitchFamily="18" charset="0"/>
+                <a:cs typeface="Times New Roman" panose="02020603050405020304" pitchFamily="18" charset="0"/>
+              </a:rPr>
+              <a:t>thể</a:t>
+            </a:r>
+            <a:r>
+              <a:rPr lang="en-US" sz="3200" dirty="0">
+                <a:latin typeface="Times New Roman" panose="02020603050405020304" pitchFamily="18" charset="0"/>
+                <a:cs typeface="Times New Roman" panose="02020603050405020304" pitchFamily="18" charset="0"/>
+              </a:rPr>
+              <a:t> </a:t>
+            </a:r>
+            <a:r>
+              <a:rPr lang="en-US" sz="3200" dirty="0" err="1">
+                <a:latin typeface="Times New Roman" panose="02020603050405020304" pitchFamily="18" charset="0"/>
+                <a:cs typeface="Times New Roman" panose="02020603050405020304" pitchFamily="18" charset="0"/>
+              </a:rPr>
+              <a:t>tự</a:t>
+            </a:r>
+            <a:r>
+              <a:rPr lang="en-US" sz="3200" dirty="0">
+                <a:latin typeface="Times New Roman" panose="02020603050405020304" pitchFamily="18" charset="0"/>
+                <a:cs typeface="Times New Roman" panose="02020603050405020304" pitchFamily="18" charset="0"/>
+              </a:rPr>
+              <a:t> </a:t>
+            </a:r>
+            <a:r>
+              <a:rPr lang="en-US" sz="3200" dirty="0" err="1">
+                <a:latin typeface="Times New Roman" panose="02020603050405020304" pitchFamily="18" charset="0"/>
+                <a:cs typeface="Times New Roman" panose="02020603050405020304" pitchFamily="18" charset="0"/>
+              </a:rPr>
+              <a:t>động</a:t>
+            </a:r>
+            <a:r>
+              <a:rPr lang="en-US" sz="3200" dirty="0">
+                <a:latin typeface="Times New Roman" panose="02020603050405020304" pitchFamily="18" charset="0"/>
+                <a:cs typeface="Times New Roman" panose="02020603050405020304" pitchFamily="18" charset="0"/>
+              </a:rPr>
+              <a:t> </a:t>
+            </a:r>
+            <a:r>
+              <a:rPr lang="en-US" sz="3200" dirty="0" err="1">
+                <a:latin typeface="Times New Roman" panose="02020603050405020304" pitchFamily="18" charset="0"/>
+                <a:cs typeface="Times New Roman" panose="02020603050405020304" pitchFamily="18" charset="0"/>
+              </a:rPr>
+              <a:t>nén</a:t>
+            </a:r>
+            <a:r>
+              <a:rPr lang="en-US" sz="3200" dirty="0">
+                <a:latin typeface="Times New Roman" panose="02020603050405020304" pitchFamily="18" charset="0"/>
+                <a:cs typeface="Times New Roman" panose="02020603050405020304" pitchFamily="18" charset="0"/>
+              </a:rPr>
+              <a:t> </a:t>
+            </a:r>
+            <a:r>
+              <a:rPr lang="en-US" sz="3200" dirty="0" err="1">
+                <a:latin typeface="Times New Roman" panose="02020603050405020304" pitchFamily="18" charset="0"/>
+                <a:cs typeface="Times New Roman" panose="02020603050405020304" pitchFamily="18" charset="0"/>
+              </a:rPr>
+              <a:t>tập</a:t>
+            </a:r>
+            <a:r>
+              <a:rPr lang="en-US" sz="3200" dirty="0">
+                <a:latin typeface="Times New Roman" panose="02020603050405020304" pitchFamily="18" charset="0"/>
+                <a:cs typeface="Times New Roman" panose="02020603050405020304" pitchFamily="18" charset="0"/>
+              </a:rPr>
+              <a:t> tin CSS.</a:t>
+            </a:r>
+          </a:p>
+        </p:txBody>
+      </p:sp>
+    </p:spTree>
+    <p:extLst>
+      <p:ext uri="{BB962C8B-B14F-4D97-AF65-F5344CB8AC3E}">
+        <p14:creationId xmlns:p14="http://schemas.microsoft.com/office/powerpoint/2010/main" val="2797218876"/>
+      </p:ext>
+    </p:extLst>
+  </p:cSld>
+  <p:clrMapOvr>
+    <a:masterClrMapping/>
+  </p:clrMapOvr>
+  <mc:AlternateContent xmlns:mc="http://schemas.openxmlformats.org/markup-compatibility/2006" xmlns:p14="http://schemas.microsoft.com/office/powerpoint/2010/main">
+    <mc:Choice Requires="p14">
+      <p:transition spd="slow" p14:dur="2000">
+        <p:split orient="vert"/>
+      </p:transition>
+    </mc:Choice>
+    <mc:Fallback xmlns="">
+      <p:transition spd="slow">
+        <p:split orient="vert"/>
+      </p:transition>
+    </mc:Fallback>
+  </mc:AlternateContent>
+  <p:timing>
+    <p:tnLst>
+      <p:par>
+        <p:cTn id="1" dur="indefinite" restart="never" nodeType="tmRoot">
+          <p:childTnLst>
+            <p:seq concurrent="1" nextAc="seek">
+              <p:cTn id="2" dur="indefinite" nodeType="mainSeq">
+                <p:childTnLst>
+                  <p:par>
+                    <p:cTn id="3" fill="hold">
+                      <p:stCondLst>
+                        <p:cond delay="indefinite"/>
+                      </p:stCondLst>
+                      <p:childTnLst>
+                        <p:par>
+                          <p:cTn id="4" fill="hold">
+                            <p:stCondLst>
+                              <p:cond delay="0"/>
+                            </p:stCondLst>
+                            <p:childTnLst>
+                              <p:par>
+                                <p:cTn id="5" presetID="42" presetClass="entr" presetSubtype="0" fill="hold" grpId="0" nodeType="clickEffect">
+                                  <p:stCondLst>
+                                    <p:cond delay="0"/>
+                                  </p:stCondLst>
+                                  <p:childTnLst>
+                                    <p:set>
+                                      <p:cBhvr>
+                                        <p:cTn id="6" dur="1" fill="hold">
+                                          <p:stCondLst>
+                                            <p:cond delay="0"/>
+                                          </p:stCondLst>
+                                        </p:cTn>
+                                        <p:tgtEl>
+                                          <p:spTgt spid="2"/>
+                                        </p:tgtEl>
+                                        <p:attrNameLst>
+                                          <p:attrName>style.visibility</p:attrName>
+                                        </p:attrNameLst>
+                                      </p:cBhvr>
+                                      <p:to>
+                                        <p:strVal val="visible"/>
+                                      </p:to>
+                                    </p:set>
+                                    <p:animEffect transition="in" filter="fade">
+                                      <p:cBhvr>
+                                        <p:cTn id="7" dur="1000"/>
+                                        <p:tgtEl>
+                                          <p:spTgt spid="2"/>
+                                        </p:tgtEl>
+                                      </p:cBhvr>
+                                    </p:animEffect>
+                                    <p:anim calcmode="lin" valueType="num">
+                                      <p:cBhvr>
+                                        <p:cTn id="8" dur="1000" fill="hold"/>
+                                        <p:tgtEl>
+                                          <p:spTgt spid="2"/>
+                                        </p:tgtEl>
+                                        <p:attrNameLst>
+                                          <p:attrName>ppt_x</p:attrName>
+                                        </p:attrNameLst>
+                                      </p:cBhvr>
+                                      <p:tavLst>
+                                        <p:tav tm="0">
+                                          <p:val>
+                                            <p:strVal val="#ppt_x"/>
+                                          </p:val>
+                                        </p:tav>
+                                        <p:tav tm="100000">
+                                          <p:val>
+                                            <p:strVal val="#ppt_x"/>
+                                          </p:val>
+                                        </p:tav>
+                                      </p:tavLst>
+                                    </p:anim>
+                                    <p:anim calcmode="lin" valueType="num">
+                                      <p:cBhvr>
+                                        <p:cTn id="9" dur="1000" fill="hold"/>
+                                        <p:tgtEl>
+                                          <p:spTgt spid="2"/>
+                                        </p:tgtEl>
+                                        <p:attrNameLst>
+                                          <p:attrName>ppt_y</p:attrName>
+                                        </p:attrNameLst>
+                                      </p:cBhvr>
+                                      <p:tavLst>
+                                        <p:tav tm="0">
+                                          <p:val>
+                                            <p:strVal val="#ppt_y+.1"/>
+                                          </p:val>
+                                        </p:tav>
+                                        <p:tav tm="100000">
+                                          <p:val>
+                                            <p:strVal val="#ppt_y"/>
+                                          </p:val>
+                                        </p:tav>
+                                      </p:tavLst>
+                                    </p:anim>
+                                  </p:childTnLst>
+                                </p:cTn>
+                              </p:par>
+                            </p:childTnLst>
+                          </p:cTn>
+                        </p:par>
+                      </p:childTnLst>
+                    </p:cTn>
+                  </p:par>
+                  <p:par>
+                    <p:cTn id="10" fill="hold">
+                      <p:stCondLst>
+                        <p:cond delay="indefinite"/>
+                      </p:stCondLst>
+                      <p:childTnLst>
+                        <p:par>
+                          <p:cTn id="11" fill="hold">
+                            <p:stCondLst>
+                              <p:cond delay="0"/>
+                            </p:stCondLst>
+                            <p:childTnLst>
+                              <p:par>
+                                <p:cTn id="12" presetID="22" presetClass="entr" presetSubtype="4" fill="hold" grpId="0" nodeType="clickEffect">
+                                  <p:stCondLst>
+                                    <p:cond delay="0"/>
+                                  </p:stCondLst>
+                                  <p:childTnLst>
+                                    <p:set>
+                                      <p:cBhvr>
+                                        <p:cTn id="13" dur="1" fill="hold">
+                                          <p:stCondLst>
+                                            <p:cond delay="0"/>
+                                          </p:stCondLst>
+                                        </p:cTn>
+                                        <p:tgtEl>
+                                          <p:spTgt spid="3">
+                                            <p:txEl>
+                                              <p:pRg st="0" end="0"/>
+                                            </p:txEl>
+                                          </p:spTgt>
+                                        </p:tgtEl>
+                                        <p:attrNameLst>
+                                          <p:attrName>style.visibility</p:attrName>
+                                        </p:attrNameLst>
+                                      </p:cBhvr>
+                                      <p:to>
+                                        <p:strVal val="visible"/>
+                                      </p:to>
+                                    </p:set>
+                                    <p:animEffect transition="in" filter="wipe(down)">
+                                      <p:cBhvr>
+                                        <p:cTn id="14" dur="500"/>
+                                        <p:tgtEl>
+                                          <p:spTgt spid="3">
+                                            <p:txEl>
+                                              <p:pRg st="0" end="0"/>
+                                            </p:txEl>
+                                          </p:spTgt>
+                                        </p:tgtEl>
+                                      </p:cBhvr>
+                                    </p:animEffect>
+                                  </p:childTnLst>
+                                </p:cTn>
+                              </p:par>
+                            </p:childTnLst>
+                          </p:cTn>
+                        </p:par>
+                      </p:childTnLst>
+                    </p:cTn>
+                  </p:par>
+                  <p:par>
+                    <p:cTn id="15" fill="hold">
+                      <p:stCondLst>
+                        <p:cond delay="indefinite"/>
+                      </p:stCondLst>
+                      <p:childTnLst>
+                        <p:par>
+                          <p:cTn id="16" fill="hold">
+                            <p:stCondLst>
+                              <p:cond delay="0"/>
+                            </p:stCondLst>
+                            <p:childTnLst>
+                              <p:par>
+                                <p:cTn id="17" presetID="22" presetClass="entr" presetSubtype="4" fill="hold" grpId="0" nodeType="clickEffect">
+                                  <p:stCondLst>
+                                    <p:cond delay="0"/>
+                                  </p:stCondLst>
+                                  <p:childTnLst>
+                                    <p:set>
+                                      <p:cBhvr>
+                                        <p:cTn id="18" dur="1" fill="hold">
+                                          <p:stCondLst>
+                                            <p:cond delay="0"/>
+                                          </p:stCondLst>
+                                        </p:cTn>
+                                        <p:tgtEl>
+                                          <p:spTgt spid="3">
+                                            <p:txEl>
+                                              <p:pRg st="1" end="1"/>
+                                            </p:txEl>
+                                          </p:spTgt>
+                                        </p:tgtEl>
+                                        <p:attrNameLst>
+                                          <p:attrName>style.visibility</p:attrName>
+                                        </p:attrNameLst>
+                                      </p:cBhvr>
+                                      <p:to>
+                                        <p:strVal val="visible"/>
+                                      </p:to>
+                                    </p:set>
+                                    <p:animEffect transition="in" filter="wipe(down)">
+                                      <p:cBhvr>
+                                        <p:cTn id="19" dur="500"/>
+                                        <p:tgtEl>
+                                          <p:spTgt spid="3">
+                                            <p:txEl>
+                                              <p:pRg st="1" end="1"/>
+                                            </p:txEl>
+                                          </p:spTgt>
+                                        </p:tgtEl>
+                                      </p:cBhvr>
+                                    </p:animEffect>
+                                  </p:childTnLst>
+                                </p:cTn>
+                              </p:par>
+                            </p:childTnLst>
+                          </p:cTn>
+                        </p:par>
+                      </p:childTnLst>
+                    </p:cTn>
+                  </p:par>
+                  <p:par>
+                    <p:cTn id="20" fill="hold">
+                      <p:stCondLst>
+                        <p:cond delay="indefinite"/>
+                      </p:stCondLst>
+                      <p:childTnLst>
+                        <p:par>
+                          <p:cTn id="21" fill="hold">
+                            <p:stCondLst>
+                              <p:cond delay="0"/>
+                            </p:stCondLst>
+                            <p:childTnLst>
+                              <p:par>
+                                <p:cTn id="22" presetID="22" presetClass="entr" presetSubtype="4" fill="hold" grpId="0" nodeType="clickEffect">
+                                  <p:stCondLst>
+                                    <p:cond delay="0"/>
+                                  </p:stCondLst>
+                                  <p:childTnLst>
+                                    <p:set>
+                                      <p:cBhvr>
+                                        <p:cTn id="23" dur="1" fill="hold">
+                                          <p:stCondLst>
+                                            <p:cond delay="0"/>
+                                          </p:stCondLst>
+                                        </p:cTn>
+                                        <p:tgtEl>
+                                          <p:spTgt spid="3">
+                                            <p:txEl>
+                                              <p:pRg st="2" end="2"/>
+                                            </p:txEl>
+                                          </p:spTgt>
+                                        </p:tgtEl>
+                                        <p:attrNameLst>
+                                          <p:attrName>style.visibility</p:attrName>
+                                        </p:attrNameLst>
+                                      </p:cBhvr>
+                                      <p:to>
+                                        <p:strVal val="visible"/>
+                                      </p:to>
+                                    </p:set>
+                                    <p:animEffect transition="in" filter="wipe(down)">
+                                      <p:cBhvr>
+                                        <p:cTn id="24" dur="500"/>
+                                        <p:tgtEl>
+                                          <p:spTgt spid="3">
+                                            <p:txEl>
+                                              <p:pRg st="2" end="2"/>
+                                            </p:txEl>
+                                          </p:spTgt>
+                                        </p:tgtEl>
+                                      </p:cBhvr>
+                                    </p:animEffect>
+                                  </p:childTnLst>
+                                </p:cTn>
+                              </p:par>
+                            </p:childTnLst>
+                          </p:cTn>
+                        </p:par>
+                      </p:childTnLst>
+                    </p:cTn>
+                  </p:par>
+                  <p:par>
+                    <p:cTn id="25" fill="hold">
+                      <p:stCondLst>
+                        <p:cond delay="indefinite"/>
+                      </p:stCondLst>
+                      <p:childTnLst>
+                        <p:par>
+                          <p:cTn id="26" fill="hold">
+                            <p:stCondLst>
+                              <p:cond delay="0"/>
+                            </p:stCondLst>
+                            <p:childTnLst>
+                              <p:par>
+                                <p:cTn id="27" presetID="22" presetClass="entr" presetSubtype="4" fill="hold" grpId="0" nodeType="clickEffect">
+                                  <p:stCondLst>
+                                    <p:cond delay="0"/>
+                                  </p:stCondLst>
+                                  <p:childTnLst>
+                                    <p:set>
+                                      <p:cBhvr>
+                                        <p:cTn id="28" dur="1" fill="hold">
+                                          <p:stCondLst>
+                                            <p:cond delay="0"/>
+                                          </p:stCondLst>
+                                        </p:cTn>
+                                        <p:tgtEl>
+                                          <p:spTgt spid="3">
+                                            <p:txEl>
+                                              <p:pRg st="3" end="3"/>
+                                            </p:txEl>
+                                          </p:spTgt>
+                                        </p:tgtEl>
+                                        <p:attrNameLst>
+                                          <p:attrName>style.visibility</p:attrName>
+                                        </p:attrNameLst>
+                                      </p:cBhvr>
+                                      <p:to>
+                                        <p:strVal val="visible"/>
+                                      </p:to>
+                                    </p:set>
+                                    <p:animEffect transition="in" filter="wipe(down)">
+                                      <p:cBhvr>
+                                        <p:cTn id="29" dur="500"/>
+                                        <p:tgtEl>
+                                          <p:spTgt spid="3">
+                                            <p:txEl>
+                                              <p:pRg st="3" end="3"/>
+                                            </p:txEl>
+                                          </p:spTgt>
+                                        </p:tgtEl>
+                                      </p:cBhvr>
+                                    </p:animEffect>
+                                  </p:childTnLst>
+                                </p:cTn>
+                              </p:par>
+                            </p:childTnLst>
+                          </p:cTn>
+                        </p:par>
+                      </p:childTnLst>
+                    </p:cTn>
+                  </p:par>
+                  <p:par>
+                    <p:cTn id="30" fill="hold">
+                      <p:stCondLst>
+                        <p:cond delay="indefinite"/>
+                      </p:stCondLst>
+                      <p:childTnLst>
+                        <p:par>
+                          <p:cTn id="31" fill="hold">
+                            <p:stCondLst>
+                              <p:cond delay="0"/>
+                            </p:stCondLst>
+                            <p:childTnLst>
+                              <p:par>
+                                <p:cTn id="32" presetID="22" presetClass="entr" presetSubtype="4" fill="hold" grpId="0" nodeType="clickEffect">
+                                  <p:stCondLst>
+                                    <p:cond delay="0"/>
+                                  </p:stCondLst>
+                                  <p:childTnLst>
+                                    <p:set>
+                                      <p:cBhvr>
+                                        <p:cTn id="33" dur="1" fill="hold">
+                                          <p:stCondLst>
+                                            <p:cond delay="0"/>
+                                          </p:stCondLst>
+                                        </p:cTn>
+                                        <p:tgtEl>
+                                          <p:spTgt spid="3">
+                                            <p:txEl>
+                                              <p:pRg st="4" end="4"/>
+                                            </p:txEl>
+                                          </p:spTgt>
+                                        </p:tgtEl>
+                                        <p:attrNameLst>
+                                          <p:attrName>style.visibility</p:attrName>
+                                        </p:attrNameLst>
+                                      </p:cBhvr>
+                                      <p:to>
+                                        <p:strVal val="visible"/>
+                                      </p:to>
+                                    </p:set>
+                                    <p:animEffect transition="in" filter="wipe(down)">
+                                      <p:cBhvr>
+                                        <p:cTn id="34" dur="500"/>
+                                        <p:tgtEl>
+                                          <p:spTgt spid="3">
+                                            <p:txEl>
+                                              <p:pRg st="4" end="4"/>
+                                            </p:txEl>
+                                          </p:spTgt>
+                                        </p:tgtEl>
+                                      </p:cBhvr>
+                                    </p:animEffect>
+                                  </p:childTnLst>
+                                </p:cTn>
+                              </p:par>
+                            </p:childTnLst>
+                          </p:cTn>
+                        </p:par>
+                      </p:childTnLst>
+                    </p:cTn>
+                  </p:par>
+                </p:childTnLst>
+              </p:cTn>
+              <p:prevCondLst>
+                <p:cond evt="onPrev" delay="0">
+                  <p:tgtEl>
+                    <p:sldTgt/>
+                  </p:tgtEl>
+                </p:cond>
+              </p:prevCondLst>
+              <p:nextCondLst>
+                <p:cond evt="onNext" delay="0">
+                  <p:tgtEl>
+                    <p:sldTgt/>
+                  </p:tgtEl>
+                </p:cond>
+              </p:nextCondLst>
+            </p:seq>
+          </p:childTnLst>
+        </p:cTn>
+      </p:par>
+    </p:tnLst>
+    <p:bldLst>
+      <p:bldP spid="2" grpId="0"/>
+      <p:bldP spid="3" grpId="0" build="p"/>
+    </p:bldLst>
+  </p:timing>
+</p:sld>
+</file>
+
 <file path=ppt/slides/slide5.xml><?xml version="1.0" encoding="utf-8"?>
 <p:sld xmlns:a="http://schemas.openxmlformats.org/drawingml/2006/main" xmlns:r="http://schemas.openxmlformats.org/officeDocument/2006/relationships" xmlns:p="http://schemas.openxmlformats.org/presentationml/2006/main">
   <p:cSld>
@@ -17939,21 +18492,42 @@
                 <a:latin typeface="Times New Roman" panose="02020603050405020304" pitchFamily="18" charset="0"/>
                 <a:cs typeface="Times New Roman" panose="02020603050405020304" pitchFamily="18" charset="0"/>
               </a:rPr>
+              <a:t> con </a:t>
+            </a:r>
+            <a:r>
+              <a:rPr lang="en-US" sz="3200" dirty="0" err="1" smtClean="0">
+                <a:latin typeface="Times New Roman" panose="02020603050405020304" pitchFamily="18" charset="0"/>
+                <a:cs typeface="Times New Roman" panose="02020603050405020304" pitchFamily="18" charset="0"/>
+              </a:rPr>
+              <a:t>được</a:t>
+            </a:r>
+            <a:r>
+              <a:rPr lang="en-US" sz="3200" dirty="0" smtClean="0">
+                <a:latin typeface="Times New Roman" panose="02020603050405020304" pitchFamily="18" charset="0"/>
+                <a:cs typeface="Times New Roman" panose="02020603050405020304" pitchFamily="18" charset="0"/>
+              </a:rPr>
               <a:t> </a:t>
             </a:r>
             <a:r>
+              <a:rPr lang="en-US" sz="3200" dirty="0" err="1" smtClean="0">
+                <a:latin typeface="Times New Roman" panose="02020603050405020304" pitchFamily="18" charset="0"/>
+                <a:cs typeface="Times New Roman" panose="02020603050405020304" pitchFamily="18" charset="0"/>
+              </a:rPr>
+              <a:t>lồng</a:t>
+            </a:r>
+            <a:r>
               <a:rPr lang="en-US" sz="3200" dirty="0" smtClean="0">
                 <a:latin typeface="Times New Roman" panose="02020603050405020304" pitchFamily="18" charset="0"/>
                 <a:cs typeface="Times New Roman" panose="02020603050405020304" pitchFamily="18" charset="0"/>
               </a:rPr>
-              <a:t>con </a:t>
+              <a:t> </a:t>
             </a:r>
             <a:r>
               <a:rPr lang="en-US" sz="3200" dirty="0" err="1" smtClean="0">
                 <a:latin typeface="Times New Roman" panose="02020603050405020304" pitchFamily="18" charset="0"/>
                 <a:cs typeface="Times New Roman" panose="02020603050405020304" pitchFamily="18" charset="0"/>
               </a:rPr>
-              <a:t>được</a:t>
+              <a:t>vào</a:t>
             </a:r>
             <a:r>
               <a:rPr lang="en-US" sz="3200" dirty="0" smtClean="0">
@@ -17967,7 +18541,7 @@
                 <a:latin typeface="Times New Roman" panose="02020603050405020304" pitchFamily="18" charset="0"/>
                 <a:cs typeface="Times New Roman" panose="02020603050405020304" pitchFamily="18" charset="0"/>
               </a:rPr>
-              <a:t>lồng</a:t>
+              <a:t>thuộc</a:t>
             </a:r>
             <a:r>
               <a:rPr lang="en-US" sz="3200" dirty="0" smtClean="0">
@@ -17981,47 +18555,15 @@
                 <a:latin typeface="Times New Roman" panose="02020603050405020304" pitchFamily="18" charset="0"/>
                 <a:cs typeface="Times New Roman" panose="02020603050405020304" pitchFamily="18" charset="0"/>
               </a:rPr>
-              <a:t>vào</a:t>
+              <a:t>tính</a:t>
             </a:r>
             <a:r>
               <a:rPr lang="en-US" sz="3200" dirty="0" smtClean="0">
                 <a:latin typeface="Times New Roman" panose="02020603050405020304" pitchFamily="18" charset="0"/>
                 <a:cs typeface="Times New Roman" panose="02020603050405020304" pitchFamily="18" charset="0"/>
               </a:rPr>
-              <a:t> </a:t>
-            </a:r>
-            <a:r>
-              <a:rPr lang="en-US" sz="3200" dirty="0" err="1" smtClean="0">
-                <a:latin typeface="Times New Roman" panose="02020603050405020304" pitchFamily="18" charset="0"/>
-                <a:cs typeface="Times New Roman" panose="02020603050405020304" pitchFamily="18" charset="0"/>
-              </a:rPr>
-              <a:t>thuộc</a:t>
-            </a:r>
-            <a:r>
-              <a:rPr lang="en-US" sz="3200" dirty="0" smtClean="0">
-                <a:latin typeface="Times New Roman" panose="02020603050405020304" pitchFamily="18" charset="0"/>
-                <a:cs typeface="Times New Roman" panose="02020603050405020304" pitchFamily="18" charset="0"/>
-              </a:rPr>
-              <a:t> </a:t>
-            </a:r>
-            <a:r>
-              <a:rPr lang="en-US" sz="3200" dirty="0" err="1" smtClean="0">
-                <a:latin typeface="Times New Roman" panose="02020603050405020304" pitchFamily="18" charset="0"/>
-                <a:cs typeface="Times New Roman" panose="02020603050405020304" pitchFamily="18" charset="0"/>
-              </a:rPr>
-              <a:t>tính</a:t>
-            </a:r>
-            <a:r>
-              <a:rPr lang="en-US" sz="3200" dirty="0" smtClean="0">
-                <a:latin typeface="Times New Roman" panose="02020603050405020304" pitchFamily="18" charset="0"/>
-                <a:cs typeface="Times New Roman" panose="02020603050405020304" pitchFamily="18" charset="0"/>
-              </a:rPr>
               <a:t> cha</a:t>
             </a:r>
-            <a:endParaRPr lang="en-US" sz="3200" dirty="0" smtClean="0">
-              <a:latin typeface="Times New Roman" panose="02020603050405020304" pitchFamily="18" charset="0"/>
-              <a:cs typeface="Times New Roman" panose="02020603050405020304" pitchFamily="18" charset="0"/>
-            </a:endParaRPr>
           </a:p>
           <a:p>
             <a:pPr>
@@ -20785,13 +21327,13 @@
   <p:clrMapOvr>
     <a:masterClrMapping/>
   </p:clrMapOvr>
-  <mc:AlternateContent xmlns:mc="http://schemas.openxmlformats.org/markup-compatibility/2006">
-    <mc:Choice xmlns:p14="http://schemas.microsoft.com/office/powerpoint/2010/main" Requires="p14">
+  <mc:AlternateContent xmlns:mc="http://schemas.openxmlformats.org/markup-compatibility/2006" xmlns:p14="http://schemas.microsoft.com/office/powerpoint/2010/main">
+    <mc:Choice Requires="p14">
       <p:transition spd="slow" p14:dur="2000">
         <p:split orient="vert"/>
       </p:transition>
     </mc:Choice>
-    <mc:Fallback>
+    <mc:Fallback xmlns="">
       <p:transition spd="slow">
         <p:split orient="vert"/>
       </p:transition>

</xml_diff>